<commit_message>
started commenting table recognition and differentiating internal and external methods, added first unit tests for table recognition
</commit_message>
<xml_diff>
--- a/references/BKT Shapes Test Library.pptx
+++ b/references/BKT Shapes Test Library.pptx
@@ -7,7 +7,7 @@
     <p:sldMasterId id="2147483684" r:id="rId3"/>
   </p:sldMasterIdLst>
   <p:notesMasterIdLst>
-    <p:notesMasterId r:id="rId25"/>
+    <p:notesMasterId r:id="rId26"/>
   </p:notesMasterIdLst>
   <p:sldIdLst>
     <p:sldId id="268" r:id="rId4"/>
@@ -31,11 +31,12 @@
     <p:sldId id="278" r:id="rId22"/>
     <p:sldId id="264" r:id="rId23"/>
     <p:sldId id="279" r:id="rId24"/>
+    <p:sldId id="282" r:id="rId25"/>
   </p:sldIdLst>
   <p:sldSz cx="12192000" cy="6858000"/>
   <p:notesSz cx="6858000" cy="9144000"/>
   <p:custDataLst>
-    <p:tags r:id="rId26"/>
+    <p:tags r:id="rId27"/>
   </p:custDataLst>
   <p:defaultTextStyle>
     <a:defPPr>
@@ -178,6 +179,11 @@
         <p14:section name="Thumbnail" id="{11D78E82-A259-4016-9DF1-8C10CCF77243}">
           <p14:sldIdLst>
             <p14:sldId id="279"/>
+          </p14:sldIdLst>
+        </p14:section>
+        <p14:section name="Shapetables" id="{65C0DF56-DF26-451A-896E-E64362A924DA}">
+          <p14:sldIdLst>
+            <p14:sldId id="282"/>
           </p14:sldIdLst>
         </p14:section>
       </p14:sectionLst>
@@ -10455,7 +10461,7 @@
           <a:p>
             <a:fld id="{EB63609A-8A70-4963-B7F7-B1BC725097C5}" type="datetimeFigureOut">
               <a:rPr lang="en-US" smtClean="0"/>
-              <a:t>6/27/2020</a:t>
+              <a:t>7/21/2020</a:t>
             </a:fld>
             <a:endParaRPr lang="en-US"/>
           </a:p>
@@ -10854,7 +10860,7 @@
           <a:p>
             <a:fld id="{8CE785BC-267D-4D72-802A-72E65D3984C5}" type="datetime1">
               <a:rPr lang="en-US" smtClean="0"/>
-              <a:t>6/27/2020</a:t>
+              <a:t>7/21/2020</a:t>
             </a:fld>
             <a:endParaRPr lang="en-US"/>
           </a:p>
@@ -11027,7 +11033,7 @@
           <a:p>
             <a:fld id="{6402C829-D144-4F58-B998-38181FE2FB49}" type="datetime1">
               <a:rPr lang="en-US" smtClean="0"/>
-              <a:t>6/27/2020</a:t>
+              <a:t>7/21/2020</a:t>
             </a:fld>
             <a:endParaRPr lang="en-US"/>
           </a:p>
@@ -11210,7 +11216,7 @@
           <a:p>
             <a:fld id="{AEB2CE19-D45A-459C-8100-A0974FC1EECD}" type="datetime1">
               <a:rPr lang="en-US" smtClean="0"/>
-              <a:t>6/27/2020</a:t>
+              <a:t>7/21/2020</a:t>
             </a:fld>
             <a:endParaRPr lang="en-US"/>
           </a:p>
@@ -11405,7 +11411,7 @@
           <a:p>
             <a:fld id="{7C5E8F0A-222C-434A-A9CB-81E98982AC14}" type="datetimeFigureOut">
               <a:rPr lang="en-US" smtClean="0"/>
-              <a:t>6/27/2020</a:t>
+              <a:t>7/21/2020</a:t>
             </a:fld>
             <a:endParaRPr lang="en-US"/>
           </a:p>
@@ -11575,7 +11581,7 @@
           <a:p>
             <a:fld id="{7C5E8F0A-222C-434A-A9CB-81E98982AC14}" type="datetimeFigureOut">
               <a:rPr lang="en-US" smtClean="0"/>
-              <a:t>6/27/2020</a:t>
+              <a:t>7/21/2020</a:t>
             </a:fld>
             <a:endParaRPr lang="en-US"/>
           </a:p>
@@ -11821,7 +11827,7 @@
           <a:p>
             <a:fld id="{7C5E8F0A-222C-434A-A9CB-81E98982AC14}" type="datetimeFigureOut">
               <a:rPr lang="en-US" smtClean="0"/>
-              <a:t>6/27/2020</a:t>
+              <a:t>7/21/2020</a:t>
             </a:fld>
             <a:endParaRPr lang="en-US"/>
           </a:p>
@@ -12053,7 +12059,7 @@
           <a:p>
             <a:fld id="{7C5E8F0A-222C-434A-A9CB-81E98982AC14}" type="datetimeFigureOut">
               <a:rPr lang="en-US" smtClean="0"/>
-              <a:t>6/27/2020</a:t>
+              <a:t>7/21/2020</a:t>
             </a:fld>
             <a:endParaRPr lang="en-US"/>
           </a:p>
@@ -12420,7 +12426,7 @@
           <a:p>
             <a:fld id="{7C5E8F0A-222C-434A-A9CB-81E98982AC14}" type="datetimeFigureOut">
               <a:rPr lang="en-US" smtClean="0"/>
-              <a:t>6/27/2020</a:t>
+              <a:t>7/21/2020</a:t>
             </a:fld>
             <a:endParaRPr lang="en-US"/>
           </a:p>
@@ -12538,7 +12544,7 @@
           <a:p>
             <a:fld id="{7C5E8F0A-222C-434A-A9CB-81E98982AC14}" type="datetimeFigureOut">
               <a:rPr lang="en-US" smtClean="0"/>
-              <a:t>6/27/2020</a:t>
+              <a:t>7/21/2020</a:t>
             </a:fld>
             <a:endParaRPr lang="en-US"/>
           </a:p>
@@ -12633,7 +12639,7 @@
           <a:p>
             <a:fld id="{7C5E8F0A-222C-434A-A9CB-81E98982AC14}" type="datetimeFigureOut">
               <a:rPr lang="en-US" smtClean="0"/>
-              <a:t>6/27/2020</a:t>
+              <a:t>7/21/2020</a:t>
             </a:fld>
             <a:endParaRPr lang="en-US"/>
           </a:p>
@@ -12910,7 +12916,7 @@
           <a:p>
             <a:fld id="{7C5E8F0A-222C-434A-A9CB-81E98982AC14}" type="datetimeFigureOut">
               <a:rPr lang="en-US" smtClean="0"/>
-              <a:t>6/27/2020</a:t>
+              <a:t>7/21/2020</a:t>
             </a:fld>
             <a:endParaRPr lang="en-US"/>
           </a:p>
@@ -13080,7 +13086,7 @@
           <a:p>
             <a:fld id="{2D8DD609-9492-45C6-B115-851EE4D74A27}" type="datetime1">
               <a:rPr lang="en-US" smtClean="0"/>
-              <a:t>6/27/2020</a:t>
+              <a:t>7/21/2020</a:t>
             </a:fld>
             <a:endParaRPr lang="en-US"/>
           </a:p>
@@ -13336,7 +13342,7 @@
           <a:p>
             <a:fld id="{7C5E8F0A-222C-434A-A9CB-81E98982AC14}" type="datetimeFigureOut">
               <a:rPr lang="en-US" smtClean="0"/>
-              <a:t>6/27/2020</a:t>
+              <a:t>7/21/2020</a:t>
             </a:fld>
             <a:endParaRPr lang="en-US"/>
           </a:p>
@@ -13506,7 +13512,7 @@
           <a:p>
             <a:fld id="{7C5E8F0A-222C-434A-A9CB-81E98982AC14}" type="datetimeFigureOut">
               <a:rPr lang="en-US" smtClean="0"/>
-              <a:t>6/27/2020</a:t>
+              <a:t>7/21/2020</a:t>
             </a:fld>
             <a:endParaRPr lang="en-US"/>
           </a:p>
@@ -13686,7 +13692,7 @@
           <a:p>
             <a:fld id="{7C5E8F0A-222C-434A-A9CB-81E98982AC14}" type="datetimeFigureOut">
               <a:rPr lang="en-US" smtClean="0"/>
-              <a:t>6/27/2020</a:t>
+              <a:t>7/21/2020</a:t>
             </a:fld>
             <a:endParaRPr lang="en-US"/>
           </a:p>
@@ -14082,7 +14088,7 @@
           <a:p>
             <a:fld id="{7C5E8F0A-222C-434A-A9CB-81E98982AC14}" type="datetimeFigureOut">
               <a:rPr lang="en-US" smtClean="0"/>
-              <a:t>6/27/2020</a:t>
+              <a:t>7/21/2020</a:t>
             </a:fld>
             <a:endParaRPr lang="en-US"/>
           </a:p>
@@ -14313,7 +14319,7 @@
           <a:p>
             <a:fld id="{7C5E8F0A-222C-434A-A9CB-81E98982AC14}" type="datetimeFigureOut">
               <a:rPr lang="en-US" smtClean="0"/>
-              <a:t>6/27/2020</a:t>
+              <a:t>7/21/2020</a:t>
             </a:fld>
             <a:endParaRPr lang="en-US"/>
           </a:p>
@@ -15347,7 +15353,7 @@
           <a:p>
             <a:fld id="{7C5E8F0A-222C-434A-A9CB-81E98982AC14}" type="datetimeFigureOut">
               <a:rPr lang="en-US" smtClean="0"/>
-              <a:t>6/27/2020</a:t>
+              <a:t>7/21/2020</a:t>
             </a:fld>
             <a:endParaRPr lang="en-US"/>
           </a:p>
@@ -15619,7 +15625,7 @@
           <a:p>
             <a:fld id="{7C5E8F0A-222C-434A-A9CB-81E98982AC14}" type="datetimeFigureOut">
               <a:rPr lang="en-US" smtClean="0"/>
-              <a:t>6/27/2020</a:t>
+              <a:t>7/21/2020</a:t>
             </a:fld>
             <a:endParaRPr lang="en-US"/>
           </a:p>
@@ -16029,7 +16035,7 @@
           <a:p>
             <a:fld id="{7C5E8F0A-222C-434A-A9CB-81E98982AC14}" type="datetimeFigureOut">
               <a:rPr lang="en-US" smtClean="0"/>
-              <a:t>6/27/2020</a:t>
+              <a:t>7/21/2020</a:t>
             </a:fld>
             <a:endParaRPr lang="en-US"/>
           </a:p>
@@ -16156,7 +16162,7 @@
           <a:p>
             <a:fld id="{7C5E8F0A-222C-434A-A9CB-81E98982AC14}" type="datetimeFigureOut">
               <a:rPr lang="en-US" smtClean="0"/>
-              <a:t>6/27/2020</a:t>
+              <a:t>7/21/2020</a:t>
             </a:fld>
             <a:endParaRPr lang="en-US"/>
           </a:p>
@@ -16251,7 +16257,7 @@
           <a:p>
             <a:fld id="{7C5E8F0A-222C-434A-A9CB-81E98982AC14}" type="datetimeFigureOut">
               <a:rPr lang="en-US" smtClean="0"/>
-              <a:t>6/27/2020</a:t>
+              <a:t>7/21/2020</a:t>
             </a:fld>
             <a:endParaRPr lang="en-US"/>
           </a:p>
@@ -16533,7 +16539,7 @@
           <a:p>
             <a:fld id="{82715C42-EFF0-4BD6-921E-7CF21CC16B4C}" type="datetime1">
               <a:rPr lang="en-US" smtClean="0"/>
-              <a:t>6/27/2020</a:t>
+              <a:t>7/21/2020</a:t>
             </a:fld>
             <a:endParaRPr lang="en-US"/>
           </a:p>
@@ -17581,7 +17587,7 @@
           <a:p>
             <a:fld id="{7C5E8F0A-222C-434A-A9CB-81E98982AC14}" type="datetimeFigureOut">
               <a:rPr lang="en-US" smtClean="0"/>
-              <a:t>6/27/2020</a:t>
+              <a:t>7/21/2020</a:t>
             </a:fld>
             <a:endParaRPr lang="en-US"/>
           </a:p>
@@ -18689,7 +18695,7 @@
           <a:p>
             <a:fld id="{7C5E8F0A-222C-434A-A9CB-81E98982AC14}" type="datetimeFigureOut">
               <a:rPr lang="en-US" smtClean="0"/>
-              <a:t>6/27/2020</a:t>
+              <a:t>7/21/2020</a:t>
             </a:fld>
             <a:endParaRPr lang="en-US"/>
           </a:p>
@@ -19757,7 +19763,7 @@
           <a:p>
             <a:fld id="{D6E6FBFB-3ADF-48C9-9835-8BCF973CA717}" type="datetime1">
               <a:rPr lang="en-US" smtClean="0"/>
-              <a:t>6/27/2020</a:t>
+              <a:t>7/21/2020</a:t>
             </a:fld>
             <a:endParaRPr lang="en-US"/>
           </a:p>
@@ -20741,7 +20747,7 @@
           <a:p>
             <a:fld id="{D6E6FBFB-3ADF-48C9-9835-8BCF973CA717}" type="datetime1">
               <a:rPr lang="en-US" smtClean="0"/>
-              <a:t>6/27/2020</a:t>
+              <a:t>7/21/2020</a:t>
             </a:fld>
             <a:endParaRPr lang="en-US"/>
           </a:p>
@@ -21879,7 +21885,7 @@
           <a:p>
             <a:fld id="{D6E6FBFB-3ADF-48C9-9835-8BCF973CA717}" type="datetime1">
               <a:rPr lang="en-US" smtClean="0"/>
-              <a:t>6/27/2020</a:t>
+              <a:t>7/21/2020</a:t>
             </a:fld>
             <a:endParaRPr lang="en-US"/>
           </a:p>
@@ -22916,7 +22922,7 @@
           <a:p>
             <a:fld id="{D6E6FBFB-3ADF-48C9-9835-8BCF973CA717}" type="datetime1">
               <a:rPr lang="en-US" smtClean="0"/>
-              <a:t>6/27/2020</a:t>
+              <a:t>7/21/2020</a:t>
             </a:fld>
             <a:endParaRPr lang="en-US"/>
           </a:p>
@@ -23580,7 +23586,7 @@
           <a:p>
             <a:fld id="{D6E6FBFB-3ADF-48C9-9835-8BCF973CA717}" type="datetime1">
               <a:rPr lang="en-US" smtClean="0"/>
-              <a:t>6/27/2020</a:t>
+              <a:t>7/21/2020</a:t>
             </a:fld>
             <a:endParaRPr lang="en-US"/>
           </a:p>
@@ -24445,7 +24451,7 @@
           <a:p>
             <a:fld id="{D6E6FBFB-3ADF-48C9-9835-8BCF973CA717}" type="datetime1">
               <a:rPr lang="en-US" smtClean="0"/>
-              <a:t>6/27/2020</a:t>
+              <a:t>7/21/2020</a:t>
             </a:fld>
             <a:endParaRPr lang="en-US"/>
           </a:p>
@@ -24639,7 +24645,7 @@
           <a:p>
             <a:fld id="{7C5E8F0A-222C-434A-A9CB-81E98982AC14}" type="datetimeFigureOut">
               <a:rPr lang="en-US" smtClean="0"/>
-              <a:t>6/27/2020</a:t>
+              <a:t>7/21/2020</a:t>
             </a:fld>
             <a:endParaRPr lang="en-US"/>
           </a:p>
@@ -25611,7 +25617,7 @@
           <a:p>
             <a:fld id="{7C5E8F0A-222C-434A-A9CB-81E98982AC14}" type="datetimeFigureOut">
               <a:rPr lang="en-US" smtClean="0"/>
-              <a:t>6/27/2020</a:t>
+              <a:t>7/21/2020</a:t>
             </a:fld>
             <a:endParaRPr lang="en-US"/>
           </a:p>
@@ -25879,7 +25885,7 @@
           <a:p>
             <a:fld id="{6D9C9865-89F8-44B4-98D7-1566E04C14F6}" type="datetime1">
               <a:rPr lang="en-US" smtClean="0"/>
-              <a:t>6/27/2020</a:t>
+              <a:t>7/21/2020</a:t>
             </a:fld>
             <a:endParaRPr lang="en-US"/>
           </a:p>
@@ -26249,7 +26255,7 @@
           <a:p>
             <a:fld id="{7893C357-46F2-466D-9AE6-73C5CF911E13}" type="datetime1">
               <a:rPr lang="en-US" smtClean="0"/>
-              <a:t>6/27/2020</a:t>
+              <a:t>7/21/2020</a:t>
             </a:fld>
             <a:endParaRPr lang="en-US"/>
           </a:p>
@@ -26370,7 +26376,7 @@
           <a:p>
             <a:fld id="{96F7184E-8FBB-4A90-A48C-F739EEF98397}" type="datetime1">
               <a:rPr lang="en-US" smtClean="0"/>
-              <a:t>6/27/2020</a:t>
+              <a:t>7/21/2020</a:t>
             </a:fld>
             <a:endParaRPr lang="en-US"/>
           </a:p>
@@ -26468,7 +26474,7 @@
           <a:p>
             <a:fld id="{EDDB67B5-3846-4927-A9F0-442A7D99F3E4}" type="datetime1">
               <a:rPr lang="en-US" smtClean="0"/>
-              <a:t>6/27/2020</a:t>
+              <a:t>7/21/2020</a:t>
             </a:fld>
             <a:endParaRPr lang="en-US"/>
           </a:p>
@@ -26748,7 +26754,7 @@
           <a:p>
             <a:fld id="{56787DDA-DF4A-4ACC-B20A-6F4C48FE6014}" type="datetime1">
               <a:rPr lang="en-US" smtClean="0"/>
-              <a:t>6/27/2020</a:t>
+              <a:t>7/21/2020</a:t>
             </a:fld>
             <a:endParaRPr lang="en-US"/>
           </a:p>
@@ -27004,7 +27010,7 @@
           <a:p>
             <a:fld id="{211B2CB3-30DC-4A1C-B22B-6D912EB0C1DF}" type="datetime1">
               <a:rPr lang="en-US" smtClean="0"/>
-              <a:t>6/27/2020</a:t>
+              <a:t>7/21/2020</a:t>
             </a:fld>
             <a:endParaRPr lang="en-US"/>
           </a:p>
@@ -27115,7 +27121,7 @@
           <a:graphicData uri="http://schemas.openxmlformats.org/presentationml/2006/ole">
             <mc:AlternateContent xmlns:mc="http://schemas.openxmlformats.org/markup-compatibility/2006">
               <mc:Choice xmlns:v="urn:schemas-microsoft-com:vml" Requires="v">
-                <p:oleObj spid="_x0000_s1029" name="think-cell Folie" r:id="rId16" imgW="631" imgH="631" progId="TCLayout.ActiveDocument.1">
+                <p:oleObj spid="_x0000_s1032" name="think-cell Folie" r:id="rId16" imgW="631" imgH="631" progId="TCLayout.ActiveDocument.1">
                   <p:embed/>
                 </p:oleObj>
               </mc:Choice>
@@ -27329,7 +27335,7 @@
           <a:p>
             <a:fld id="{D6E6FBFB-3ADF-48C9-9835-8BCF973CA717}" type="datetime1">
               <a:rPr lang="en-US" smtClean="0"/>
-              <a:t>6/27/2020</a:t>
+              <a:t>7/21/2020</a:t>
             </a:fld>
             <a:endParaRPr lang="en-US"/>
           </a:p>
@@ -27768,7 +27774,7 @@
           <a:graphicData uri="http://schemas.openxmlformats.org/presentationml/2006/ole">
             <mc:AlternateContent xmlns:mc="http://schemas.openxmlformats.org/markup-compatibility/2006">
               <mc:Choice xmlns:v="urn:schemas-microsoft-com:vml" Requires="v">
-                <p:oleObj spid="_x0000_s2053" name="think-cell Folie" r:id="rId16" imgW="631" imgH="631" progId="TCLayout.ActiveDocument.1">
+                <p:oleObj spid="_x0000_s2056" name="think-cell Folie" r:id="rId16" imgW="631" imgH="631" progId="TCLayout.ActiveDocument.1">
                   <p:embed/>
                 </p:oleObj>
               </mc:Choice>
@@ -27982,7 +27988,7 @@
           <a:p>
             <a:fld id="{7C5E8F0A-222C-434A-A9CB-81E98982AC14}" type="datetimeFigureOut">
               <a:rPr lang="en-US" smtClean="0"/>
-              <a:t>6/27/2020</a:t>
+              <a:t>7/21/2020</a:t>
             </a:fld>
             <a:endParaRPr lang="en-US"/>
           </a:p>
@@ -28417,7 +28423,7 @@
           <a:graphicData uri="http://schemas.openxmlformats.org/presentationml/2006/ole">
             <mc:AlternateContent xmlns:mc="http://schemas.openxmlformats.org/markup-compatibility/2006">
               <mc:Choice xmlns:v="urn:schemas-microsoft-com:vml" Requires="v">
-                <p:oleObj spid="_x0000_s3077" name="think-cell Folie" r:id="rId22" imgW="631" imgH="631" progId="TCLayout.ActiveDocument.1">
+                <p:oleObj spid="_x0000_s3080" name="think-cell Folie" r:id="rId22" imgW="631" imgH="631" progId="TCLayout.ActiveDocument.1">
                   <p:embed/>
                 </p:oleObj>
               </mc:Choice>
@@ -29379,7 +29385,7 @@
           <a:p>
             <a:fld id="{D6E6FBFB-3ADF-48C9-9835-8BCF973CA717}" type="datetime1">
               <a:rPr lang="en-US" smtClean="0"/>
-              <a:t>6/27/2020</a:t>
+              <a:t>7/21/2020</a:t>
             </a:fld>
             <a:endParaRPr lang="en-US"/>
           </a:p>
@@ -29974,7 +29980,7 @@
           <a:graphicData uri="http://schemas.openxmlformats.org/presentationml/2006/ole">
             <mc:AlternateContent xmlns:mc="http://schemas.openxmlformats.org/markup-compatibility/2006">
               <mc:Choice xmlns:v="urn:schemas-microsoft-com:vml" Requires="v">
-                <p:oleObj spid="_x0000_s4101" name="think-cell Folie" r:id="rId7" imgW="631" imgH="631" progId="TCLayout.ActiveDocument.1">
+                <p:oleObj spid="_x0000_s4104" name="think-cell Folie" r:id="rId7" imgW="631" imgH="631" progId="TCLayout.ActiveDocument.1">
                   <p:embed/>
                 </p:oleObj>
               </mc:Choice>
@@ -30113,7 +30119,7 @@
           <a:p>
             <a:fld id="{96F7184E-8FBB-4A90-A48C-F739EEF98397}" type="datetime1">
               <a:rPr lang="en-US" smtClean="0"/>
-              <a:t>6/27/2020</a:t>
+              <a:t>7/21/2020</a:t>
             </a:fld>
             <a:endParaRPr lang="en-US"/>
           </a:p>
@@ -30451,11 +30457,11 @@
   <p:clrMapOvr>
     <a:masterClrMapping/>
   </p:clrMapOvr>
-  <mc:AlternateContent xmlns:mc="http://schemas.openxmlformats.org/markup-compatibility/2006">
-    <mc:Choice xmlns:p14="http://schemas.microsoft.com/office/powerpoint/2010/main" Requires="p14">
+  <mc:AlternateContent xmlns:mc="http://schemas.openxmlformats.org/markup-compatibility/2006" xmlns:p14="http://schemas.microsoft.com/office/powerpoint/2010/main">
+    <mc:Choice Requires="p14">
       <p:transition spd="slow" p14:dur="2000"/>
     </mc:Choice>
-    <mc:Fallback>
+    <mc:Fallback xmlns="">
       <p:transition spd="slow"/>
     </mc:Fallback>
   </mc:AlternateContent>
@@ -30504,7 +30510,7 @@
           <a:graphicData uri="http://schemas.openxmlformats.org/presentationml/2006/ole">
             <mc:AlternateContent xmlns:mc="http://schemas.openxmlformats.org/markup-compatibility/2006">
               <mc:Choice xmlns:v="urn:schemas-microsoft-com:vml" Requires="v">
-                <p:oleObj spid="_x0000_s13324" name="think-cell Folie" r:id="rId7" imgW="631" imgH="631" progId="TCLayout.ActiveDocument.1">
+                <p:oleObj spid="_x0000_s13336" name="think-cell Folie" r:id="rId7" imgW="631" imgH="631" progId="TCLayout.ActiveDocument.1">
                   <p:embed/>
                 </p:oleObj>
               </mc:Choice>
@@ -30585,7 +30591,7 @@
           <a:p>
             <a:fld id="{96F7184E-8FBB-4A90-A48C-F739EEF98397}" type="datetime1">
               <a:rPr lang="en-US" smtClean="0"/>
-              <a:t>6/27/2020</a:t>
+              <a:t>7/21/2020</a:t>
             </a:fld>
             <a:endParaRPr lang="en-US"/>
           </a:p>
@@ -32348,7 +32354,7 @@
           <a:graphicData uri="http://schemas.openxmlformats.org/presentationml/2006/ole">
             <mc:AlternateContent xmlns:mc="http://schemas.openxmlformats.org/markup-compatibility/2006">
               <mc:Choice xmlns:v="urn:schemas-microsoft-com:vml" Requires="v">
-                <p:oleObj spid="_x0000_s13325" name="Arbeitsblatt" r:id="rId18" imgW="7932297" imgH="5493967" progId="Excel.Sheet.12">
+                <p:oleObj spid="_x0000_s13337" name="Arbeitsblatt" r:id="rId18" imgW="7932297" imgH="5493967" progId="Excel.Sheet.12">
                   <p:embed/>
                 </p:oleObj>
               </mc:Choice>
@@ -32643,7 +32649,7 @@
                 <a14:useLocalDpi xmlns:a14="http://schemas.microsoft.com/office/drawing/2010/main" val="0"/>
               </a:ext>
               <a:ext uri="{96DAC541-7B7A-43D3-8B79-37D633B846F1}">
-                <asvg:svgBlip xmlns:asvg="http://schemas.microsoft.com/office/drawing/2016/SVG/main" xmlns="" r:embed="rId23"/>
+                <asvg:svgBlip xmlns="" xmlns:asvg="http://schemas.microsoft.com/office/drawing/2016/SVG/main" r:embed="rId23"/>
               </a:ext>
             </a:extLst>
           </a:blip>
@@ -32683,7 +32689,7 @@
           <a:graphicData uri="http://schemas.openxmlformats.org/presentationml/2006/ole">
             <mc:AlternateContent xmlns:mc="http://schemas.openxmlformats.org/markup-compatibility/2006">
               <mc:Choice xmlns:v="urn:schemas-microsoft-com:vml" Requires="v">
-                <p:oleObj spid="_x0000_s13327" name="Arbeitsblatt" r:id="rId24" imgW="2385055" imgH="921967" progId="Excel.Sheet.12">
+                <p:oleObj spid="_x0000_s13338" name="Arbeitsblatt" r:id="rId24" imgW="2385055" imgH="921967" progId="Excel.Sheet.12">
                   <p:link updateAutomatic="1"/>
                 </p:oleObj>
               </mc:Choice>
@@ -32722,10 +32728,10 @@
     <p:controls>
       <mc:AlternateContent xmlns:mc="http://schemas.openxmlformats.org/markup-compatibility/2006">
         <mc:Choice xmlns:v="urn:schemas-microsoft-com:vml" Requires="v">
-          <p:control spid="13326" name="CheckBox1" r:id="rId5" imgW="1325880" imgH="312480"/>
+          <p:control spid="13339" name="CheckBox1" r:id="rId5" imgW="1327320" imgH="311040"/>
         </mc:Choice>
         <mc:Fallback>
-          <p:control name="CheckBox1" r:id="rId5" imgW="1325880" imgH="312480">
+          <p:control name="CheckBox1" r:id="rId5" imgW="1327320" imgH="311040">
             <p:pic>
               <p:nvPicPr>
                 <p:cNvPr id="58" name="CheckBox1"/>
@@ -32895,7 +32901,7 @@
           <a:graphicData uri="http://schemas.openxmlformats.org/presentationml/2006/ole">
             <mc:AlternateContent xmlns:mc="http://schemas.openxmlformats.org/markup-compatibility/2006">
               <mc:Choice xmlns:v="urn:schemas-microsoft-com:vml" Requires="v">
-                <p:oleObj spid="_x0000_s14341" name="think-cell Folie" r:id="rId5" imgW="631" imgH="631" progId="TCLayout.ActiveDocument.1">
+                <p:oleObj spid="_x0000_s14344" name="think-cell Folie" r:id="rId5" imgW="631" imgH="631" progId="TCLayout.ActiveDocument.1">
                   <p:embed/>
                 </p:oleObj>
               </mc:Choice>
@@ -33018,7 +33024,7 @@
           <a:p>
             <a:fld id="{96F7184E-8FBB-4A90-A48C-F739EEF98397}" type="datetime1">
               <a:rPr lang="en-US" smtClean="0"/>
-              <a:t>6/27/2020</a:t>
+              <a:t>7/21/2020</a:t>
             </a:fld>
             <a:endParaRPr lang="en-US"/>
           </a:p>
@@ -39597,7 +39603,7 @@
           <a:graphicData uri="http://schemas.openxmlformats.org/presentationml/2006/ole">
             <mc:AlternateContent xmlns:mc="http://schemas.openxmlformats.org/markup-compatibility/2006">
               <mc:Choice xmlns:v="urn:schemas-microsoft-com:vml" Requires="v">
-                <p:oleObj spid="_x0000_s15365" name="think-cell Folie" r:id="rId8" imgW="631" imgH="631" progId="TCLayout.ActiveDocument.1">
+                <p:oleObj spid="_x0000_s15368" name="think-cell Folie" r:id="rId8" imgW="631" imgH="631" progId="TCLayout.ActiveDocument.1">
                   <p:embed/>
                 </p:oleObj>
               </mc:Choice>
@@ -39736,7 +39742,7 @@
           <a:p>
             <a:fld id="{96F7184E-8FBB-4A90-A48C-F739EEF98397}" type="datetime1">
               <a:rPr lang="en-US" smtClean="0"/>
-              <a:t>6/27/2020</a:t>
+              <a:t>7/21/2020</a:t>
             </a:fld>
             <a:endParaRPr lang="en-US"/>
           </a:p>
@@ -40098,7 +40104,7 @@
           <a:graphicData uri="http://schemas.openxmlformats.org/presentationml/2006/ole">
             <mc:AlternateContent xmlns:mc="http://schemas.openxmlformats.org/markup-compatibility/2006">
               <mc:Choice xmlns:v="urn:schemas-microsoft-com:vml" Requires="v">
-                <p:oleObj spid="_x0000_s16389" name="think-cell Folie" r:id="rId5" imgW="631" imgH="631" progId="TCLayout.ActiveDocument.1">
+                <p:oleObj spid="_x0000_s16392" name="think-cell Folie" r:id="rId5" imgW="631" imgH="631" progId="TCLayout.ActiveDocument.1">
                   <p:embed/>
                 </p:oleObj>
               </mc:Choice>
@@ -40202,7 +40208,7 @@
           <a:p>
             <a:fld id="{7BF11529-3654-4A67-A2AD-66BEEB4BB311}" type="datetime1">
               <a:rPr lang="en-US" smtClean="0"/>
-              <a:t>6/27/2020</a:t>
+              <a:t>7/21/2020</a:t>
             </a:fld>
             <a:endParaRPr lang="en-US" dirty="0"/>
           </a:p>
@@ -40336,7 +40342,7 @@
           <a:graphicData uri="http://schemas.openxmlformats.org/presentationml/2006/ole">
             <mc:AlternateContent xmlns:mc="http://schemas.openxmlformats.org/markup-compatibility/2006">
               <mc:Choice xmlns:v="urn:schemas-microsoft-com:vml" Requires="v">
-                <p:oleObj spid="_x0000_s17413" name="think-cell Folie" r:id="rId4" imgW="631" imgH="631" progId="TCLayout.ActiveDocument.1">
+                <p:oleObj spid="_x0000_s17416" name="think-cell Folie" r:id="rId4" imgW="631" imgH="631" progId="TCLayout.ActiveDocument.1">
                   <p:embed/>
                 </p:oleObj>
               </mc:Choice>
@@ -40668,7 +40674,7 @@
           <a:p>
             <a:fld id="{BD2C1721-0C70-4121-8255-041FC08D13BE}" type="datetime1">
               <a:rPr lang="en-US" smtClean="0"/>
-              <a:t>6/27/2020</a:t>
+              <a:t>7/21/2020</a:t>
             </a:fld>
             <a:endParaRPr lang="en-US" dirty="0"/>
           </a:p>
@@ -40774,7 +40780,7 @@
           <a:graphicData uri="http://schemas.openxmlformats.org/presentationml/2006/ole">
             <mc:AlternateContent xmlns:mc="http://schemas.openxmlformats.org/markup-compatibility/2006">
               <mc:Choice xmlns:v="urn:schemas-microsoft-com:vml" Requires="v">
-                <p:oleObj spid="_x0000_s18437" name="think-cell Folie" r:id="rId4" imgW="631" imgH="631" progId="TCLayout.ActiveDocument.1">
+                <p:oleObj spid="_x0000_s18440" name="think-cell Folie" r:id="rId4" imgW="631" imgH="631" progId="TCLayout.ActiveDocument.1">
                   <p:embed/>
                 </p:oleObj>
               </mc:Choice>
@@ -41342,7 +41348,7 @@
           <a:p>
             <a:fld id="{685A0DB2-E4EC-4ECA-BF1E-13928BA91C1E}" type="datetime1">
               <a:rPr lang="en-US" smtClean="0"/>
-              <a:t>6/27/2020</a:t>
+              <a:t>7/21/2020</a:t>
             </a:fld>
             <a:endParaRPr lang="en-US" dirty="0"/>
           </a:p>
@@ -41512,7 +41518,7 @@
           <a:graphicData uri="http://schemas.openxmlformats.org/presentationml/2006/ole">
             <mc:AlternateContent xmlns:mc="http://schemas.openxmlformats.org/markup-compatibility/2006">
               <mc:Choice xmlns:v="urn:schemas-microsoft-com:vml" Requires="v">
-                <p:oleObj spid="_x0000_s19461" name="think-cell Folie" r:id="rId8" imgW="631" imgH="631" progId="TCLayout.ActiveDocument.1">
+                <p:oleObj spid="_x0000_s19464" name="think-cell Folie" r:id="rId8" imgW="631" imgH="631" progId="TCLayout.ActiveDocument.1">
                   <p:embed/>
                 </p:oleObj>
               </mc:Choice>
@@ -41651,7 +41657,7 @@
           <a:p>
             <a:fld id="{96F7184E-8FBB-4A90-A48C-F739EEF98397}" type="datetime1">
               <a:rPr lang="en-US" smtClean="0"/>
-              <a:t>6/27/2020</a:t>
+              <a:t>7/21/2020</a:t>
             </a:fld>
             <a:endParaRPr lang="en-US"/>
           </a:p>
@@ -42013,7 +42019,7 @@
           <a:graphicData uri="http://schemas.openxmlformats.org/presentationml/2006/ole">
             <mc:AlternateContent xmlns:mc="http://schemas.openxmlformats.org/markup-compatibility/2006">
               <mc:Choice xmlns:v="urn:schemas-microsoft-com:vml" Requires="v">
-                <p:oleObj spid="_x0000_s20485" name="think-cell Folie" r:id="rId5" imgW="631" imgH="631" progId="TCLayout.ActiveDocument.1">
+                <p:oleObj spid="_x0000_s20488" name="think-cell Folie" r:id="rId5" imgW="631" imgH="631" progId="TCLayout.ActiveDocument.1">
                   <p:embed/>
                 </p:oleObj>
               </mc:Choice>
@@ -42342,7 +42348,7 @@
           <a:p>
             <a:fld id="{DCE39F82-C8B2-4430-ADB5-DCC3FC9E3AF4}" type="datetime1">
               <a:rPr lang="en-US" smtClean="0"/>
-              <a:t>6/27/2020</a:t>
+              <a:t>7/21/2020</a:t>
             </a:fld>
             <a:endParaRPr lang="en-US" dirty="0"/>
           </a:p>
@@ -42448,7 +42454,7 @@
           <a:graphicData uri="http://schemas.openxmlformats.org/presentationml/2006/ole">
             <mc:AlternateContent xmlns:mc="http://schemas.openxmlformats.org/markup-compatibility/2006">
               <mc:Choice xmlns:v="urn:schemas-microsoft-com:vml" Requires="v">
-                <p:oleObj spid="_x0000_s21509" name="think-cell Folie" r:id="rId5" imgW="631" imgH="631" progId="TCLayout.ActiveDocument.1">
+                <p:oleObj spid="_x0000_s21512" name="think-cell Folie" r:id="rId5" imgW="631" imgH="631" progId="TCLayout.ActiveDocument.1">
                   <p:embed/>
                 </p:oleObj>
               </mc:Choice>
@@ -42602,7 +42608,7 @@
           <a:p>
             <a:fld id="{48586C47-CAF2-4D5E-A754-C754B93A9936}" type="datetime1">
               <a:rPr lang="en-US" smtClean="0"/>
-              <a:t>6/27/2020</a:t>
+              <a:t>7/21/2020</a:t>
             </a:fld>
             <a:endParaRPr lang="en-US" dirty="0"/>
           </a:p>
@@ -42772,7 +42778,7 @@
           <a:graphicData uri="http://schemas.openxmlformats.org/presentationml/2006/ole">
             <mc:AlternateContent xmlns:mc="http://schemas.openxmlformats.org/markup-compatibility/2006">
               <mc:Choice xmlns:v="urn:schemas-microsoft-com:vml" Requires="v">
-                <p:oleObj spid="_x0000_s22533" name="think-cell Folie" r:id="rId8" imgW="631" imgH="631" progId="TCLayout.ActiveDocument.1">
+                <p:oleObj spid="_x0000_s22536" name="think-cell Folie" r:id="rId8" imgW="631" imgH="631" progId="TCLayout.ActiveDocument.1">
                   <p:embed/>
                 </p:oleObj>
               </mc:Choice>
@@ -42911,7 +42917,7 @@
           <a:p>
             <a:fld id="{96F7184E-8FBB-4A90-A48C-F739EEF98397}" type="datetime1">
               <a:rPr lang="en-US" smtClean="0"/>
-              <a:t>6/27/2020</a:t>
+              <a:t>7/21/2020</a:t>
             </a:fld>
             <a:endParaRPr lang="en-US"/>
           </a:p>
@@ -43337,7 +43343,7 @@
           <a:graphicData uri="http://schemas.openxmlformats.org/presentationml/2006/ole">
             <mc:AlternateContent xmlns:mc="http://schemas.openxmlformats.org/markup-compatibility/2006">
               <mc:Choice xmlns:v="urn:schemas-microsoft-com:vml" Requires="v">
-                <p:oleObj spid="_x0000_s5125" name="think-cell Folie" r:id="rId8" imgW="631" imgH="631" progId="TCLayout.ActiveDocument.1">
+                <p:oleObj spid="_x0000_s5128" name="think-cell Folie" r:id="rId8" imgW="631" imgH="631" progId="TCLayout.ActiveDocument.1">
                   <p:embed/>
                 </p:oleObj>
               </mc:Choice>
@@ -43476,7 +43482,7 @@
           <a:p>
             <a:fld id="{96F7184E-8FBB-4A90-A48C-F739EEF98397}" type="datetime1">
               <a:rPr lang="en-US" smtClean="0"/>
-              <a:t>6/27/2020</a:t>
+              <a:t>7/21/2020</a:t>
             </a:fld>
             <a:endParaRPr lang="en-US"/>
           </a:p>
@@ -43838,7 +43844,7 @@
           <a:graphicData uri="http://schemas.openxmlformats.org/presentationml/2006/ole">
             <mc:AlternateContent xmlns:mc="http://schemas.openxmlformats.org/markup-compatibility/2006">
               <mc:Choice xmlns:v="urn:schemas-microsoft-com:vml" Requires="v">
-                <p:oleObj spid="_x0000_s23557" name="think-cell Folie" r:id="rId5" imgW="631" imgH="631" progId="TCLayout.ActiveDocument.1">
+                <p:oleObj spid="_x0000_s23560" name="think-cell Folie" r:id="rId5" imgW="631" imgH="631" progId="TCLayout.ActiveDocument.1">
                   <p:embed/>
                 </p:oleObj>
               </mc:Choice>
@@ -44144,7 +44150,7 @@
           <a:p>
             <a:fld id="{2D8DD609-9492-45C6-B115-851EE4D74A27}" type="datetime1">
               <a:rPr lang="en-US" smtClean="0"/>
-              <a:t>6/27/2020</a:t>
+              <a:t>7/21/2020</a:t>
             </a:fld>
             <a:endParaRPr lang="en-US"/>
           </a:p>
@@ -45328,7 +45334,7 @@
           <a:p>
             <a:fld id="{96F7184E-8FBB-4A90-A48C-F739EEF98397}" type="datetime1">
               <a:rPr lang="en-US" smtClean="0"/>
-              <a:t>6/27/2020</a:t>
+              <a:t>7/21/2020</a:t>
             </a:fld>
             <a:endParaRPr lang="en-US"/>
           </a:p>
@@ -45432,6 +45438,649 @@
 </p:sld>
 </file>
 
+<file path=ppt/slides/slide22.xml><?xml version="1.0" encoding="utf-8"?>
+<p:sld xmlns:a="http://schemas.openxmlformats.org/drawingml/2006/main" xmlns:r="http://schemas.openxmlformats.org/officeDocument/2006/relationships" xmlns:p="http://schemas.openxmlformats.org/presentationml/2006/main">
+  <p:cSld>
+    <p:spTree>
+      <p:nvGrpSpPr>
+        <p:cNvPr id="1" name=""/>
+        <p:cNvGrpSpPr/>
+        <p:nvPr/>
+      </p:nvGrpSpPr>
+      <p:grpSpPr>
+        <a:xfrm>
+          <a:off x="0" y="0"/>
+          <a:ext cx="0" cy="0"/>
+          <a:chOff x="0" y="0"/>
+          <a:chExt cx="0" cy="0"/>
+        </a:xfrm>
+      </p:grpSpPr>
+      <p:graphicFrame>
+        <p:nvGraphicFramePr>
+          <p:cNvPr id="6" name="Objekt 5" hidden="1"/>
+          <p:cNvGraphicFramePr>
+            <a:graphicFrameLocks noChangeAspect="1"/>
+          </p:cNvGraphicFramePr>
+          <p:nvPr>
+            <p:custDataLst>
+              <p:tags r:id="rId2"/>
+            </p:custDataLst>
+            <p:extLst>
+              <p:ext uri="{D42A27DB-BD31-4B8C-83A1-F6EECF244321}">
+                <p14:modId xmlns:p14="http://schemas.microsoft.com/office/powerpoint/2010/main" val="3484265710"/>
+              </p:ext>
+            </p:extLst>
+          </p:nvPr>
+        </p:nvGraphicFramePr>
+        <p:xfrm>
+          <a:off x="1588" y="1588"/>
+          <a:ext cx="1588" cy="1588"/>
+        </p:xfrm>
+        <a:graphic>
+          <a:graphicData uri="http://schemas.openxmlformats.org/presentationml/2006/ole">
+            <mc:AlternateContent xmlns:mc="http://schemas.openxmlformats.org/markup-compatibility/2006">
+              <mc:Choice xmlns:v="urn:schemas-microsoft-com:vml" Requires="v">
+                <p:oleObj spid="_x0000_s24580" name="think-cell Folie" r:id="rId4" imgW="526" imgH="526" progId="TCLayout.ActiveDocument.1">
+                  <p:embed/>
+                </p:oleObj>
+              </mc:Choice>
+              <mc:Fallback>
+                <p:oleObj name="think-cell Folie" r:id="rId4" imgW="526" imgH="526" progId="TCLayout.ActiveDocument.1">
+                  <p:embed/>
+                  <p:pic>
+                    <p:nvPicPr>
+                      <p:cNvPr id="0" name=""/>
+                      <p:cNvPicPr/>
+                      <p:nvPr/>
+                    </p:nvPicPr>
+                    <p:blipFill>
+                      <a:blip r:embed="rId5"/>
+                      <a:stretch>
+                        <a:fillRect/>
+                      </a:stretch>
+                    </p:blipFill>
+                    <p:spPr>
+                      <a:xfrm>
+                        <a:off x="1588" y="1588"/>
+                        <a:ext cx="1588" cy="1588"/>
+                      </a:xfrm>
+                      <a:prstGeom prst="rect">
+                        <a:avLst/>
+                      </a:prstGeom>
+                    </p:spPr>
+                  </p:pic>
+                </p:oleObj>
+              </mc:Fallback>
+            </mc:AlternateContent>
+          </a:graphicData>
+        </a:graphic>
+      </p:graphicFrame>
+      <p:sp>
+        <p:nvSpPr>
+          <p:cNvPr id="3" name="Datumsplatzhalter 2"/>
+          <p:cNvSpPr>
+            <a:spLocks noGrp="1"/>
+          </p:cNvSpPr>
+          <p:nvPr>
+            <p:ph type="dt" sz="half" idx="10"/>
+          </p:nvPr>
+        </p:nvSpPr>
+        <p:spPr/>
+        <p:txBody>
+          <a:bodyPr/>
+          <a:lstStyle/>
+          <a:p>
+            <a:fld id="{96F7184E-8FBB-4A90-A48C-F739EEF98397}" type="datetime1">
+              <a:rPr lang="en-US" smtClean="0"/>
+              <a:t>7/21/2020</a:t>
+            </a:fld>
+            <a:endParaRPr lang="en-US"/>
+          </a:p>
+        </p:txBody>
+      </p:sp>
+      <p:sp>
+        <p:nvSpPr>
+          <p:cNvPr id="4" name="Fußzeilenplatzhalter 3"/>
+          <p:cNvSpPr>
+            <a:spLocks noGrp="1"/>
+          </p:cNvSpPr>
+          <p:nvPr>
+            <p:ph type="ftr" sz="quarter" idx="11"/>
+          </p:nvPr>
+        </p:nvSpPr>
+        <p:spPr/>
+        <p:txBody>
+          <a:bodyPr/>
+          <a:lstStyle/>
+          <a:p>
+            <a:r>
+              <a:rPr lang="en-US" smtClean="0"/>
+              <a:t>Test</a:t>
+            </a:r>
+            <a:endParaRPr lang="en-US"/>
+          </a:p>
+        </p:txBody>
+      </p:sp>
+      <p:sp>
+        <p:nvSpPr>
+          <p:cNvPr id="5" name="Foliennummernplatzhalter 4"/>
+          <p:cNvSpPr>
+            <a:spLocks noGrp="1"/>
+          </p:cNvSpPr>
+          <p:nvPr>
+            <p:ph type="sldNum" sz="quarter" idx="12"/>
+          </p:nvPr>
+        </p:nvSpPr>
+        <p:spPr/>
+        <p:txBody>
+          <a:bodyPr/>
+          <a:lstStyle/>
+          <a:p>
+            <a:fld id="{0698A7DB-5DF1-49E6-AE67-8A85ED6DF7ED}" type="slidenum">
+              <a:rPr lang="en-US" smtClean="0"/>
+              <a:t>22</a:t>
+            </a:fld>
+            <a:endParaRPr lang="en-US"/>
+          </a:p>
+        </p:txBody>
+      </p:sp>
+      <p:sp>
+        <p:nvSpPr>
+          <p:cNvPr id="7" name="Rechteck 6"/>
+          <p:cNvSpPr>
+            <a:spLocks noChangeAspect="1"/>
+          </p:cNvSpPr>
+          <p:nvPr/>
+        </p:nvSpPr>
+        <p:spPr>
+          <a:xfrm>
+            <a:off x="360000" y="360000"/>
+            <a:ext cx="720000" cy="720000"/>
+          </a:xfrm>
+          <a:prstGeom prst="rect">
+            <a:avLst/>
+          </a:prstGeom>
+        </p:spPr>
+        <p:style>
+          <a:lnRef idx="2">
+            <a:schemeClr val="accent1">
+              <a:shade val="50000"/>
+            </a:schemeClr>
+          </a:lnRef>
+          <a:fillRef idx="1">
+            <a:schemeClr val="accent1"/>
+          </a:fillRef>
+          <a:effectRef idx="0">
+            <a:schemeClr val="accent1"/>
+          </a:effectRef>
+          <a:fontRef idx="minor">
+            <a:schemeClr val="lt1"/>
+          </a:fontRef>
+        </p:style>
+        <p:txBody>
+          <a:bodyPr rtlCol="0" anchor="ctr"/>
+          <a:lstStyle/>
+          <a:p>
+            <a:pPr algn="ctr"/>
+            <a:endParaRPr lang="en-US"/>
+          </a:p>
+        </p:txBody>
+      </p:sp>
+      <p:sp>
+        <p:nvSpPr>
+          <p:cNvPr id="8" name="Rechteck 7"/>
+          <p:cNvSpPr>
+            <a:spLocks noChangeAspect="1"/>
+          </p:cNvSpPr>
+          <p:nvPr/>
+        </p:nvSpPr>
+        <p:spPr>
+          <a:xfrm>
+            <a:off x="1440000" y="360000"/>
+            <a:ext cx="720000" cy="720000"/>
+          </a:xfrm>
+          <a:prstGeom prst="rect">
+            <a:avLst/>
+          </a:prstGeom>
+        </p:spPr>
+        <p:style>
+          <a:lnRef idx="2">
+            <a:schemeClr val="accent1">
+              <a:shade val="50000"/>
+            </a:schemeClr>
+          </a:lnRef>
+          <a:fillRef idx="1">
+            <a:schemeClr val="accent1"/>
+          </a:fillRef>
+          <a:effectRef idx="0">
+            <a:schemeClr val="accent1"/>
+          </a:effectRef>
+          <a:fontRef idx="minor">
+            <a:schemeClr val="lt1"/>
+          </a:fontRef>
+        </p:style>
+        <p:txBody>
+          <a:bodyPr rtlCol="0" anchor="ctr"/>
+          <a:lstStyle/>
+          <a:p>
+            <a:pPr algn="ctr"/>
+            <a:endParaRPr lang="en-US"/>
+          </a:p>
+        </p:txBody>
+      </p:sp>
+      <p:sp>
+        <p:nvSpPr>
+          <p:cNvPr id="9" name="Rechteck 8"/>
+          <p:cNvSpPr>
+            <a:spLocks noChangeAspect="1"/>
+          </p:cNvSpPr>
+          <p:nvPr/>
+        </p:nvSpPr>
+        <p:spPr>
+          <a:xfrm>
+            <a:off x="360000" y="1440000"/>
+            <a:ext cx="720000" cy="720000"/>
+          </a:xfrm>
+          <a:prstGeom prst="rect">
+            <a:avLst/>
+          </a:prstGeom>
+        </p:spPr>
+        <p:style>
+          <a:lnRef idx="2">
+            <a:schemeClr val="accent1">
+              <a:shade val="50000"/>
+            </a:schemeClr>
+          </a:lnRef>
+          <a:fillRef idx="1">
+            <a:schemeClr val="accent1"/>
+          </a:fillRef>
+          <a:effectRef idx="0">
+            <a:schemeClr val="accent1"/>
+          </a:effectRef>
+          <a:fontRef idx="minor">
+            <a:schemeClr val="lt1"/>
+          </a:fontRef>
+        </p:style>
+        <p:txBody>
+          <a:bodyPr rtlCol="0" anchor="ctr"/>
+          <a:lstStyle/>
+          <a:p>
+            <a:pPr algn="ctr"/>
+            <a:endParaRPr lang="en-US"/>
+          </a:p>
+        </p:txBody>
+      </p:sp>
+      <p:sp>
+        <p:nvSpPr>
+          <p:cNvPr id="10" name="Rechteck 9"/>
+          <p:cNvSpPr>
+            <a:spLocks noChangeAspect="1"/>
+          </p:cNvSpPr>
+          <p:nvPr/>
+        </p:nvSpPr>
+        <p:spPr>
+          <a:xfrm>
+            <a:off x="1440000" y="1440000"/>
+            <a:ext cx="720000" cy="720000"/>
+          </a:xfrm>
+          <a:prstGeom prst="rect">
+            <a:avLst/>
+          </a:prstGeom>
+        </p:spPr>
+        <p:style>
+          <a:lnRef idx="2">
+            <a:schemeClr val="accent1">
+              <a:shade val="50000"/>
+            </a:schemeClr>
+          </a:lnRef>
+          <a:fillRef idx="1">
+            <a:schemeClr val="accent1"/>
+          </a:fillRef>
+          <a:effectRef idx="0">
+            <a:schemeClr val="accent1"/>
+          </a:effectRef>
+          <a:fontRef idx="minor">
+            <a:schemeClr val="lt1"/>
+          </a:fontRef>
+        </p:style>
+        <p:txBody>
+          <a:bodyPr rtlCol="0" anchor="ctr"/>
+          <a:lstStyle/>
+          <a:p>
+            <a:pPr algn="ctr"/>
+            <a:endParaRPr lang="en-US"/>
+          </a:p>
+        </p:txBody>
+      </p:sp>
+      <p:sp>
+        <p:nvSpPr>
+          <p:cNvPr id="11" name="Rechteck 10"/>
+          <p:cNvSpPr>
+            <a:spLocks noChangeAspect="1"/>
+          </p:cNvSpPr>
+          <p:nvPr/>
+        </p:nvSpPr>
+        <p:spPr>
+          <a:xfrm>
+            <a:off x="360000" y="2520000"/>
+            <a:ext cx="720000" cy="720000"/>
+          </a:xfrm>
+          <a:prstGeom prst="rect">
+            <a:avLst/>
+          </a:prstGeom>
+        </p:spPr>
+        <p:style>
+          <a:lnRef idx="2">
+            <a:schemeClr val="accent1">
+              <a:shade val="50000"/>
+            </a:schemeClr>
+          </a:lnRef>
+          <a:fillRef idx="1">
+            <a:schemeClr val="accent1"/>
+          </a:fillRef>
+          <a:effectRef idx="0">
+            <a:schemeClr val="accent1"/>
+          </a:effectRef>
+          <a:fontRef idx="minor">
+            <a:schemeClr val="lt1"/>
+          </a:fontRef>
+        </p:style>
+        <p:txBody>
+          <a:bodyPr rtlCol="0" anchor="ctr"/>
+          <a:lstStyle/>
+          <a:p>
+            <a:pPr algn="ctr"/>
+            <a:endParaRPr lang="en-US"/>
+          </a:p>
+        </p:txBody>
+      </p:sp>
+      <p:sp>
+        <p:nvSpPr>
+          <p:cNvPr id="12" name="Rechteck 11"/>
+          <p:cNvSpPr>
+            <a:spLocks noChangeAspect="1"/>
+          </p:cNvSpPr>
+          <p:nvPr/>
+        </p:nvSpPr>
+        <p:spPr>
+          <a:xfrm>
+            <a:off x="1440000" y="2520000"/>
+            <a:ext cx="720000" cy="720000"/>
+          </a:xfrm>
+          <a:prstGeom prst="rect">
+            <a:avLst/>
+          </a:prstGeom>
+        </p:spPr>
+        <p:style>
+          <a:lnRef idx="2">
+            <a:schemeClr val="accent1">
+              <a:shade val="50000"/>
+            </a:schemeClr>
+          </a:lnRef>
+          <a:fillRef idx="1">
+            <a:schemeClr val="accent1"/>
+          </a:fillRef>
+          <a:effectRef idx="0">
+            <a:schemeClr val="accent1"/>
+          </a:effectRef>
+          <a:fontRef idx="minor">
+            <a:schemeClr val="lt1"/>
+          </a:fontRef>
+        </p:style>
+        <p:txBody>
+          <a:bodyPr rtlCol="0" anchor="ctr"/>
+          <a:lstStyle/>
+          <a:p>
+            <a:pPr algn="ctr"/>
+            <a:endParaRPr lang="en-US"/>
+          </a:p>
+        </p:txBody>
+      </p:sp>
+      <p:sp>
+        <p:nvSpPr>
+          <p:cNvPr id="14" name="Rechteck 13"/>
+          <p:cNvSpPr>
+            <a:spLocks/>
+          </p:cNvSpPr>
+          <p:nvPr/>
+        </p:nvSpPr>
+        <p:spPr>
+          <a:xfrm>
+            <a:off x="4038600" y="550175"/>
+            <a:ext cx="792000" cy="720000"/>
+          </a:xfrm>
+          <a:prstGeom prst="rect">
+            <a:avLst/>
+          </a:prstGeom>
+          <a:solidFill>
+            <a:schemeClr val="accent2"/>
+          </a:solidFill>
+        </p:spPr>
+        <p:style>
+          <a:lnRef idx="2">
+            <a:schemeClr val="accent1">
+              <a:shade val="50000"/>
+            </a:schemeClr>
+          </a:lnRef>
+          <a:fillRef idx="1">
+            <a:schemeClr val="accent1"/>
+          </a:fillRef>
+          <a:effectRef idx="0">
+            <a:schemeClr val="accent1"/>
+          </a:effectRef>
+          <a:fontRef idx="minor">
+            <a:schemeClr val="lt1"/>
+          </a:fontRef>
+        </p:style>
+        <p:txBody>
+          <a:bodyPr rtlCol="0" anchor="ctr"/>
+          <a:lstStyle/>
+          <a:p>
+            <a:pPr algn="ctr"/>
+            <a:endParaRPr lang="en-US"/>
+          </a:p>
+        </p:txBody>
+      </p:sp>
+      <p:sp>
+        <p:nvSpPr>
+          <p:cNvPr id="15" name="Rechteck 14"/>
+          <p:cNvSpPr>
+            <a:spLocks/>
+          </p:cNvSpPr>
+          <p:nvPr/>
+        </p:nvSpPr>
+        <p:spPr>
+          <a:xfrm>
+            <a:off x="2958600" y="1486175"/>
+            <a:ext cx="792000" cy="720000"/>
+          </a:xfrm>
+          <a:prstGeom prst="rect">
+            <a:avLst/>
+          </a:prstGeom>
+          <a:solidFill>
+            <a:schemeClr val="accent2"/>
+          </a:solidFill>
+        </p:spPr>
+        <p:style>
+          <a:lnRef idx="2">
+            <a:schemeClr val="accent1">
+              <a:shade val="50000"/>
+            </a:schemeClr>
+          </a:lnRef>
+          <a:fillRef idx="1">
+            <a:schemeClr val="accent1"/>
+          </a:fillRef>
+          <a:effectRef idx="0">
+            <a:schemeClr val="accent1"/>
+          </a:effectRef>
+          <a:fontRef idx="minor">
+            <a:schemeClr val="lt1"/>
+          </a:fontRef>
+        </p:style>
+        <p:txBody>
+          <a:bodyPr rtlCol="0" anchor="ctr"/>
+          <a:lstStyle/>
+          <a:p>
+            <a:pPr algn="ctr"/>
+            <a:endParaRPr lang="en-US"/>
+          </a:p>
+        </p:txBody>
+      </p:sp>
+      <p:sp>
+        <p:nvSpPr>
+          <p:cNvPr id="16" name="Rechteck 15"/>
+          <p:cNvSpPr>
+            <a:spLocks/>
+          </p:cNvSpPr>
+          <p:nvPr/>
+        </p:nvSpPr>
+        <p:spPr>
+          <a:xfrm>
+            <a:off x="4038600" y="1486175"/>
+            <a:ext cx="792000" cy="720000"/>
+          </a:xfrm>
+          <a:prstGeom prst="rect">
+            <a:avLst/>
+          </a:prstGeom>
+          <a:solidFill>
+            <a:schemeClr val="accent2"/>
+          </a:solidFill>
+        </p:spPr>
+        <p:style>
+          <a:lnRef idx="2">
+            <a:schemeClr val="accent1">
+              <a:shade val="50000"/>
+            </a:schemeClr>
+          </a:lnRef>
+          <a:fillRef idx="1">
+            <a:schemeClr val="accent1"/>
+          </a:fillRef>
+          <a:effectRef idx="0">
+            <a:schemeClr val="accent1"/>
+          </a:effectRef>
+          <a:fontRef idx="minor">
+            <a:schemeClr val="lt1"/>
+          </a:fontRef>
+        </p:style>
+        <p:txBody>
+          <a:bodyPr rtlCol="0" anchor="ctr"/>
+          <a:lstStyle/>
+          <a:p>
+            <a:pPr algn="ctr"/>
+            <a:endParaRPr lang="en-US"/>
+          </a:p>
+        </p:txBody>
+      </p:sp>
+      <p:sp>
+        <p:nvSpPr>
+          <p:cNvPr id="17" name="Rechteck 16"/>
+          <p:cNvSpPr>
+            <a:spLocks/>
+          </p:cNvSpPr>
+          <p:nvPr/>
+        </p:nvSpPr>
+        <p:spPr>
+          <a:xfrm>
+            <a:off x="2958600" y="2422175"/>
+            <a:ext cx="792000" cy="720000"/>
+          </a:xfrm>
+          <a:prstGeom prst="rect">
+            <a:avLst/>
+          </a:prstGeom>
+          <a:solidFill>
+            <a:schemeClr val="accent2"/>
+          </a:solidFill>
+        </p:spPr>
+        <p:style>
+          <a:lnRef idx="2">
+            <a:schemeClr val="accent1">
+              <a:shade val="50000"/>
+            </a:schemeClr>
+          </a:lnRef>
+          <a:fillRef idx="1">
+            <a:schemeClr val="accent1"/>
+          </a:fillRef>
+          <a:effectRef idx="0">
+            <a:schemeClr val="accent1"/>
+          </a:effectRef>
+          <a:fontRef idx="minor">
+            <a:schemeClr val="lt1"/>
+          </a:fontRef>
+        </p:style>
+        <p:txBody>
+          <a:bodyPr rtlCol="0" anchor="ctr"/>
+          <a:lstStyle/>
+          <a:p>
+            <a:pPr algn="ctr"/>
+            <a:endParaRPr lang="en-US"/>
+          </a:p>
+        </p:txBody>
+      </p:sp>
+      <p:sp>
+        <p:nvSpPr>
+          <p:cNvPr id="18" name="Rechteck 17"/>
+          <p:cNvSpPr>
+            <a:spLocks/>
+          </p:cNvSpPr>
+          <p:nvPr/>
+        </p:nvSpPr>
+        <p:spPr>
+          <a:xfrm>
+            <a:off x="4038600" y="2422175"/>
+            <a:ext cx="792000" cy="720000"/>
+          </a:xfrm>
+          <a:prstGeom prst="rect">
+            <a:avLst/>
+          </a:prstGeom>
+          <a:solidFill>
+            <a:schemeClr val="accent2"/>
+          </a:solidFill>
+        </p:spPr>
+        <p:style>
+          <a:lnRef idx="2">
+            <a:schemeClr val="accent1">
+              <a:shade val="50000"/>
+            </a:schemeClr>
+          </a:lnRef>
+          <a:fillRef idx="1">
+            <a:schemeClr val="accent1"/>
+          </a:fillRef>
+          <a:effectRef idx="0">
+            <a:schemeClr val="accent1"/>
+          </a:effectRef>
+          <a:fontRef idx="minor">
+            <a:schemeClr val="lt1"/>
+          </a:fontRef>
+        </p:style>
+        <p:txBody>
+          <a:bodyPr rtlCol="0" anchor="ctr"/>
+          <a:lstStyle/>
+          <a:p>
+            <a:pPr algn="ctr"/>
+            <a:endParaRPr lang="en-US"/>
+          </a:p>
+        </p:txBody>
+      </p:sp>
+    </p:spTree>
+    <p:extLst>
+      <p:ext uri="{BB962C8B-B14F-4D97-AF65-F5344CB8AC3E}">
+        <p14:creationId xmlns:p14="http://schemas.microsoft.com/office/powerpoint/2010/main" val="2857295861"/>
+      </p:ext>
+    </p:extLst>
+  </p:cSld>
+  <p:clrMapOvr>
+    <a:masterClrMapping/>
+  </p:clrMapOvr>
+  <p:timing>
+    <p:tnLst>
+      <p:par>
+        <p:cTn id="1" dur="indefinite" restart="never" nodeType="tmRoot"/>
+      </p:par>
+    </p:tnLst>
+  </p:timing>
+</p:sld>
+</file>
+
 <file path=ppt/slides/slide3.xml><?xml version="1.0" encoding="utf-8"?>
 <p:sld xmlns:a="http://schemas.openxmlformats.org/drawingml/2006/main" xmlns:r="http://schemas.openxmlformats.org/officeDocument/2006/relationships" xmlns:p="http://schemas.openxmlformats.org/presentationml/2006/main">
   <p:cSld>
@@ -45474,7 +46123,7 @@
           <a:graphicData uri="http://schemas.openxmlformats.org/presentationml/2006/ole">
             <mc:AlternateContent xmlns:mc="http://schemas.openxmlformats.org/markup-compatibility/2006">
               <mc:Choice xmlns:v="urn:schemas-microsoft-com:vml" Requires="v">
-                <p:oleObj spid="_x0000_s6149" name="think-cell Folie" r:id="rId5" imgW="631" imgH="631" progId="TCLayout.ActiveDocument.1">
+                <p:oleObj spid="_x0000_s6152" name="think-cell Folie" r:id="rId5" imgW="631" imgH="631" progId="TCLayout.ActiveDocument.1">
                   <p:embed/>
                 </p:oleObj>
               </mc:Choice>
@@ -45597,7 +46246,7 @@
           <a:p>
             <a:fld id="{96F7184E-8FBB-4A90-A48C-F739EEF98397}" type="datetime1">
               <a:rPr lang="en-US" smtClean="0"/>
-              <a:t>6/27/2020</a:t>
+              <a:t>7/21/2020</a:t>
             </a:fld>
             <a:endParaRPr lang="en-US"/>
           </a:p>
@@ -46003,7 +46652,7 @@
           <a:graphicData uri="http://schemas.openxmlformats.org/presentationml/2006/ole">
             <mc:AlternateContent xmlns:mc="http://schemas.openxmlformats.org/markup-compatibility/2006">
               <mc:Choice xmlns:v="urn:schemas-microsoft-com:vml" Requires="v">
-                <p:oleObj spid="_x0000_s7173" name="think-cell Folie" r:id="rId5" imgW="631" imgH="631" progId="TCLayout.ActiveDocument.1">
+                <p:oleObj spid="_x0000_s7176" name="think-cell Folie" r:id="rId5" imgW="631" imgH="631" progId="TCLayout.ActiveDocument.1">
                   <p:embed/>
                 </p:oleObj>
               </mc:Choice>
@@ -46126,7 +46775,7 @@
           <a:p>
             <a:fld id="{96F7184E-8FBB-4A90-A48C-F739EEF98397}" type="datetime1">
               <a:rPr lang="en-US" smtClean="0"/>
-              <a:t>6/27/2020</a:t>
+              <a:t>7/21/2020</a:t>
             </a:fld>
             <a:endParaRPr lang="en-US"/>
           </a:p>
@@ -46668,7 +47317,7 @@
           <a:graphicData uri="http://schemas.openxmlformats.org/presentationml/2006/ole">
             <mc:AlternateContent xmlns:mc="http://schemas.openxmlformats.org/markup-compatibility/2006">
               <mc:Choice xmlns:v="urn:schemas-microsoft-com:vml" Requires="v">
-                <p:oleObj spid="_x0000_s8197" name="think-cell Folie" r:id="rId5" imgW="631" imgH="631" progId="TCLayout.ActiveDocument.1">
+                <p:oleObj spid="_x0000_s8200" name="think-cell Folie" r:id="rId5" imgW="631" imgH="631" progId="TCLayout.ActiveDocument.1">
                   <p:embed/>
                 </p:oleObj>
               </mc:Choice>
@@ -46967,7 +47616,7 @@
           <a:p>
             <a:fld id="{96F7184E-8FBB-4A90-A48C-F739EEF98397}" type="datetime1">
               <a:rPr lang="en-US" smtClean="0"/>
-              <a:t>6/27/2020</a:t>
+              <a:t>7/21/2020</a:t>
             </a:fld>
             <a:endParaRPr lang="en-US"/>
           </a:p>
@@ -49636,7 +50285,7 @@
           <a:graphicData uri="http://schemas.openxmlformats.org/presentationml/2006/ole">
             <mc:AlternateContent xmlns:mc="http://schemas.openxmlformats.org/markup-compatibility/2006">
               <mc:Choice xmlns:v="urn:schemas-microsoft-com:vml" Requires="v">
-                <p:oleObj spid="_x0000_s9221" name="think-cell Folie" r:id="rId8" imgW="631" imgH="631" progId="TCLayout.ActiveDocument.1">
+                <p:oleObj spid="_x0000_s9224" name="think-cell Folie" r:id="rId8" imgW="631" imgH="631" progId="TCLayout.ActiveDocument.1">
                   <p:embed/>
                 </p:oleObj>
               </mc:Choice>
@@ -49775,7 +50424,7 @@
           <a:p>
             <a:fld id="{96F7184E-8FBB-4A90-A48C-F739EEF98397}" type="datetime1">
               <a:rPr lang="en-US" smtClean="0"/>
-              <a:t>6/27/2020</a:t>
+              <a:t>7/21/2020</a:t>
             </a:fld>
             <a:endParaRPr lang="en-US"/>
           </a:p>
@@ -50137,7 +50786,7 @@
           <a:graphicData uri="http://schemas.openxmlformats.org/presentationml/2006/ole">
             <mc:AlternateContent xmlns:mc="http://schemas.openxmlformats.org/markup-compatibility/2006">
               <mc:Choice xmlns:v="urn:schemas-microsoft-com:vml" Requires="v">
-                <p:oleObj spid="_x0000_s10245" name="think-cell Folie" r:id="rId5" imgW="631" imgH="631" progId="TCLayout.ActiveDocument.1">
+                <p:oleObj spid="_x0000_s10248" name="think-cell Folie" r:id="rId5" imgW="631" imgH="631" progId="TCLayout.ActiveDocument.1">
                   <p:embed/>
                 </p:oleObj>
               </mc:Choice>
@@ -51537,7 +52186,7 @@
           <a:p>
             <a:fld id="{96F19FEE-77E8-457F-A68B-CA71C97CC2CC}" type="datetime1">
               <a:rPr lang="en-US" smtClean="0"/>
-              <a:t>6/27/2020</a:t>
+              <a:t>7/21/2020</a:t>
             </a:fld>
             <a:endParaRPr lang="en-US" dirty="0"/>
           </a:p>
@@ -52001,7 +52650,7 @@
           <a:graphicData uri="http://schemas.openxmlformats.org/presentationml/2006/ole">
             <mc:AlternateContent xmlns:mc="http://schemas.openxmlformats.org/markup-compatibility/2006">
               <mc:Choice xmlns:v="urn:schemas-microsoft-com:vml" Requires="v">
-                <p:oleObj spid="_x0000_s11269" name="think-cell Folie" r:id="rId5" imgW="631" imgH="631" progId="TCLayout.ActiveDocument.1">
+                <p:oleObj spid="_x0000_s11272" name="think-cell Folie" r:id="rId5" imgW="631" imgH="631" progId="TCLayout.ActiveDocument.1">
                   <p:embed/>
                 </p:oleObj>
               </mc:Choice>
@@ -52148,7 +52797,7 @@
           <a:p>
             <a:fld id="{E3391B0F-6039-4760-8D96-59CD8C673C29}" type="datetime1">
               <a:rPr lang="en-US" smtClean="0"/>
-              <a:t>6/27/2020</a:t>
+              <a:t>7/21/2020</a:t>
             </a:fld>
             <a:endParaRPr lang="en-US" dirty="0"/>
           </a:p>
@@ -52254,7 +52903,7 @@
           <a:graphicData uri="http://schemas.openxmlformats.org/presentationml/2006/ole">
             <mc:AlternateContent xmlns:mc="http://schemas.openxmlformats.org/markup-compatibility/2006">
               <mc:Choice xmlns:v="urn:schemas-microsoft-com:vml" Requires="v">
-                <p:oleObj spid="_x0000_s12293" name="think-cell Folie" r:id="rId4" imgW="631" imgH="631" progId="TCLayout.ActiveDocument.1">
+                <p:oleObj spid="_x0000_s12296" name="think-cell Folie" r:id="rId4" imgW="631" imgH="631" progId="TCLayout.ActiveDocument.1">
                   <p:embed/>
                 </p:oleObj>
               </mc:Choice>
@@ -52350,7 +52999,7 @@
           <a:p>
             <a:fld id="{D0070A92-E06C-4CB9-82D9-1CCE38BE87EB}" type="datetime1">
               <a:rPr lang="en-US" smtClean="0"/>
-              <a:t>6/27/2020</a:t>
+              <a:t>7/21/2020</a:t>
             </a:fld>
             <a:endParaRPr lang="en-US" dirty="0"/>
           </a:p>
@@ -52771,6 +53420,12 @@
 <p:tagLst xmlns:a="http://schemas.openxmlformats.org/drawingml/2006/main" xmlns:r="http://schemas.openxmlformats.org/officeDocument/2006/relationships" xmlns:p="http://schemas.openxmlformats.org/presentationml/2006/main">
   <p:tag name="BKT_THUMBNAIL" val="{&quot;content_only&quot;: false, &quot;slide_id&quot;: 256, &quot;slide_path&quot;: &quot;C:\\Users\\fstallmann\\Pictures\\THUMBNAIL-TEST.pptx&quot;, &quot;data_type&quot;: 6}"/>
   <p:tag name="BKT_CONTEXTDIALOG" val="BKT_THUMBNAIL"/>
+</p:tagLst>
+</file>
+
+<file path=ppt/tags/tag62.xml><?xml version="1.0" encoding="utf-8"?>
+<p:tagLst xmlns:a="http://schemas.openxmlformats.org/drawingml/2006/main" xmlns:r="http://schemas.openxmlformats.org/officeDocument/2006/relationships" xmlns:p="http://schemas.openxmlformats.org/presentationml/2006/main">
+  <p:tag name="THINKCELLSHAPEDONOTDELETE" val="thinkcellActiveDocDoNotDelete"/>
 </p:tagLst>
 </file>
 

</xml_diff>

<commit_message>
add more chart types and variations to shape test library
</commit_message>
<xml_diff>
--- a/references/BKT Shapes Test Library.pptx
+++ b/references/BKT Shapes Test Library.pptx
@@ -7,7 +7,7 @@
     <p:sldMasterId id="2147483684" r:id="rId3"/>
   </p:sldMasterIdLst>
   <p:notesMasterIdLst>
-    <p:notesMasterId r:id="rId26"/>
+    <p:notesMasterId r:id="rId27"/>
   </p:notesMasterIdLst>
   <p:sldIdLst>
     <p:sldId id="268" r:id="rId4"/>
@@ -32,11 +32,12 @@
     <p:sldId id="264" r:id="rId23"/>
     <p:sldId id="279" r:id="rId24"/>
     <p:sldId id="282" r:id="rId25"/>
+    <p:sldId id="283" r:id="rId26"/>
   </p:sldIdLst>
   <p:sldSz cx="12192000" cy="6858000"/>
   <p:notesSz cx="6858000" cy="9144000"/>
   <p:custDataLst>
-    <p:tags r:id="rId27"/>
+    <p:tags r:id="rId28"/>
   </p:custDataLst>
   <p:defaultTextStyle>
     <a:defPPr>
@@ -184,6 +185,11 @@
         <p14:section name="Shapetables" id="{65C0DF56-DF26-451A-896E-E64362A924DA}">
           <p14:sldIdLst>
             <p14:sldId id="282"/>
+          </p14:sldIdLst>
+        </p14:section>
+        <p14:section name="Charts" id="{A08F25E8-B927-441F-B6F6-52813E893802}">
+          <p14:sldIdLst>
+            <p14:sldId id="283"/>
           </p14:sldIdLst>
         </p14:section>
       </p14:sectionLst>
@@ -1599,6 +1605,1131 @@
 </c:chartSpace>
 </file>
 
+<file path=ppt/charts/chart4.xml><?xml version="1.0" encoding="utf-8"?>
+<c:chartSpace xmlns:c="http://schemas.openxmlformats.org/drawingml/2006/chart" xmlns:a="http://schemas.openxmlformats.org/drawingml/2006/main" xmlns:r="http://schemas.openxmlformats.org/officeDocument/2006/relationships" xmlns:c16r2="http://schemas.microsoft.com/office/drawing/2015/06/chart">
+  <c:date1904 val="0"/>
+  <c:lang val="de-DE"/>
+  <c:roundedCorners val="0"/>
+  <mc:AlternateContent xmlns:mc="http://schemas.openxmlformats.org/markup-compatibility/2006">
+    <mc:Choice xmlns:c14="http://schemas.microsoft.com/office/drawing/2007/8/2/chart" Requires="c14">
+      <c14:style val="102"/>
+    </mc:Choice>
+    <mc:Fallback>
+      <c:style val="2"/>
+    </mc:Fallback>
+  </mc:AlternateContent>
+  <c:chart>
+    <c:title>
+      <c:tx>
+        <c:rich>
+          <a:bodyPr rot="0" spcFirstLastPara="1" vertOverflow="ellipsis" vert="horz" wrap="square" anchor="ctr" anchorCtr="1"/>
+          <a:lstStyle/>
+          <a:p>
+            <a:pPr>
+              <a:defRPr lang="de-DE" sz="1862" b="0" i="0" u="none" strike="noStrike" kern="1200" spc="0" baseline="0" noProof="0">
+                <a:solidFill>
+                  <a:schemeClr val="tx1">
+                    <a:lumMod val="65000"/>
+                    <a:lumOff val="35000"/>
+                  </a:schemeClr>
+                </a:solidFill>
+                <a:latin typeface="+mn-lt"/>
+                <a:ea typeface="+mn-ea"/>
+                <a:cs typeface="+mn-cs"/>
+              </a:defRPr>
+            </a:pPr>
+            <a:r>
+              <a:rPr lang="de-DE" dirty="0"/>
+              <a:t>Diagrammtitel</a:t>
+            </a:r>
+          </a:p>
+        </c:rich>
+      </c:tx>
+      <c:layout>
+        <c:manualLayout>
+          <c:xMode val="edge"/>
+          <c:yMode val="edge"/>
+          <c:x val="0.31890071778168022"/>
+          <c:y val="4.9311743405871702E-2"/>
+        </c:manualLayout>
+      </c:layout>
+      <c:overlay val="0"/>
+      <c:spPr>
+        <a:noFill/>
+        <a:ln>
+          <a:noFill/>
+        </a:ln>
+        <a:effectLst/>
+      </c:spPr>
+      <c:txPr>
+        <a:bodyPr rot="0" spcFirstLastPara="1" vertOverflow="ellipsis" vert="horz" wrap="square" anchor="ctr" anchorCtr="1"/>
+        <a:lstStyle/>
+        <a:p>
+          <a:pPr>
+            <a:defRPr lang="de-DE" sz="1862" b="0" i="0" u="none" strike="noStrike" kern="1200" spc="0" baseline="0" noProof="0">
+              <a:solidFill>
+                <a:schemeClr val="tx1">
+                  <a:lumMod val="65000"/>
+                  <a:lumOff val="35000"/>
+                </a:schemeClr>
+              </a:solidFill>
+              <a:latin typeface="+mn-lt"/>
+              <a:ea typeface="+mn-ea"/>
+              <a:cs typeface="+mn-cs"/>
+            </a:defRPr>
+          </a:pPr>
+          <a:endParaRPr lang="de-DE"/>
+        </a:p>
+      </c:txPr>
+    </c:title>
+    <c:autoTitleDeleted val="0"/>
+    <c:plotArea>
+      <c:layout/>
+      <c:barChart>
+        <c:barDir val="col"/>
+        <c:grouping val="clustered"/>
+        <c:varyColors val="0"/>
+        <c:ser>
+          <c:idx val="0"/>
+          <c:order val="0"/>
+          <c:tx>
+            <c:strRef>
+              <c:f>Tabelle1!$B$1</c:f>
+              <c:strCache>
+                <c:ptCount val="1"/>
+                <c:pt idx="0">
+                  <c:v>Datenreihe 1</c:v>
+                </c:pt>
+              </c:strCache>
+            </c:strRef>
+          </c:tx>
+          <c:spPr>
+            <a:solidFill>
+              <a:schemeClr val="accent1"/>
+            </a:solidFill>
+            <a:ln>
+              <a:noFill/>
+            </a:ln>
+            <a:effectLst/>
+          </c:spPr>
+          <c:invertIfNegative val="0"/>
+          <c:cat>
+            <c:strRef>
+              <c:f>Tabelle1!$A$2:$A$5</c:f>
+              <c:strCache>
+                <c:ptCount val="4"/>
+                <c:pt idx="0">
+                  <c:v>Kategorie 1</c:v>
+                </c:pt>
+                <c:pt idx="1">
+                  <c:v>Kategorie 2</c:v>
+                </c:pt>
+                <c:pt idx="2">
+                  <c:v>Kategorie 3</c:v>
+                </c:pt>
+                <c:pt idx="3">
+                  <c:v>Kategorie 4</c:v>
+                </c:pt>
+              </c:strCache>
+            </c:strRef>
+          </c:cat>
+          <c:val>
+            <c:numRef>
+              <c:f>Tabelle1!$B$2:$B$5</c:f>
+              <c:numCache>
+                <c:formatCode>General</c:formatCode>
+                <c:ptCount val="4"/>
+                <c:pt idx="0">
+                  <c:v>4.3</c:v>
+                </c:pt>
+                <c:pt idx="1">
+                  <c:v>2.5</c:v>
+                </c:pt>
+                <c:pt idx="2">
+                  <c:v>3.5</c:v>
+                </c:pt>
+                <c:pt idx="3">
+                  <c:v>4.5</c:v>
+                </c:pt>
+              </c:numCache>
+            </c:numRef>
+          </c:val>
+          <c:extLst>
+            <c:ext xmlns:c16="http://schemas.microsoft.com/office/drawing/2014/chart" uri="{C3380CC4-5D6E-409C-BE32-E72D297353CC}">
+              <c16:uniqueId val="{00000000-0596-4187-AED5-39249F57B34E}"/>
+            </c:ext>
+          </c:extLst>
+        </c:ser>
+        <c:ser>
+          <c:idx val="1"/>
+          <c:order val="1"/>
+          <c:tx>
+            <c:strRef>
+              <c:f>Tabelle1!$C$1</c:f>
+              <c:strCache>
+                <c:ptCount val="1"/>
+                <c:pt idx="0">
+                  <c:v>Datenreihe 2</c:v>
+                </c:pt>
+              </c:strCache>
+            </c:strRef>
+          </c:tx>
+          <c:spPr>
+            <a:solidFill>
+              <a:schemeClr val="accent2"/>
+            </a:solidFill>
+            <a:ln>
+              <a:noFill/>
+            </a:ln>
+            <a:effectLst/>
+          </c:spPr>
+          <c:invertIfNegative val="0"/>
+          <c:cat>
+            <c:strRef>
+              <c:f>Tabelle1!$A$2:$A$5</c:f>
+              <c:strCache>
+                <c:ptCount val="4"/>
+                <c:pt idx="0">
+                  <c:v>Kategorie 1</c:v>
+                </c:pt>
+                <c:pt idx="1">
+                  <c:v>Kategorie 2</c:v>
+                </c:pt>
+                <c:pt idx="2">
+                  <c:v>Kategorie 3</c:v>
+                </c:pt>
+                <c:pt idx="3">
+                  <c:v>Kategorie 4</c:v>
+                </c:pt>
+              </c:strCache>
+            </c:strRef>
+          </c:cat>
+          <c:val>
+            <c:numRef>
+              <c:f>Tabelle1!$C$2:$C$5</c:f>
+              <c:numCache>
+                <c:formatCode>General</c:formatCode>
+                <c:ptCount val="4"/>
+                <c:pt idx="0">
+                  <c:v>2.4</c:v>
+                </c:pt>
+                <c:pt idx="1">
+                  <c:v>4.4000000000000004</c:v>
+                </c:pt>
+                <c:pt idx="2">
+                  <c:v>1.8</c:v>
+                </c:pt>
+                <c:pt idx="3">
+                  <c:v>2.8</c:v>
+                </c:pt>
+              </c:numCache>
+            </c:numRef>
+          </c:val>
+          <c:extLst>
+            <c:ext xmlns:c16="http://schemas.microsoft.com/office/drawing/2014/chart" uri="{C3380CC4-5D6E-409C-BE32-E72D297353CC}">
+              <c16:uniqueId val="{00000001-0596-4187-AED5-39249F57B34E}"/>
+            </c:ext>
+          </c:extLst>
+        </c:ser>
+        <c:ser>
+          <c:idx val="2"/>
+          <c:order val="2"/>
+          <c:tx>
+            <c:strRef>
+              <c:f>Tabelle1!$D$1</c:f>
+              <c:strCache>
+                <c:ptCount val="1"/>
+                <c:pt idx="0">
+                  <c:v>Datenreihe 3</c:v>
+                </c:pt>
+              </c:strCache>
+            </c:strRef>
+          </c:tx>
+          <c:spPr>
+            <a:solidFill>
+              <a:schemeClr val="accent3"/>
+            </a:solidFill>
+            <a:ln>
+              <a:noFill/>
+            </a:ln>
+            <a:effectLst/>
+          </c:spPr>
+          <c:invertIfNegative val="0"/>
+          <c:cat>
+            <c:strRef>
+              <c:f>Tabelle1!$A$2:$A$5</c:f>
+              <c:strCache>
+                <c:ptCount val="4"/>
+                <c:pt idx="0">
+                  <c:v>Kategorie 1</c:v>
+                </c:pt>
+                <c:pt idx="1">
+                  <c:v>Kategorie 2</c:v>
+                </c:pt>
+                <c:pt idx="2">
+                  <c:v>Kategorie 3</c:v>
+                </c:pt>
+                <c:pt idx="3">
+                  <c:v>Kategorie 4</c:v>
+                </c:pt>
+              </c:strCache>
+            </c:strRef>
+          </c:cat>
+          <c:val>
+            <c:numRef>
+              <c:f>Tabelle1!$D$2:$D$5</c:f>
+              <c:numCache>
+                <c:formatCode>General</c:formatCode>
+                <c:ptCount val="4"/>
+                <c:pt idx="0">
+                  <c:v>2</c:v>
+                </c:pt>
+                <c:pt idx="1">
+                  <c:v>2</c:v>
+                </c:pt>
+                <c:pt idx="2">
+                  <c:v>3</c:v>
+                </c:pt>
+                <c:pt idx="3">
+                  <c:v>5</c:v>
+                </c:pt>
+              </c:numCache>
+            </c:numRef>
+          </c:val>
+          <c:extLst>
+            <c:ext xmlns:c16="http://schemas.microsoft.com/office/drawing/2014/chart" uri="{C3380CC4-5D6E-409C-BE32-E72D297353CC}">
+              <c16:uniqueId val="{00000002-0596-4187-AED5-39249F57B34E}"/>
+            </c:ext>
+          </c:extLst>
+        </c:ser>
+        <c:dLbls>
+          <c:showLegendKey val="0"/>
+          <c:showVal val="0"/>
+          <c:showCatName val="0"/>
+          <c:showSerName val="0"/>
+          <c:showPercent val="0"/>
+          <c:showBubbleSize val="0"/>
+        </c:dLbls>
+        <c:gapWidth val="219"/>
+        <c:overlap val="-27"/>
+        <c:axId val="545519784"/>
+        <c:axId val="545520112"/>
+      </c:barChart>
+      <c:catAx>
+        <c:axId val="545519784"/>
+        <c:scaling>
+          <c:orientation val="minMax"/>
+        </c:scaling>
+        <c:delete val="0"/>
+        <c:axPos val="b"/>
+        <c:numFmt formatCode="General" sourceLinked="1"/>
+        <c:majorTickMark val="none"/>
+        <c:minorTickMark val="none"/>
+        <c:tickLblPos val="nextTo"/>
+        <c:spPr>
+          <a:noFill/>
+          <a:ln w="9525" cap="flat" cmpd="sng" algn="ctr">
+            <a:solidFill>
+              <a:schemeClr val="tx1">
+                <a:lumMod val="15000"/>
+                <a:lumOff val="85000"/>
+              </a:schemeClr>
+            </a:solidFill>
+            <a:round/>
+          </a:ln>
+          <a:effectLst/>
+        </c:spPr>
+        <c:txPr>
+          <a:bodyPr rot="-60000000" spcFirstLastPara="1" vertOverflow="ellipsis" vert="horz" wrap="square" anchor="ctr" anchorCtr="1"/>
+          <a:lstStyle/>
+          <a:p>
+            <a:pPr>
+              <a:defRPr lang="de-DE" sz="1197" b="0" i="0" u="none" strike="noStrike" kern="1200" baseline="0" noProof="0">
+                <a:solidFill>
+                  <a:schemeClr val="tx1">
+                    <a:lumMod val="65000"/>
+                    <a:lumOff val="35000"/>
+                  </a:schemeClr>
+                </a:solidFill>
+                <a:latin typeface="+mn-lt"/>
+                <a:ea typeface="+mn-ea"/>
+                <a:cs typeface="+mn-cs"/>
+              </a:defRPr>
+            </a:pPr>
+            <a:endParaRPr lang="de-DE"/>
+          </a:p>
+        </c:txPr>
+        <c:crossAx val="545520112"/>
+        <c:crosses val="autoZero"/>
+        <c:auto val="1"/>
+        <c:lblAlgn val="ctr"/>
+        <c:lblOffset val="100"/>
+        <c:noMultiLvlLbl val="0"/>
+      </c:catAx>
+      <c:valAx>
+        <c:axId val="545520112"/>
+        <c:scaling>
+          <c:orientation val="minMax"/>
+        </c:scaling>
+        <c:delete val="0"/>
+        <c:axPos val="l"/>
+        <c:majorGridlines>
+          <c:spPr>
+            <a:ln w="9525" cap="flat" cmpd="sng" algn="ctr">
+              <a:solidFill>
+                <a:schemeClr val="tx1">
+                  <a:lumMod val="15000"/>
+                  <a:lumOff val="85000"/>
+                </a:schemeClr>
+              </a:solidFill>
+              <a:round/>
+            </a:ln>
+            <a:effectLst/>
+          </c:spPr>
+        </c:majorGridlines>
+        <c:numFmt formatCode="General" sourceLinked="1"/>
+        <c:majorTickMark val="none"/>
+        <c:minorTickMark val="none"/>
+        <c:tickLblPos val="nextTo"/>
+        <c:spPr>
+          <a:noFill/>
+          <a:ln>
+            <a:noFill/>
+          </a:ln>
+          <a:effectLst/>
+        </c:spPr>
+        <c:txPr>
+          <a:bodyPr rot="-60000000" spcFirstLastPara="1" vertOverflow="ellipsis" vert="horz" wrap="square" anchor="ctr" anchorCtr="1"/>
+          <a:lstStyle/>
+          <a:p>
+            <a:pPr>
+              <a:defRPr lang="de-DE" sz="1197" b="0" i="0" u="none" strike="noStrike" kern="1200" baseline="0" noProof="0">
+                <a:solidFill>
+                  <a:schemeClr val="tx1">
+                    <a:lumMod val="65000"/>
+                    <a:lumOff val="35000"/>
+                  </a:schemeClr>
+                </a:solidFill>
+                <a:latin typeface="+mn-lt"/>
+                <a:ea typeface="+mn-ea"/>
+                <a:cs typeface="+mn-cs"/>
+              </a:defRPr>
+            </a:pPr>
+            <a:endParaRPr lang="de-DE"/>
+          </a:p>
+        </c:txPr>
+        <c:crossAx val="545519784"/>
+        <c:crosses val="autoZero"/>
+        <c:crossBetween val="between"/>
+      </c:valAx>
+      <c:spPr>
+        <a:noFill/>
+        <a:ln>
+          <a:noFill/>
+        </a:ln>
+        <a:effectLst/>
+      </c:spPr>
+    </c:plotArea>
+    <c:legend>
+      <c:legendPos val="b"/>
+      <c:layout/>
+      <c:overlay val="0"/>
+      <c:spPr>
+        <a:noFill/>
+        <a:ln>
+          <a:noFill/>
+        </a:ln>
+        <a:effectLst/>
+      </c:spPr>
+      <c:txPr>
+        <a:bodyPr rot="0" spcFirstLastPara="1" vertOverflow="ellipsis" vert="horz" wrap="square" anchor="ctr" anchorCtr="1"/>
+        <a:lstStyle/>
+        <a:p>
+          <a:pPr>
+            <a:defRPr lang="de-DE" sz="1197" b="0" i="0" u="none" strike="noStrike" kern="1200" baseline="0" noProof="0">
+              <a:solidFill>
+                <a:schemeClr val="tx1">
+                  <a:lumMod val="65000"/>
+                  <a:lumOff val="35000"/>
+                </a:schemeClr>
+              </a:solidFill>
+              <a:latin typeface="+mn-lt"/>
+              <a:ea typeface="+mn-ea"/>
+              <a:cs typeface="+mn-cs"/>
+            </a:defRPr>
+          </a:pPr>
+          <a:endParaRPr lang="de-DE"/>
+        </a:p>
+      </c:txPr>
+    </c:legend>
+    <c:plotVisOnly val="1"/>
+    <c:dispBlanksAs val="gap"/>
+    <c:showDLblsOverMax val="0"/>
+  </c:chart>
+  <c:spPr>
+    <a:noFill/>
+    <a:ln>
+      <a:noFill/>
+    </a:ln>
+    <a:effectLst/>
+  </c:spPr>
+  <c:txPr>
+    <a:bodyPr/>
+    <a:lstStyle/>
+    <a:p>
+      <a:pPr>
+        <a:defRPr lang="de-DE" noProof="0"/>
+      </a:pPr>
+      <a:endParaRPr lang="de-DE"/>
+    </a:p>
+  </c:txPr>
+  <c:externalData r:id="rId3">
+    <c:autoUpdate val="0"/>
+  </c:externalData>
+</c:chartSpace>
+</file>
+
+<file path=ppt/charts/chart5.xml><?xml version="1.0" encoding="utf-8"?>
+<c:chartSpace xmlns:c="http://schemas.openxmlformats.org/drawingml/2006/chart" xmlns:a="http://schemas.openxmlformats.org/drawingml/2006/main" xmlns:r="http://schemas.openxmlformats.org/officeDocument/2006/relationships" xmlns:c16r2="http://schemas.microsoft.com/office/drawing/2015/06/chart">
+  <c:date1904 val="0"/>
+  <c:lang val="de-DE"/>
+  <c:roundedCorners val="0"/>
+  <mc:AlternateContent xmlns:mc="http://schemas.openxmlformats.org/markup-compatibility/2006">
+    <mc:Choice xmlns:c14="http://schemas.microsoft.com/office/drawing/2007/8/2/chart" Requires="c14">
+      <c14:style val="102"/>
+    </mc:Choice>
+    <mc:Fallback>
+      <c:style val="2"/>
+    </mc:Fallback>
+  </mc:AlternateContent>
+  <c:chart>
+    <c:autoTitleDeleted val="1"/>
+    <c:plotArea>
+      <c:layout/>
+      <c:barChart>
+        <c:barDir val="col"/>
+        <c:grouping val="clustered"/>
+        <c:varyColors val="0"/>
+        <c:ser>
+          <c:idx val="0"/>
+          <c:order val="0"/>
+          <c:tx>
+            <c:strRef>
+              <c:f>Tabelle1!$B$1</c:f>
+              <c:strCache>
+                <c:ptCount val="1"/>
+                <c:pt idx="0">
+                  <c:v>Datenreihe 1</c:v>
+                </c:pt>
+              </c:strCache>
+            </c:strRef>
+          </c:tx>
+          <c:spPr>
+            <a:solidFill>
+              <a:schemeClr val="accent1"/>
+            </a:solidFill>
+            <a:ln>
+              <a:noFill/>
+            </a:ln>
+            <a:effectLst/>
+          </c:spPr>
+          <c:invertIfNegative val="0"/>
+          <c:dLbls>
+            <c:spPr>
+              <a:noFill/>
+              <a:ln>
+                <a:noFill/>
+              </a:ln>
+              <a:effectLst/>
+            </c:spPr>
+            <c:txPr>
+              <a:bodyPr rot="0" spcFirstLastPara="1" vertOverflow="ellipsis" vert="horz" wrap="square" anchor="ctr" anchorCtr="1"/>
+              <a:lstStyle/>
+              <a:p>
+                <a:pPr>
+                  <a:defRPr lang="de-DE" sz="1197" b="0" i="0" u="none" strike="noStrike" kern="1200" baseline="0">
+                    <a:solidFill>
+                      <a:schemeClr val="tx1">
+                        <a:lumMod val="75000"/>
+                        <a:lumOff val="25000"/>
+                      </a:schemeClr>
+                    </a:solidFill>
+                    <a:latin typeface="+mn-lt"/>
+                    <a:ea typeface="+mn-ea"/>
+                    <a:cs typeface="+mn-cs"/>
+                  </a:defRPr>
+                </a:pPr>
+                <a:endParaRPr lang="de-DE"/>
+              </a:p>
+            </c:txPr>
+            <c:dLblPos val="outEnd"/>
+            <c:showLegendKey val="0"/>
+            <c:showVal val="1"/>
+            <c:showCatName val="0"/>
+            <c:showSerName val="0"/>
+            <c:showPercent val="0"/>
+            <c:showBubbleSize val="0"/>
+            <c:showLeaderLines val="0"/>
+            <c:extLst>
+              <c:ext xmlns:c15="http://schemas.microsoft.com/office/drawing/2012/chart" uri="{CE6537A1-D6FC-4f65-9D91-7224C49458BB}">
+                <c15:layout/>
+                <c15:showLeaderLines val="1"/>
+                <c15:leaderLines>
+                  <c:spPr>
+                    <a:ln w="9525" cap="flat" cmpd="sng" algn="ctr">
+                      <a:solidFill>
+                        <a:schemeClr val="tx1">
+                          <a:lumMod val="35000"/>
+                          <a:lumOff val="65000"/>
+                        </a:schemeClr>
+                      </a:solidFill>
+                      <a:round/>
+                    </a:ln>
+                    <a:effectLst/>
+                  </c:spPr>
+                </c15:leaderLines>
+              </c:ext>
+            </c:extLst>
+          </c:dLbls>
+          <c:cat>
+            <c:strRef>
+              <c:f>Tabelle1!$A$2:$A$5</c:f>
+              <c:strCache>
+                <c:ptCount val="4"/>
+                <c:pt idx="0">
+                  <c:v>Kategorie 1</c:v>
+                </c:pt>
+                <c:pt idx="1">
+                  <c:v>Kategorie 2</c:v>
+                </c:pt>
+                <c:pt idx="2">
+                  <c:v>Kategorie 3</c:v>
+                </c:pt>
+                <c:pt idx="3">
+                  <c:v>Kategorie 4</c:v>
+                </c:pt>
+              </c:strCache>
+            </c:strRef>
+          </c:cat>
+          <c:val>
+            <c:numRef>
+              <c:f>Tabelle1!$B$2:$B$5</c:f>
+              <c:numCache>
+                <c:formatCode>General</c:formatCode>
+                <c:ptCount val="4"/>
+                <c:pt idx="0">
+                  <c:v>4.3</c:v>
+                </c:pt>
+                <c:pt idx="1">
+                  <c:v>2.5</c:v>
+                </c:pt>
+                <c:pt idx="2">
+                  <c:v>3.5</c:v>
+                </c:pt>
+                <c:pt idx="3">
+                  <c:v>4.5</c:v>
+                </c:pt>
+              </c:numCache>
+            </c:numRef>
+          </c:val>
+          <c:extLst>
+            <c:ext xmlns:c16="http://schemas.microsoft.com/office/drawing/2014/chart" uri="{C3380CC4-5D6E-409C-BE32-E72D297353CC}">
+              <c16:uniqueId val="{00000000-0596-4187-AED5-39249F57B34E}"/>
+            </c:ext>
+          </c:extLst>
+        </c:ser>
+        <c:ser>
+          <c:idx val="1"/>
+          <c:order val="1"/>
+          <c:tx>
+            <c:strRef>
+              <c:f>Tabelle1!$C$1</c:f>
+              <c:strCache>
+                <c:ptCount val="1"/>
+                <c:pt idx="0">
+                  <c:v>Datenreihe 2</c:v>
+                </c:pt>
+              </c:strCache>
+            </c:strRef>
+          </c:tx>
+          <c:spPr>
+            <a:solidFill>
+              <a:schemeClr val="accent2"/>
+            </a:solidFill>
+            <a:ln>
+              <a:noFill/>
+            </a:ln>
+            <a:effectLst/>
+          </c:spPr>
+          <c:invertIfNegative val="0"/>
+          <c:dLbls>
+            <c:spPr>
+              <a:noFill/>
+              <a:ln>
+                <a:noFill/>
+              </a:ln>
+              <a:effectLst/>
+            </c:spPr>
+            <c:txPr>
+              <a:bodyPr rot="0" spcFirstLastPara="1" vertOverflow="ellipsis" vert="horz" wrap="square" anchor="ctr" anchorCtr="1"/>
+              <a:lstStyle/>
+              <a:p>
+                <a:pPr>
+                  <a:defRPr lang="de-DE" sz="1197" b="0" i="0" u="none" strike="noStrike" kern="1200" baseline="0">
+                    <a:solidFill>
+                      <a:schemeClr val="tx1">
+                        <a:lumMod val="75000"/>
+                        <a:lumOff val="25000"/>
+                      </a:schemeClr>
+                    </a:solidFill>
+                    <a:latin typeface="+mn-lt"/>
+                    <a:ea typeface="+mn-ea"/>
+                    <a:cs typeface="+mn-cs"/>
+                  </a:defRPr>
+                </a:pPr>
+                <a:endParaRPr lang="de-DE"/>
+              </a:p>
+            </c:txPr>
+            <c:dLblPos val="outEnd"/>
+            <c:showLegendKey val="0"/>
+            <c:showVal val="1"/>
+            <c:showCatName val="0"/>
+            <c:showSerName val="0"/>
+            <c:showPercent val="0"/>
+            <c:showBubbleSize val="0"/>
+            <c:showLeaderLines val="0"/>
+            <c:extLst>
+              <c:ext xmlns:c15="http://schemas.microsoft.com/office/drawing/2012/chart" uri="{CE6537A1-D6FC-4f65-9D91-7224C49458BB}">
+                <c15:layout/>
+                <c15:showLeaderLines val="1"/>
+                <c15:leaderLines>
+                  <c:spPr>
+                    <a:ln w="9525" cap="flat" cmpd="sng" algn="ctr">
+                      <a:solidFill>
+                        <a:schemeClr val="tx1">
+                          <a:lumMod val="35000"/>
+                          <a:lumOff val="65000"/>
+                        </a:schemeClr>
+                      </a:solidFill>
+                      <a:round/>
+                    </a:ln>
+                    <a:effectLst/>
+                  </c:spPr>
+                </c15:leaderLines>
+              </c:ext>
+            </c:extLst>
+          </c:dLbls>
+          <c:cat>
+            <c:strRef>
+              <c:f>Tabelle1!$A$2:$A$5</c:f>
+              <c:strCache>
+                <c:ptCount val="4"/>
+                <c:pt idx="0">
+                  <c:v>Kategorie 1</c:v>
+                </c:pt>
+                <c:pt idx="1">
+                  <c:v>Kategorie 2</c:v>
+                </c:pt>
+                <c:pt idx="2">
+                  <c:v>Kategorie 3</c:v>
+                </c:pt>
+                <c:pt idx="3">
+                  <c:v>Kategorie 4</c:v>
+                </c:pt>
+              </c:strCache>
+            </c:strRef>
+          </c:cat>
+          <c:val>
+            <c:numRef>
+              <c:f>Tabelle1!$C$2:$C$5</c:f>
+              <c:numCache>
+                <c:formatCode>General</c:formatCode>
+                <c:ptCount val="4"/>
+                <c:pt idx="0">
+                  <c:v>2.4</c:v>
+                </c:pt>
+                <c:pt idx="1">
+                  <c:v>4.4000000000000004</c:v>
+                </c:pt>
+                <c:pt idx="2">
+                  <c:v>1.8</c:v>
+                </c:pt>
+                <c:pt idx="3">
+                  <c:v>2.8</c:v>
+                </c:pt>
+              </c:numCache>
+            </c:numRef>
+          </c:val>
+          <c:extLst>
+            <c:ext xmlns:c16="http://schemas.microsoft.com/office/drawing/2014/chart" uri="{C3380CC4-5D6E-409C-BE32-E72D297353CC}">
+              <c16:uniqueId val="{00000001-0596-4187-AED5-39249F57B34E}"/>
+            </c:ext>
+          </c:extLst>
+        </c:ser>
+        <c:ser>
+          <c:idx val="2"/>
+          <c:order val="2"/>
+          <c:tx>
+            <c:strRef>
+              <c:f>Tabelle1!$D$1</c:f>
+              <c:strCache>
+                <c:ptCount val="1"/>
+                <c:pt idx="0">
+                  <c:v>Datenreihe 3</c:v>
+                </c:pt>
+              </c:strCache>
+            </c:strRef>
+          </c:tx>
+          <c:spPr>
+            <a:solidFill>
+              <a:schemeClr val="accent3"/>
+            </a:solidFill>
+            <a:ln>
+              <a:noFill/>
+            </a:ln>
+            <a:effectLst/>
+          </c:spPr>
+          <c:invertIfNegative val="0"/>
+          <c:dLbls>
+            <c:spPr>
+              <a:noFill/>
+              <a:ln>
+                <a:noFill/>
+              </a:ln>
+              <a:effectLst/>
+            </c:spPr>
+            <c:txPr>
+              <a:bodyPr rot="0" spcFirstLastPara="1" vertOverflow="ellipsis" vert="horz" wrap="square" anchor="ctr" anchorCtr="1"/>
+              <a:lstStyle/>
+              <a:p>
+                <a:pPr>
+                  <a:defRPr lang="de-DE" sz="1197" b="0" i="0" u="none" strike="noStrike" kern="1200" baseline="0">
+                    <a:solidFill>
+                      <a:schemeClr val="tx1">
+                        <a:lumMod val="75000"/>
+                        <a:lumOff val="25000"/>
+                      </a:schemeClr>
+                    </a:solidFill>
+                    <a:latin typeface="+mn-lt"/>
+                    <a:ea typeface="+mn-ea"/>
+                    <a:cs typeface="+mn-cs"/>
+                  </a:defRPr>
+                </a:pPr>
+                <a:endParaRPr lang="de-DE"/>
+              </a:p>
+            </c:txPr>
+            <c:dLblPos val="outEnd"/>
+            <c:showLegendKey val="0"/>
+            <c:showVal val="1"/>
+            <c:showCatName val="0"/>
+            <c:showSerName val="0"/>
+            <c:showPercent val="0"/>
+            <c:showBubbleSize val="0"/>
+            <c:showLeaderLines val="0"/>
+            <c:extLst>
+              <c:ext xmlns:c15="http://schemas.microsoft.com/office/drawing/2012/chart" uri="{CE6537A1-D6FC-4f65-9D91-7224C49458BB}">
+                <c15:layout/>
+                <c15:showLeaderLines val="1"/>
+                <c15:leaderLines>
+                  <c:spPr>
+                    <a:ln w="9525" cap="flat" cmpd="sng" algn="ctr">
+                      <a:solidFill>
+                        <a:schemeClr val="tx1">
+                          <a:lumMod val="35000"/>
+                          <a:lumOff val="65000"/>
+                        </a:schemeClr>
+                      </a:solidFill>
+                      <a:round/>
+                    </a:ln>
+                    <a:effectLst/>
+                  </c:spPr>
+                </c15:leaderLines>
+              </c:ext>
+            </c:extLst>
+          </c:dLbls>
+          <c:cat>
+            <c:strRef>
+              <c:f>Tabelle1!$A$2:$A$5</c:f>
+              <c:strCache>
+                <c:ptCount val="4"/>
+                <c:pt idx="0">
+                  <c:v>Kategorie 1</c:v>
+                </c:pt>
+                <c:pt idx="1">
+                  <c:v>Kategorie 2</c:v>
+                </c:pt>
+                <c:pt idx="2">
+                  <c:v>Kategorie 3</c:v>
+                </c:pt>
+                <c:pt idx="3">
+                  <c:v>Kategorie 4</c:v>
+                </c:pt>
+              </c:strCache>
+            </c:strRef>
+          </c:cat>
+          <c:val>
+            <c:numRef>
+              <c:f>Tabelle1!$D$2:$D$5</c:f>
+              <c:numCache>
+                <c:formatCode>General</c:formatCode>
+                <c:ptCount val="4"/>
+                <c:pt idx="0">
+                  <c:v>2</c:v>
+                </c:pt>
+                <c:pt idx="1">
+                  <c:v>2</c:v>
+                </c:pt>
+                <c:pt idx="2">
+                  <c:v>3</c:v>
+                </c:pt>
+                <c:pt idx="3">
+                  <c:v>5</c:v>
+                </c:pt>
+              </c:numCache>
+            </c:numRef>
+          </c:val>
+          <c:extLst>
+            <c:ext xmlns:c16="http://schemas.microsoft.com/office/drawing/2014/chart" uri="{C3380CC4-5D6E-409C-BE32-E72D297353CC}">
+              <c16:uniqueId val="{00000002-0596-4187-AED5-39249F57B34E}"/>
+            </c:ext>
+          </c:extLst>
+        </c:ser>
+        <c:dLbls>
+          <c:dLblPos val="outEnd"/>
+          <c:showLegendKey val="0"/>
+          <c:showVal val="1"/>
+          <c:showCatName val="0"/>
+          <c:showSerName val="0"/>
+          <c:showPercent val="0"/>
+          <c:showBubbleSize val="0"/>
+        </c:dLbls>
+        <c:gapWidth val="219"/>
+        <c:overlap val="-27"/>
+        <c:axId val="545519784"/>
+        <c:axId val="545520112"/>
+      </c:barChart>
+      <c:catAx>
+        <c:axId val="545519784"/>
+        <c:scaling>
+          <c:orientation val="minMax"/>
+        </c:scaling>
+        <c:delete val="1"/>
+        <c:axPos val="b"/>
+        <c:numFmt formatCode="General" sourceLinked="1"/>
+        <c:majorTickMark val="none"/>
+        <c:minorTickMark val="none"/>
+        <c:tickLblPos val="nextTo"/>
+        <c:crossAx val="545520112"/>
+        <c:crosses val="autoZero"/>
+        <c:auto val="1"/>
+        <c:lblAlgn val="ctr"/>
+        <c:lblOffset val="100"/>
+        <c:noMultiLvlLbl val="0"/>
+      </c:catAx>
+      <c:valAx>
+        <c:axId val="545520112"/>
+        <c:scaling>
+          <c:orientation val="minMax"/>
+        </c:scaling>
+        <c:delete val="1"/>
+        <c:axPos val="l"/>
+        <c:majorGridlines>
+          <c:spPr>
+            <a:ln w="9525" cap="flat" cmpd="sng" algn="ctr">
+              <a:solidFill>
+                <a:schemeClr val="tx1">
+                  <a:lumMod val="15000"/>
+                  <a:lumOff val="85000"/>
+                </a:schemeClr>
+              </a:solidFill>
+              <a:round/>
+            </a:ln>
+            <a:effectLst/>
+          </c:spPr>
+        </c:majorGridlines>
+        <c:numFmt formatCode="General" sourceLinked="1"/>
+        <c:majorTickMark val="none"/>
+        <c:minorTickMark val="none"/>
+        <c:tickLblPos val="nextTo"/>
+        <c:crossAx val="545519784"/>
+        <c:crosses val="autoZero"/>
+        <c:crossBetween val="between"/>
+      </c:valAx>
+      <c:dTable>
+        <c:showHorzBorder val="1"/>
+        <c:showVertBorder val="1"/>
+        <c:showOutline val="1"/>
+        <c:showKeys val="1"/>
+        <c:spPr>
+          <a:noFill/>
+          <a:ln w="9525" cap="flat" cmpd="sng" algn="ctr">
+            <a:solidFill>
+              <a:schemeClr val="tx1">
+                <a:lumMod val="15000"/>
+                <a:lumOff val="85000"/>
+              </a:schemeClr>
+            </a:solidFill>
+            <a:round/>
+          </a:ln>
+          <a:effectLst/>
+        </c:spPr>
+        <c:txPr>
+          <a:bodyPr rot="0" spcFirstLastPara="1" vertOverflow="ellipsis" vert="horz" wrap="square" anchor="ctr" anchorCtr="1"/>
+          <a:lstStyle/>
+          <a:p>
+            <a:pPr rtl="0">
+              <a:defRPr lang="de-DE" sz="1197" b="0" i="0" u="none" strike="noStrike" kern="1200" baseline="0">
+                <a:solidFill>
+                  <a:schemeClr val="tx1">
+                    <a:lumMod val="65000"/>
+                    <a:lumOff val="35000"/>
+                  </a:schemeClr>
+                </a:solidFill>
+                <a:latin typeface="+mn-lt"/>
+                <a:ea typeface="+mn-ea"/>
+                <a:cs typeface="+mn-cs"/>
+              </a:defRPr>
+            </a:pPr>
+            <a:endParaRPr lang="de-DE"/>
+          </a:p>
+        </c:txPr>
+      </c:dTable>
+      <c:spPr>
+        <a:noFill/>
+        <a:ln>
+          <a:noFill/>
+        </a:ln>
+        <a:effectLst/>
+      </c:spPr>
+    </c:plotArea>
+    <c:plotVisOnly val="1"/>
+    <c:dispBlanksAs val="gap"/>
+    <c:showDLblsOverMax val="0"/>
+  </c:chart>
+  <c:spPr>
+    <a:noFill/>
+    <a:ln>
+      <a:noFill/>
+    </a:ln>
+    <a:effectLst/>
+  </c:spPr>
+  <c:txPr>
+    <a:bodyPr/>
+    <a:lstStyle/>
+    <a:p>
+      <a:pPr>
+        <a:defRPr lang="de-DE"/>
+      </a:pPr>
+      <a:endParaRPr lang="de-DE"/>
+    </a:p>
+  </c:txPr>
+  <c:externalData r:id="rId3">
+    <c:autoUpdate val="0"/>
+  </c:externalData>
+</c:chartSpace>
+</file>
+
+<file path=ppt/charts/chartEx1.xml><?xml version="1.0" encoding="utf-8"?>
+<cx:chartSpace xmlns:a="http://schemas.openxmlformats.org/drawingml/2006/main" xmlns:r="http://schemas.openxmlformats.org/officeDocument/2006/relationships" xmlns:cx="http://schemas.microsoft.com/office/drawing/2014/chartex">
+  <cx:chartData>
+    <cx:externalData r:id="rId1" cx:autoUpdate="0"/>
+    <cx:data id="0">
+      <cx:strDim type="cat">
+        <cx:f dir="row">Tabelle1!$A$2:$A$5</cx:f>
+        <cx:lvl ptCount="4">
+          <cx:pt idx="0">Kategorie 1</cx:pt>
+          <cx:pt idx="1">Kategorie 2</cx:pt>
+          <cx:pt idx="2">Kategorie 3</cx:pt>
+          <cx:pt idx="3">Kategorie 4</cx:pt>
+        </cx:lvl>
+      </cx:strDim>
+      <cx:numDim type="size">
+        <cx:f dir="row">Tabelle1!$D$2:$D$5</cx:f>
+        <cx:lvl ptCount="4" formatCode="General">
+          <cx:pt idx="0">2</cx:pt>
+          <cx:pt idx="1">2</cx:pt>
+          <cx:pt idx="2">3</cx:pt>
+          <cx:pt idx="3">5</cx:pt>
+        </cx:lvl>
+      </cx:numDim>
+    </cx:data>
+  </cx:chartData>
+  <cx:chart>
+    <cx:title pos="t" align="ctr" overlay="0">
+      <cx:tx>
+        <cx:rich>
+          <a:bodyPr rot="0" spcFirstLastPara="1" vertOverflow="ellipsis" vert="horz" wrap="square" lIns="38100" tIns="19050" rIns="38100" bIns="19050" anchor="ctr" anchorCtr="1" compatLnSpc="0"/>
+          <a:lstStyle/>
+          <a:p>
+            <a:pPr algn="ctr" rtl="0">
+              <a:defRPr sz="1862" b="0" i="0" u="none" strike="noStrike" kern="1200" spc="0" baseline="0">
+                <a:solidFill>
+                  <a:prstClr val="black">
+                    <a:lumMod val="65000"/>
+                    <a:lumOff val="35000"/>
+                  </a:prstClr>
+                </a:solidFill>
+                <a:latin typeface="+mn-lt"/>
+                <a:ea typeface="+mn-ea"/>
+                <a:cs typeface="+mn-cs"/>
+              </a:defRPr>
+            </a:pPr>
+            <a:r>
+              <a:rPr kumimoji="0" lang="de-DE" sz="1862" b="0" i="0" u="none" strike="noStrike" kern="1200" cap="none" spc="0" normalizeH="0" baseline="0" noProof="0" dirty="0" smtClean="0">
+                <a:ln>
+                  <a:noFill/>
+                </a:ln>
+                <a:solidFill>
+                  <a:prstClr val="black">
+                    <a:lumMod val="65000"/>
+                    <a:lumOff val="35000"/>
+                  </a:prstClr>
+                </a:solidFill>
+                <a:effectLst/>
+                <a:uLnTx/>
+                <a:uFillTx/>
+                <a:latin typeface="Calibri" panose="020F0502020204030204"/>
+              </a:rPr>
+              <a:t>Diagrammtitel</a:t>
+            </a:r>
+            <a:endParaRPr kumimoji="0" lang="de-DE" sz="1862" b="0" i="0" u="none" strike="noStrike" kern="1200" cap="none" spc="0" normalizeH="0" baseline="0" noProof="0" dirty="0">
+              <a:ln>
+                <a:noFill/>
+              </a:ln>
+              <a:solidFill>
+                <a:prstClr val="black">
+                  <a:lumMod val="65000"/>
+                  <a:lumOff val="35000"/>
+                </a:prstClr>
+              </a:solidFill>
+              <a:effectLst/>
+              <a:uLnTx/>
+              <a:uFillTx/>
+              <a:latin typeface="Calibri" panose="020F0502020204030204"/>
+            </a:endParaRPr>
+          </a:p>
+        </cx:rich>
+      </cx:tx>
+    </cx:title>
+    <cx:plotArea>
+      <cx:plotAreaRegion>
+        <cx:series layoutId="treemap" uniqueId="{C2D05218-3621-4C1F-AF52-B14981DE24FF}">
+          <cx:tx>
+            <cx:txData>
+              <cx:f>Tabelle1!$D$1</cx:f>
+              <cx:v>Datenreihe 3</cx:v>
+            </cx:txData>
+          </cx:tx>
+          <cx:dataId val="0"/>
+          <cx:layoutPr/>
+        </cx:series>
+      </cx:plotAreaRegion>
+    </cx:plotArea>
+    <cx:legend pos="t" align="ctr" overlay="0"/>
+  </cx:chart>
+</cx:chartSpace>
+</file>
+
 <file path=ppt/charts/colors1.xml><?xml version="1.0" encoding="utf-8"?>
 <cs:colorStyle xmlns:cs="http://schemas.microsoft.com/office/drawing/2012/chartStyle" xmlns:a="http://schemas.openxmlformats.org/drawingml/2006/main" meth="cycle" id="10">
   <a:schemeClr val="accent1"/>
@@ -1680,6 +2811,126 @@
 </file>
 
 <file path=ppt/charts/colors3.xml><?xml version="1.0" encoding="utf-8"?>
+<cs:colorStyle xmlns:cs="http://schemas.microsoft.com/office/drawing/2012/chartStyle" xmlns:a="http://schemas.openxmlformats.org/drawingml/2006/main" meth="cycle" id="10">
+  <a:schemeClr val="accent1"/>
+  <a:schemeClr val="accent2"/>
+  <a:schemeClr val="accent3"/>
+  <a:schemeClr val="accent4"/>
+  <a:schemeClr val="accent5"/>
+  <a:schemeClr val="accent6"/>
+  <cs:variation/>
+  <cs:variation>
+    <a:lumMod val="60000"/>
+  </cs:variation>
+  <cs:variation>
+    <a:lumMod val="80000"/>
+    <a:lumOff val="20000"/>
+  </cs:variation>
+  <cs:variation>
+    <a:lumMod val="80000"/>
+  </cs:variation>
+  <cs:variation>
+    <a:lumMod val="60000"/>
+    <a:lumOff val="40000"/>
+  </cs:variation>
+  <cs:variation>
+    <a:lumMod val="50000"/>
+  </cs:variation>
+  <cs:variation>
+    <a:lumMod val="70000"/>
+    <a:lumOff val="30000"/>
+  </cs:variation>
+  <cs:variation>
+    <a:lumMod val="70000"/>
+  </cs:variation>
+  <cs:variation>
+    <a:lumMod val="50000"/>
+    <a:lumOff val="50000"/>
+  </cs:variation>
+</cs:colorStyle>
+</file>
+
+<file path=ppt/charts/colors4.xml><?xml version="1.0" encoding="utf-8"?>
+<cs:colorStyle xmlns:cs="http://schemas.microsoft.com/office/drawing/2012/chartStyle" xmlns:a="http://schemas.openxmlformats.org/drawingml/2006/main" meth="cycle" id="10">
+  <a:schemeClr val="accent1"/>
+  <a:schemeClr val="accent2"/>
+  <a:schemeClr val="accent3"/>
+  <a:schemeClr val="accent4"/>
+  <a:schemeClr val="accent5"/>
+  <a:schemeClr val="accent6"/>
+  <cs:variation/>
+  <cs:variation>
+    <a:lumMod val="60000"/>
+  </cs:variation>
+  <cs:variation>
+    <a:lumMod val="80000"/>
+    <a:lumOff val="20000"/>
+  </cs:variation>
+  <cs:variation>
+    <a:lumMod val="80000"/>
+  </cs:variation>
+  <cs:variation>
+    <a:lumMod val="60000"/>
+    <a:lumOff val="40000"/>
+  </cs:variation>
+  <cs:variation>
+    <a:lumMod val="50000"/>
+  </cs:variation>
+  <cs:variation>
+    <a:lumMod val="70000"/>
+    <a:lumOff val="30000"/>
+  </cs:variation>
+  <cs:variation>
+    <a:lumMod val="70000"/>
+  </cs:variation>
+  <cs:variation>
+    <a:lumMod val="50000"/>
+    <a:lumOff val="50000"/>
+  </cs:variation>
+</cs:colorStyle>
+</file>
+
+<file path=ppt/charts/colors5.xml><?xml version="1.0" encoding="utf-8"?>
+<cs:colorStyle xmlns:cs="http://schemas.microsoft.com/office/drawing/2012/chartStyle" xmlns:a="http://schemas.openxmlformats.org/drawingml/2006/main" meth="cycle" id="10">
+  <a:schemeClr val="accent1"/>
+  <a:schemeClr val="accent2"/>
+  <a:schemeClr val="accent3"/>
+  <a:schemeClr val="accent4"/>
+  <a:schemeClr val="accent5"/>
+  <a:schemeClr val="accent6"/>
+  <cs:variation/>
+  <cs:variation>
+    <a:lumMod val="60000"/>
+  </cs:variation>
+  <cs:variation>
+    <a:lumMod val="80000"/>
+    <a:lumOff val="20000"/>
+  </cs:variation>
+  <cs:variation>
+    <a:lumMod val="80000"/>
+  </cs:variation>
+  <cs:variation>
+    <a:lumMod val="60000"/>
+    <a:lumOff val="40000"/>
+  </cs:variation>
+  <cs:variation>
+    <a:lumMod val="50000"/>
+  </cs:variation>
+  <cs:variation>
+    <a:lumMod val="70000"/>
+    <a:lumOff val="30000"/>
+  </cs:variation>
+  <cs:variation>
+    <a:lumMod val="70000"/>
+  </cs:variation>
+  <cs:variation>
+    <a:lumMod val="50000"/>
+    <a:lumOff val="50000"/>
+  </cs:variation>
+</cs:colorStyle>
+</file>
+
+<file path=ppt/charts/colors6.xml><?xml version="1.0" encoding="utf-8"?>
 <cs:colorStyle xmlns:cs="http://schemas.microsoft.com/office/drawing/2012/chartStyle" xmlns:a="http://schemas.openxmlformats.org/drawingml/2006/main" meth="cycle" id="10">
   <a:schemeClr val="accent1"/>
   <a:schemeClr val="accent2"/>
@@ -2726,6 +3977,1515 @@
 </file>
 
 <file path=ppt/charts/style3.xml><?xml version="1.0" encoding="utf-8"?>
+<cs:chartStyle xmlns:cs="http://schemas.microsoft.com/office/drawing/2012/chartStyle" xmlns:a="http://schemas.openxmlformats.org/drawingml/2006/main" id="201">
+  <cs:axisTitle>
+    <cs:lnRef idx="0"/>
+    <cs:fillRef idx="0"/>
+    <cs:effectRef idx="0"/>
+    <cs:fontRef idx="minor">
+      <a:schemeClr val="tx1">
+        <a:lumMod val="65000"/>
+        <a:lumOff val="35000"/>
+      </a:schemeClr>
+    </cs:fontRef>
+    <cs:defRPr sz="1330" kern="1200"/>
+  </cs:axisTitle>
+  <cs:categoryAxis>
+    <cs:lnRef idx="0"/>
+    <cs:fillRef idx="0"/>
+    <cs:effectRef idx="0"/>
+    <cs:fontRef idx="minor">
+      <a:schemeClr val="tx1">
+        <a:lumMod val="65000"/>
+        <a:lumOff val="35000"/>
+      </a:schemeClr>
+    </cs:fontRef>
+    <cs:spPr>
+      <a:ln w="9525" cap="flat" cmpd="sng" algn="ctr">
+        <a:solidFill>
+          <a:schemeClr val="tx1">
+            <a:lumMod val="15000"/>
+            <a:lumOff val="85000"/>
+          </a:schemeClr>
+        </a:solidFill>
+        <a:round/>
+      </a:ln>
+    </cs:spPr>
+    <cs:defRPr sz="1197" kern="1200"/>
+  </cs:categoryAxis>
+  <cs:chartArea mods="allowNoFillOverride allowNoLineOverride">
+    <cs:lnRef idx="0"/>
+    <cs:fillRef idx="0"/>
+    <cs:effectRef idx="0"/>
+    <cs:fontRef idx="minor">
+      <a:schemeClr val="tx1"/>
+    </cs:fontRef>
+    <cs:spPr>
+      <a:solidFill>
+        <a:schemeClr val="bg1"/>
+      </a:solidFill>
+      <a:ln w="9525" cap="flat" cmpd="sng" algn="ctr">
+        <a:solidFill>
+          <a:schemeClr val="tx1">
+            <a:lumMod val="15000"/>
+            <a:lumOff val="85000"/>
+          </a:schemeClr>
+        </a:solidFill>
+        <a:round/>
+      </a:ln>
+    </cs:spPr>
+    <cs:defRPr sz="1330" kern="1200"/>
+  </cs:chartArea>
+  <cs:dataLabel>
+    <cs:lnRef idx="0"/>
+    <cs:fillRef idx="0"/>
+    <cs:effectRef idx="0"/>
+    <cs:fontRef idx="minor">
+      <a:schemeClr val="tx1">
+        <a:lumMod val="75000"/>
+        <a:lumOff val="25000"/>
+      </a:schemeClr>
+    </cs:fontRef>
+    <cs:defRPr sz="1197" kern="1200"/>
+  </cs:dataLabel>
+  <cs:dataLabelCallout>
+    <cs:lnRef idx="0"/>
+    <cs:fillRef idx="0"/>
+    <cs:effectRef idx="0"/>
+    <cs:fontRef idx="minor">
+      <a:schemeClr val="dk1">
+        <a:lumMod val="65000"/>
+        <a:lumOff val="35000"/>
+      </a:schemeClr>
+    </cs:fontRef>
+    <cs:spPr>
+      <a:solidFill>
+        <a:schemeClr val="lt1"/>
+      </a:solidFill>
+      <a:ln>
+        <a:solidFill>
+          <a:schemeClr val="dk1">
+            <a:lumMod val="25000"/>
+            <a:lumOff val="75000"/>
+          </a:schemeClr>
+        </a:solidFill>
+      </a:ln>
+    </cs:spPr>
+    <cs:defRPr sz="1197" kern="1200"/>
+    <cs:bodyPr rot="0" spcFirstLastPara="1" vertOverflow="clip" horzOverflow="clip" vert="horz" wrap="square" lIns="36576" tIns="18288" rIns="36576" bIns="18288" anchor="ctr" anchorCtr="1">
+      <a:spAutoFit/>
+    </cs:bodyPr>
+  </cs:dataLabelCallout>
+  <cs:dataPoint>
+    <cs:lnRef idx="0"/>
+    <cs:fillRef idx="1">
+      <cs:styleClr val="auto"/>
+    </cs:fillRef>
+    <cs:effectRef idx="0"/>
+    <cs:fontRef idx="minor">
+      <a:schemeClr val="tx1"/>
+    </cs:fontRef>
+  </cs:dataPoint>
+  <cs:dataPoint3D>
+    <cs:lnRef idx="0"/>
+    <cs:fillRef idx="1">
+      <cs:styleClr val="auto"/>
+    </cs:fillRef>
+    <cs:effectRef idx="0"/>
+    <cs:fontRef idx="minor">
+      <a:schemeClr val="tx1"/>
+    </cs:fontRef>
+  </cs:dataPoint3D>
+  <cs:dataPointLine>
+    <cs:lnRef idx="0">
+      <cs:styleClr val="auto"/>
+    </cs:lnRef>
+    <cs:fillRef idx="1"/>
+    <cs:effectRef idx="0"/>
+    <cs:fontRef idx="minor">
+      <a:schemeClr val="tx1"/>
+    </cs:fontRef>
+    <cs:spPr>
+      <a:ln w="28575" cap="rnd">
+        <a:solidFill>
+          <a:schemeClr val="phClr"/>
+        </a:solidFill>
+        <a:round/>
+      </a:ln>
+    </cs:spPr>
+  </cs:dataPointLine>
+  <cs:dataPointMarker>
+    <cs:lnRef idx="0">
+      <cs:styleClr val="auto"/>
+    </cs:lnRef>
+    <cs:fillRef idx="1">
+      <cs:styleClr val="auto"/>
+    </cs:fillRef>
+    <cs:effectRef idx="0"/>
+    <cs:fontRef idx="minor">
+      <a:schemeClr val="tx1"/>
+    </cs:fontRef>
+    <cs:spPr>
+      <a:ln w="9525">
+        <a:solidFill>
+          <a:schemeClr val="phClr"/>
+        </a:solidFill>
+      </a:ln>
+    </cs:spPr>
+  </cs:dataPointMarker>
+  <cs:dataPointMarkerLayout symbol="circle" size="5"/>
+  <cs:dataPointWireframe>
+    <cs:lnRef idx="0">
+      <cs:styleClr val="auto"/>
+    </cs:lnRef>
+    <cs:fillRef idx="1"/>
+    <cs:effectRef idx="0"/>
+    <cs:fontRef idx="minor">
+      <a:schemeClr val="tx1"/>
+    </cs:fontRef>
+    <cs:spPr>
+      <a:ln w="9525" cap="rnd">
+        <a:solidFill>
+          <a:schemeClr val="phClr"/>
+        </a:solidFill>
+        <a:round/>
+      </a:ln>
+    </cs:spPr>
+  </cs:dataPointWireframe>
+  <cs:dataTable>
+    <cs:lnRef idx="0"/>
+    <cs:fillRef idx="0"/>
+    <cs:effectRef idx="0"/>
+    <cs:fontRef idx="minor">
+      <a:schemeClr val="tx1">
+        <a:lumMod val="65000"/>
+        <a:lumOff val="35000"/>
+      </a:schemeClr>
+    </cs:fontRef>
+    <cs:spPr>
+      <a:noFill/>
+      <a:ln w="9525" cap="flat" cmpd="sng" algn="ctr">
+        <a:solidFill>
+          <a:schemeClr val="tx1">
+            <a:lumMod val="15000"/>
+            <a:lumOff val="85000"/>
+          </a:schemeClr>
+        </a:solidFill>
+        <a:round/>
+      </a:ln>
+    </cs:spPr>
+    <cs:defRPr sz="1197" kern="1200"/>
+  </cs:dataTable>
+  <cs:downBar>
+    <cs:lnRef idx="0"/>
+    <cs:fillRef idx="0"/>
+    <cs:effectRef idx="0"/>
+    <cs:fontRef idx="minor">
+      <a:schemeClr val="dk1"/>
+    </cs:fontRef>
+    <cs:spPr>
+      <a:solidFill>
+        <a:schemeClr val="dk1">
+          <a:lumMod val="65000"/>
+          <a:lumOff val="35000"/>
+        </a:schemeClr>
+      </a:solidFill>
+      <a:ln w="9525">
+        <a:solidFill>
+          <a:schemeClr val="tx1">
+            <a:lumMod val="65000"/>
+            <a:lumOff val="35000"/>
+          </a:schemeClr>
+        </a:solidFill>
+      </a:ln>
+    </cs:spPr>
+  </cs:downBar>
+  <cs:dropLine>
+    <cs:lnRef idx="0"/>
+    <cs:fillRef idx="0"/>
+    <cs:effectRef idx="0"/>
+    <cs:fontRef idx="minor">
+      <a:schemeClr val="tx1"/>
+    </cs:fontRef>
+    <cs:spPr>
+      <a:ln w="9525" cap="flat" cmpd="sng" algn="ctr">
+        <a:solidFill>
+          <a:schemeClr val="tx1">
+            <a:lumMod val="35000"/>
+            <a:lumOff val="65000"/>
+          </a:schemeClr>
+        </a:solidFill>
+        <a:round/>
+      </a:ln>
+    </cs:spPr>
+  </cs:dropLine>
+  <cs:errorBar>
+    <cs:lnRef idx="0"/>
+    <cs:fillRef idx="0"/>
+    <cs:effectRef idx="0"/>
+    <cs:fontRef idx="minor">
+      <a:schemeClr val="tx1"/>
+    </cs:fontRef>
+    <cs:spPr>
+      <a:ln w="9525" cap="flat" cmpd="sng" algn="ctr">
+        <a:solidFill>
+          <a:schemeClr val="tx1">
+            <a:lumMod val="65000"/>
+            <a:lumOff val="35000"/>
+          </a:schemeClr>
+        </a:solidFill>
+        <a:round/>
+      </a:ln>
+    </cs:spPr>
+  </cs:errorBar>
+  <cs:floor>
+    <cs:lnRef idx="0"/>
+    <cs:fillRef idx="0"/>
+    <cs:effectRef idx="0"/>
+    <cs:fontRef idx="minor">
+      <a:schemeClr val="tx1"/>
+    </cs:fontRef>
+    <cs:spPr>
+      <a:noFill/>
+      <a:ln>
+        <a:noFill/>
+      </a:ln>
+    </cs:spPr>
+  </cs:floor>
+  <cs:gridlineMajor>
+    <cs:lnRef idx="0"/>
+    <cs:fillRef idx="0"/>
+    <cs:effectRef idx="0"/>
+    <cs:fontRef idx="minor">
+      <a:schemeClr val="tx1"/>
+    </cs:fontRef>
+    <cs:spPr>
+      <a:ln w="9525" cap="flat" cmpd="sng" algn="ctr">
+        <a:solidFill>
+          <a:schemeClr val="tx1">
+            <a:lumMod val="15000"/>
+            <a:lumOff val="85000"/>
+          </a:schemeClr>
+        </a:solidFill>
+        <a:round/>
+      </a:ln>
+    </cs:spPr>
+  </cs:gridlineMajor>
+  <cs:gridlineMinor>
+    <cs:lnRef idx="0"/>
+    <cs:fillRef idx="0"/>
+    <cs:effectRef idx="0"/>
+    <cs:fontRef idx="minor">
+      <a:schemeClr val="tx1"/>
+    </cs:fontRef>
+    <cs:spPr>
+      <a:ln w="9525" cap="flat" cmpd="sng" algn="ctr">
+        <a:solidFill>
+          <a:schemeClr val="tx1">
+            <a:lumMod val="5000"/>
+            <a:lumOff val="95000"/>
+          </a:schemeClr>
+        </a:solidFill>
+        <a:round/>
+      </a:ln>
+    </cs:spPr>
+  </cs:gridlineMinor>
+  <cs:hiLoLine>
+    <cs:lnRef idx="0"/>
+    <cs:fillRef idx="0"/>
+    <cs:effectRef idx="0"/>
+    <cs:fontRef idx="minor">
+      <a:schemeClr val="tx1"/>
+    </cs:fontRef>
+    <cs:spPr>
+      <a:ln w="9525" cap="flat" cmpd="sng" algn="ctr">
+        <a:solidFill>
+          <a:schemeClr val="tx1">
+            <a:lumMod val="75000"/>
+            <a:lumOff val="25000"/>
+          </a:schemeClr>
+        </a:solidFill>
+        <a:round/>
+      </a:ln>
+    </cs:spPr>
+  </cs:hiLoLine>
+  <cs:leaderLine>
+    <cs:lnRef idx="0"/>
+    <cs:fillRef idx="0"/>
+    <cs:effectRef idx="0"/>
+    <cs:fontRef idx="minor">
+      <a:schemeClr val="tx1"/>
+    </cs:fontRef>
+    <cs:spPr>
+      <a:ln w="9525" cap="flat" cmpd="sng" algn="ctr">
+        <a:solidFill>
+          <a:schemeClr val="tx1">
+            <a:lumMod val="35000"/>
+            <a:lumOff val="65000"/>
+          </a:schemeClr>
+        </a:solidFill>
+        <a:round/>
+      </a:ln>
+    </cs:spPr>
+  </cs:leaderLine>
+  <cs:legend>
+    <cs:lnRef idx="0"/>
+    <cs:fillRef idx="0"/>
+    <cs:effectRef idx="0"/>
+    <cs:fontRef idx="minor">
+      <a:schemeClr val="tx1">
+        <a:lumMod val="65000"/>
+        <a:lumOff val="35000"/>
+      </a:schemeClr>
+    </cs:fontRef>
+    <cs:defRPr sz="1197" kern="1200"/>
+  </cs:legend>
+  <cs:plotArea mods="allowNoFillOverride allowNoLineOverride">
+    <cs:lnRef idx="0"/>
+    <cs:fillRef idx="0"/>
+    <cs:effectRef idx="0"/>
+    <cs:fontRef idx="minor">
+      <a:schemeClr val="tx1"/>
+    </cs:fontRef>
+  </cs:plotArea>
+  <cs:plotArea3D mods="allowNoFillOverride allowNoLineOverride">
+    <cs:lnRef idx="0"/>
+    <cs:fillRef idx="0"/>
+    <cs:effectRef idx="0"/>
+    <cs:fontRef idx="minor">
+      <a:schemeClr val="tx1"/>
+    </cs:fontRef>
+  </cs:plotArea3D>
+  <cs:seriesAxis>
+    <cs:lnRef idx="0"/>
+    <cs:fillRef idx="0"/>
+    <cs:effectRef idx="0"/>
+    <cs:fontRef idx="minor">
+      <a:schemeClr val="tx1">
+        <a:lumMod val="65000"/>
+        <a:lumOff val="35000"/>
+      </a:schemeClr>
+    </cs:fontRef>
+    <cs:defRPr sz="1197" kern="1200"/>
+  </cs:seriesAxis>
+  <cs:seriesLine>
+    <cs:lnRef idx="0"/>
+    <cs:fillRef idx="0"/>
+    <cs:effectRef idx="0"/>
+    <cs:fontRef idx="minor">
+      <a:schemeClr val="tx1"/>
+    </cs:fontRef>
+    <cs:spPr>
+      <a:ln w="9525" cap="flat" cmpd="sng" algn="ctr">
+        <a:solidFill>
+          <a:schemeClr val="tx1">
+            <a:lumMod val="35000"/>
+            <a:lumOff val="65000"/>
+          </a:schemeClr>
+        </a:solidFill>
+        <a:round/>
+      </a:ln>
+    </cs:spPr>
+  </cs:seriesLine>
+  <cs:title>
+    <cs:lnRef idx="0"/>
+    <cs:fillRef idx="0"/>
+    <cs:effectRef idx="0"/>
+    <cs:fontRef idx="minor">
+      <a:schemeClr val="tx1">
+        <a:lumMod val="65000"/>
+        <a:lumOff val="35000"/>
+      </a:schemeClr>
+    </cs:fontRef>
+    <cs:defRPr sz="1862" b="0" kern="1200" spc="0" baseline="0"/>
+  </cs:title>
+  <cs:trendline>
+    <cs:lnRef idx="0">
+      <cs:styleClr val="auto"/>
+    </cs:lnRef>
+    <cs:fillRef idx="0"/>
+    <cs:effectRef idx="0"/>
+    <cs:fontRef idx="minor">
+      <a:schemeClr val="tx1"/>
+    </cs:fontRef>
+    <cs:spPr>
+      <a:ln w="19050" cap="rnd">
+        <a:solidFill>
+          <a:schemeClr val="phClr"/>
+        </a:solidFill>
+        <a:prstDash val="sysDot"/>
+      </a:ln>
+    </cs:spPr>
+  </cs:trendline>
+  <cs:trendlineLabel>
+    <cs:lnRef idx="0"/>
+    <cs:fillRef idx="0"/>
+    <cs:effectRef idx="0"/>
+    <cs:fontRef idx="minor">
+      <a:schemeClr val="tx1">
+        <a:lumMod val="65000"/>
+        <a:lumOff val="35000"/>
+      </a:schemeClr>
+    </cs:fontRef>
+    <cs:defRPr sz="1197" kern="1200"/>
+  </cs:trendlineLabel>
+  <cs:upBar>
+    <cs:lnRef idx="0"/>
+    <cs:fillRef idx="0"/>
+    <cs:effectRef idx="0"/>
+    <cs:fontRef idx="minor">
+      <a:schemeClr val="dk1"/>
+    </cs:fontRef>
+    <cs:spPr>
+      <a:solidFill>
+        <a:schemeClr val="lt1"/>
+      </a:solidFill>
+      <a:ln w="9525">
+        <a:solidFill>
+          <a:schemeClr val="tx1">
+            <a:lumMod val="15000"/>
+            <a:lumOff val="85000"/>
+          </a:schemeClr>
+        </a:solidFill>
+      </a:ln>
+    </cs:spPr>
+  </cs:upBar>
+  <cs:valueAxis>
+    <cs:lnRef idx="0"/>
+    <cs:fillRef idx="0"/>
+    <cs:effectRef idx="0"/>
+    <cs:fontRef idx="minor">
+      <a:schemeClr val="tx1">
+        <a:lumMod val="65000"/>
+        <a:lumOff val="35000"/>
+      </a:schemeClr>
+    </cs:fontRef>
+    <cs:defRPr sz="1197" kern="1200"/>
+  </cs:valueAxis>
+  <cs:wall>
+    <cs:lnRef idx="0"/>
+    <cs:fillRef idx="0"/>
+    <cs:effectRef idx="0"/>
+    <cs:fontRef idx="minor">
+      <a:schemeClr val="tx1"/>
+    </cs:fontRef>
+    <cs:spPr>
+      <a:noFill/>
+      <a:ln>
+        <a:noFill/>
+      </a:ln>
+    </cs:spPr>
+  </cs:wall>
+</cs:chartStyle>
+</file>
+
+<file path=ppt/charts/style4.xml><?xml version="1.0" encoding="utf-8"?>
+<cs:chartStyle xmlns:cs="http://schemas.microsoft.com/office/drawing/2012/chartStyle" xmlns:a="http://schemas.openxmlformats.org/drawingml/2006/main" id="201">
+  <cs:axisTitle>
+    <cs:lnRef idx="0"/>
+    <cs:fillRef idx="0"/>
+    <cs:effectRef idx="0"/>
+    <cs:fontRef idx="minor">
+      <a:schemeClr val="tx1">
+        <a:lumMod val="65000"/>
+        <a:lumOff val="35000"/>
+      </a:schemeClr>
+    </cs:fontRef>
+    <cs:defRPr sz="1330" kern="1200"/>
+  </cs:axisTitle>
+  <cs:categoryAxis>
+    <cs:lnRef idx="0"/>
+    <cs:fillRef idx="0"/>
+    <cs:effectRef idx="0"/>
+    <cs:fontRef idx="minor">
+      <a:schemeClr val="tx1">
+        <a:lumMod val="65000"/>
+        <a:lumOff val="35000"/>
+      </a:schemeClr>
+    </cs:fontRef>
+    <cs:spPr>
+      <a:ln w="9525" cap="flat" cmpd="sng" algn="ctr">
+        <a:solidFill>
+          <a:schemeClr val="tx1">
+            <a:lumMod val="15000"/>
+            <a:lumOff val="85000"/>
+          </a:schemeClr>
+        </a:solidFill>
+        <a:round/>
+      </a:ln>
+    </cs:spPr>
+    <cs:defRPr sz="1197" kern="1200"/>
+  </cs:categoryAxis>
+  <cs:chartArea mods="allowNoFillOverride allowNoLineOverride">
+    <cs:lnRef idx="0"/>
+    <cs:fillRef idx="0"/>
+    <cs:effectRef idx="0"/>
+    <cs:fontRef idx="minor">
+      <a:schemeClr val="tx1"/>
+    </cs:fontRef>
+    <cs:spPr>
+      <a:solidFill>
+        <a:schemeClr val="bg1"/>
+      </a:solidFill>
+      <a:ln w="9525" cap="flat" cmpd="sng" algn="ctr">
+        <a:solidFill>
+          <a:schemeClr val="tx1">
+            <a:lumMod val="15000"/>
+            <a:lumOff val="85000"/>
+          </a:schemeClr>
+        </a:solidFill>
+        <a:round/>
+      </a:ln>
+    </cs:spPr>
+    <cs:defRPr sz="1330" kern="1200"/>
+  </cs:chartArea>
+  <cs:dataLabel>
+    <cs:lnRef idx="0"/>
+    <cs:fillRef idx="0"/>
+    <cs:effectRef idx="0"/>
+    <cs:fontRef idx="minor">
+      <a:schemeClr val="tx1">
+        <a:lumMod val="75000"/>
+        <a:lumOff val="25000"/>
+      </a:schemeClr>
+    </cs:fontRef>
+    <cs:defRPr sz="1197" kern="1200"/>
+  </cs:dataLabel>
+  <cs:dataLabelCallout>
+    <cs:lnRef idx="0"/>
+    <cs:fillRef idx="0"/>
+    <cs:effectRef idx="0"/>
+    <cs:fontRef idx="minor">
+      <a:schemeClr val="dk1">
+        <a:lumMod val="65000"/>
+        <a:lumOff val="35000"/>
+      </a:schemeClr>
+    </cs:fontRef>
+    <cs:spPr>
+      <a:solidFill>
+        <a:schemeClr val="lt1"/>
+      </a:solidFill>
+      <a:ln>
+        <a:solidFill>
+          <a:schemeClr val="dk1">
+            <a:lumMod val="25000"/>
+            <a:lumOff val="75000"/>
+          </a:schemeClr>
+        </a:solidFill>
+      </a:ln>
+    </cs:spPr>
+    <cs:defRPr sz="1197" kern="1200"/>
+    <cs:bodyPr rot="0" spcFirstLastPara="1" vertOverflow="clip" horzOverflow="clip" vert="horz" wrap="square" lIns="36576" tIns="18288" rIns="36576" bIns="18288" anchor="ctr" anchorCtr="1">
+      <a:spAutoFit/>
+    </cs:bodyPr>
+  </cs:dataLabelCallout>
+  <cs:dataPoint>
+    <cs:lnRef idx="0"/>
+    <cs:fillRef idx="1">
+      <cs:styleClr val="auto"/>
+    </cs:fillRef>
+    <cs:effectRef idx="0"/>
+    <cs:fontRef idx="minor">
+      <a:schemeClr val="tx1"/>
+    </cs:fontRef>
+  </cs:dataPoint>
+  <cs:dataPoint3D>
+    <cs:lnRef idx="0"/>
+    <cs:fillRef idx="1">
+      <cs:styleClr val="auto"/>
+    </cs:fillRef>
+    <cs:effectRef idx="0"/>
+    <cs:fontRef idx="minor">
+      <a:schemeClr val="tx1"/>
+    </cs:fontRef>
+  </cs:dataPoint3D>
+  <cs:dataPointLine>
+    <cs:lnRef idx="0">
+      <cs:styleClr val="auto"/>
+    </cs:lnRef>
+    <cs:fillRef idx="1"/>
+    <cs:effectRef idx="0"/>
+    <cs:fontRef idx="minor">
+      <a:schemeClr val="tx1"/>
+    </cs:fontRef>
+    <cs:spPr>
+      <a:ln w="28575" cap="rnd">
+        <a:solidFill>
+          <a:schemeClr val="phClr"/>
+        </a:solidFill>
+        <a:round/>
+      </a:ln>
+    </cs:spPr>
+  </cs:dataPointLine>
+  <cs:dataPointMarker>
+    <cs:lnRef idx="0">
+      <cs:styleClr val="auto"/>
+    </cs:lnRef>
+    <cs:fillRef idx="1">
+      <cs:styleClr val="auto"/>
+    </cs:fillRef>
+    <cs:effectRef idx="0"/>
+    <cs:fontRef idx="minor">
+      <a:schemeClr val="tx1"/>
+    </cs:fontRef>
+    <cs:spPr>
+      <a:ln w="9525">
+        <a:solidFill>
+          <a:schemeClr val="phClr"/>
+        </a:solidFill>
+      </a:ln>
+    </cs:spPr>
+  </cs:dataPointMarker>
+  <cs:dataPointMarkerLayout symbol="circle" size="5"/>
+  <cs:dataPointWireframe>
+    <cs:lnRef idx="0">
+      <cs:styleClr val="auto"/>
+    </cs:lnRef>
+    <cs:fillRef idx="1"/>
+    <cs:effectRef idx="0"/>
+    <cs:fontRef idx="minor">
+      <a:schemeClr val="tx1"/>
+    </cs:fontRef>
+    <cs:spPr>
+      <a:ln w="9525" cap="rnd">
+        <a:solidFill>
+          <a:schemeClr val="phClr"/>
+        </a:solidFill>
+        <a:round/>
+      </a:ln>
+    </cs:spPr>
+  </cs:dataPointWireframe>
+  <cs:dataTable>
+    <cs:lnRef idx="0"/>
+    <cs:fillRef idx="0"/>
+    <cs:effectRef idx="0"/>
+    <cs:fontRef idx="minor">
+      <a:schemeClr val="tx1">
+        <a:lumMod val="65000"/>
+        <a:lumOff val="35000"/>
+      </a:schemeClr>
+    </cs:fontRef>
+    <cs:spPr>
+      <a:noFill/>
+      <a:ln w="9525" cap="flat" cmpd="sng" algn="ctr">
+        <a:solidFill>
+          <a:schemeClr val="tx1">
+            <a:lumMod val="15000"/>
+            <a:lumOff val="85000"/>
+          </a:schemeClr>
+        </a:solidFill>
+        <a:round/>
+      </a:ln>
+    </cs:spPr>
+    <cs:defRPr sz="1197" kern="1200"/>
+  </cs:dataTable>
+  <cs:downBar>
+    <cs:lnRef idx="0"/>
+    <cs:fillRef idx="0"/>
+    <cs:effectRef idx="0"/>
+    <cs:fontRef idx="minor">
+      <a:schemeClr val="dk1"/>
+    </cs:fontRef>
+    <cs:spPr>
+      <a:solidFill>
+        <a:schemeClr val="dk1">
+          <a:lumMod val="65000"/>
+          <a:lumOff val="35000"/>
+        </a:schemeClr>
+      </a:solidFill>
+      <a:ln w="9525">
+        <a:solidFill>
+          <a:schemeClr val="tx1">
+            <a:lumMod val="65000"/>
+            <a:lumOff val="35000"/>
+          </a:schemeClr>
+        </a:solidFill>
+      </a:ln>
+    </cs:spPr>
+  </cs:downBar>
+  <cs:dropLine>
+    <cs:lnRef idx="0"/>
+    <cs:fillRef idx="0"/>
+    <cs:effectRef idx="0"/>
+    <cs:fontRef idx="minor">
+      <a:schemeClr val="tx1"/>
+    </cs:fontRef>
+    <cs:spPr>
+      <a:ln w="9525" cap="flat" cmpd="sng" algn="ctr">
+        <a:solidFill>
+          <a:schemeClr val="tx1">
+            <a:lumMod val="35000"/>
+            <a:lumOff val="65000"/>
+          </a:schemeClr>
+        </a:solidFill>
+        <a:round/>
+      </a:ln>
+    </cs:spPr>
+  </cs:dropLine>
+  <cs:errorBar>
+    <cs:lnRef idx="0"/>
+    <cs:fillRef idx="0"/>
+    <cs:effectRef idx="0"/>
+    <cs:fontRef idx="minor">
+      <a:schemeClr val="tx1"/>
+    </cs:fontRef>
+    <cs:spPr>
+      <a:ln w="9525" cap="flat" cmpd="sng" algn="ctr">
+        <a:solidFill>
+          <a:schemeClr val="tx1">
+            <a:lumMod val="65000"/>
+            <a:lumOff val="35000"/>
+          </a:schemeClr>
+        </a:solidFill>
+        <a:round/>
+      </a:ln>
+    </cs:spPr>
+  </cs:errorBar>
+  <cs:floor>
+    <cs:lnRef idx="0"/>
+    <cs:fillRef idx="0"/>
+    <cs:effectRef idx="0"/>
+    <cs:fontRef idx="minor">
+      <a:schemeClr val="tx1"/>
+    </cs:fontRef>
+    <cs:spPr>
+      <a:noFill/>
+      <a:ln>
+        <a:noFill/>
+      </a:ln>
+    </cs:spPr>
+  </cs:floor>
+  <cs:gridlineMajor>
+    <cs:lnRef idx="0"/>
+    <cs:fillRef idx="0"/>
+    <cs:effectRef idx="0"/>
+    <cs:fontRef idx="minor">
+      <a:schemeClr val="tx1"/>
+    </cs:fontRef>
+    <cs:spPr>
+      <a:ln w="9525" cap="flat" cmpd="sng" algn="ctr">
+        <a:solidFill>
+          <a:schemeClr val="tx1">
+            <a:lumMod val="15000"/>
+            <a:lumOff val="85000"/>
+          </a:schemeClr>
+        </a:solidFill>
+        <a:round/>
+      </a:ln>
+    </cs:spPr>
+  </cs:gridlineMajor>
+  <cs:gridlineMinor>
+    <cs:lnRef idx="0"/>
+    <cs:fillRef idx="0"/>
+    <cs:effectRef idx="0"/>
+    <cs:fontRef idx="minor">
+      <a:schemeClr val="tx1"/>
+    </cs:fontRef>
+    <cs:spPr>
+      <a:ln w="9525" cap="flat" cmpd="sng" algn="ctr">
+        <a:solidFill>
+          <a:schemeClr val="tx1">
+            <a:lumMod val="5000"/>
+            <a:lumOff val="95000"/>
+          </a:schemeClr>
+        </a:solidFill>
+        <a:round/>
+      </a:ln>
+    </cs:spPr>
+  </cs:gridlineMinor>
+  <cs:hiLoLine>
+    <cs:lnRef idx="0"/>
+    <cs:fillRef idx="0"/>
+    <cs:effectRef idx="0"/>
+    <cs:fontRef idx="minor">
+      <a:schemeClr val="tx1"/>
+    </cs:fontRef>
+    <cs:spPr>
+      <a:ln w="9525" cap="flat" cmpd="sng" algn="ctr">
+        <a:solidFill>
+          <a:schemeClr val="tx1">
+            <a:lumMod val="75000"/>
+            <a:lumOff val="25000"/>
+          </a:schemeClr>
+        </a:solidFill>
+        <a:round/>
+      </a:ln>
+    </cs:spPr>
+  </cs:hiLoLine>
+  <cs:leaderLine>
+    <cs:lnRef idx="0"/>
+    <cs:fillRef idx="0"/>
+    <cs:effectRef idx="0"/>
+    <cs:fontRef idx="minor">
+      <a:schemeClr val="tx1"/>
+    </cs:fontRef>
+    <cs:spPr>
+      <a:ln w="9525" cap="flat" cmpd="sng" algn="ctr">
+        <a:solidFill>
+          <a:schemeClr val="tx1">
+            <a:lumMod val="35000"/>
+            <a:lumOff val="65000"/>
+          </a:schemeClr>
+        </a:solidFill>
+        <a:round/>
+      </a:ln>
+    </cs:spPr>
+  </cs:leaderLine>
+  <cs:legend>
+    <cs:lnRef idx="0"/>
+    <cs:fillRef idx="0"/>
+    <cs:effectRef idx="0"/>
+    <cs:fontRef idx="minor">
+      <a:schemeClr val="tx1">
+        <a:lumMod val="65000"/>
+        <a:lumOff val="35000"/>
+      </a:schemeClr>
+    </cs:fontRef>
+    <cs:defRPr sz="1197" kern="1200"/>
+  </cs:legend>
+  <cs:plotArea mods="allowNoFillOverride allowNoLineOverride">
+    <cs:lnRef idx="0"/>
+    <cs:fillRef idx="0"/>
+    <cs:effectRef idx="0"/>
+    <cs:fontRef idx="minor">
+      <a:schemeClr val="tx1"/>
+    </cs:fontRef>
+  </cs:plotArea>
+  <cs:plotArea3D mods="allowNoFillOverride allowNoLineOverride">
+    <cs:lnRef idx="0"/>
+    <cs:fillRef idx="0"/>
+    <cs:effectRef idx="0"/>
+    <cs:fontRef idx="minor">
+      <a:schemeClr val="tx1"/>
+    </cs:fontRef>
+  </cs:plotArea3D>
+  <cs:seriesAxis>
+    <cs:lnRef idx="0"/>
+    <cs:fillRef idx="0"/>
+    <cs:effectRef idx="0"/>
+    <cs:fontRef idx="minor">
+      <a:schemeClr val="tx1">
+        <a:lumMod val="65000"/>
+        <a:lumOff val="35000"/>
+      </a:schemeClr>
+    </cs:fontRef>
+    <cs:defRPr sz="1197" kern="1200"/>
+  </cs:seriesAxis>
+  <cs:seriesLine>
+    <cs:lnRef idx="0"/>
+    <cs:fillRef idx="0"/>
+    <cs:effectRef idx="0"/>
+    <cs:fontRef idx="minor">
+      <a:schemeClr val="tx1"/>
+    </cs:fontRef>
+    <cs:spPr>
+      <a:ln w="9525" cap="flat" cmpd="sng" algn="ctr">
+        <a:solidFill>
+          <a:schemeClr val="tx1">
+            <a:lumMod val="35000"/>
+            <a:lumOff val="65000"/>
+          </a:schemeClr>
+        </a:solidFill>
+        <a:round/>
+      </a:ln>
+    </cs:spPr>
+  </cs:seriesLine>
+  <cs:title>
+    <cs:lnRef idx="0"/>
+    <cs:fillRef idx="0"/>
+    <cs:effectRef idx="0"/>
+    <cs:fontRef idx="minor">
+      <a:schemeClr val="tx1">
+        <a:lumMod val="65000"/>
+        <a:lumOff val="35000"/>
+      </a:schemeClr>
+    </cs:fontRef>
+    <cs:defRPr sz="1862" b="0" kern="1200" spc="0" baseline="0"/>
+  </cs:title>
+  <cs:trendline>
+    <cs:lnRef idx="0">
+      <cs:styleClr val="auto"/>
+    </cs:lnRef>
+    <cs:fillRef idx="0"/>
+    <cs:effectRef idx="0"/>
+    <cs:fontRef idx="minor">
+      <a:schemeClr val="tx1"/>
+    </cs:fontRef>
+    <cs:spPr>
+      <a:ln w="19050" cap="rnd">
+        <a:solidFill>
+          <a:schemeClr val="phClr"/>
+        </a:solidFill>
+        <a:prstDash val="sysDot"/>
+      </a:ln>
+    </cs:spPr>
+  </cs:trendline>
+  <cs:trendlineLabel>
+    <cs:lnRef idx="0"/>
+    <cs:fillRef idx="0"/>
+    <cs:effectRef idx="0"/>
+    <cs:fontRef idx="minor">
+      <a:schemeClr val="tx1">
+        <a:lumMod val="65000"/>
+        <a:lumOff val="35000"/>
+      </a:schemeClr>
+    </cs:fontRef>
+    <cs:defRPr sz="1197" kern="1200"/>
+  </cs:trendlineLabel>
+  <cs:upBar>
+    <cs:lnRef idx="0"/>
+    <cs:fillRef idx="0"/>
+    <cs:effectRef idx="0"/>
+    <cs:fontRef idx="minor">
+      <a:schemeClr val="dk1"/>
+    </cs:fontRef>
+    <cs:spPr>
+      <a:solidFill>
+        <a:schemeClr val="lt1"/>
+      </a:solidFill>
+      <a:ln w="9525">
+        <a:solidFill>
+          <a:schemeClr val="tx1">
+            <a:lumMod val="15000"/>
+            <a:lumOff val="85000"/>
+          </a:schemeClr>
+        </a:solidFill>
+      </a:ln>
+    </cs:spPr>
+  </cs:upBar>
+  <cs:valueAxis>
+    <cs:lnRef idx="0"/>
+    <cs:fillRef idx="0"/>
+    <cs:effectRef idx="0"/>
+    <cs:fontRef idx="minor">
+      <a:schemeClr val="tx1">
+        <a:lumMod val="65000"/>
+        <a:lumOff val="35000"/>
+      </a:schemeClr>
+    </cs:fontRef>
+    <cs:defRPr sz="1197" kern="1200"/>
+  </cs:valueAxis>
+  <cs:wall>
+    <cs:lnRef idx="0"/>
+    <cs:fillRef idx="0"/>
+    <cs:effectRef idx="0"/>
+    <cs:fontRef idx="minor">
+      <a:schemeClr val="tx1"/>
+    </cs:fontRef>
+    <cs:spPr>
+      <a:noFill/>
+      <a:ln>
+        <a:noFill/>
+      </a:ln>
+    </cs:spPr>
+  </cs:wall>
+</cs:chartStyle>
+</file>
+
+<file path=ppt/charts/style5.xml><?xml version="1.0" encoding="utf-8"?>
+<cs:chartStyle xmlns:cs="http://schemas.microsoft.com/office/drawing/2012/chartStyle" xmlns:a="http://schemas.openxmlformats.org/drawingml/2006/main" id="201">
+  <cs:axisTitle>
+    <cs:lnRef idx="0"/>
+    <cs:fillRef idx="0"/>
+    <cs:effectRef idx="0"/>
+    <cs:fontRef idx="minor">
+      <a:schemeClr val="tx1">
+        <a:lumMod val="65000"/>
+        <a:lumOff val="35000"/>
+      </a:schemeClr>
+    </cs:fontRef>
+    <cs:defRPr sz="1330" kern="1200"/>
+  </cs:axisTitle>
+  <cs:categoryAxis>
+    <cs:lnRef idx="0"/>
+    <cs:fillRef idx="0"/>
+    <cs:effectRef idx="0"/>
+    <cs:fontRef idx="minor">
+      <a:schemeClr val="tx1">
+        <a:lumMod val="65000"/>
+        <a:lumOff val="35000"/>
+      </a:schemeClr>
+    </cs:fontRef>
+    <cs:spPr>
+      <a:ln w="9525" cap="flat" cmpd="sng" algn="ctr">
+        <a:solidFill>
+          <a:schemeClr val="tx1">
+            <a:lumMod val="15000"/>
+            <a:lumOff val="85000"/>
+          </a:schemeClr>
+        </a:solidFill>
+        <a:round/>
+      </a:ln>
+    </cs:spPr>
+    <cs:defRPr sz="1197" kern="1200"/>
+  </cs:categoryAxis>
+  <cs:chartArea mods="allowNoFillOverride allowNoLineOverride">
+    <cs:lnRef idx="0"/>
+    <cs:fillRef idx="0"/>
+    <cs:effectRef idx="0"/>
+    <cs:fontRef idx="minor">
+      <a:schemeClr val="tx1"/>
+    </cs:fontRef>
+    <cs:spPr>
+      <a:solidFill>
+        <a:schemeClr val="bg1"/>
+      </a:solidFill>
+      <a:ln w="9525" cap="flat" cmpd="sng" algn="ctr">
+        <a:solidFill>
+          <a:schemeClr val="tx1">
+            <a:lumMod val="15000"/>
+            <a:lumOff val="85000"/>
+          </a:schemeClr>
+        </a:solidFill>
+        <a:round/>
+      </a:ln>
+    </cs:spPr>
+    <cs:defRPr sz="1330" kern="1200"/>
+  </cs:chartArea>
+  <cs:dataLabel>
+    <cs:lnRef idx="0"/>
+    <cs:fillRef idx="0"/>
+    <cs:effectRef idx="0"/>
+    <cs:fontRef idx="minor">
+      <a:schemeClr val="tx1">
+        <a:lumMod val="75000"/>
+        <a:lumOff val="25000"/>
+      </a:schemeClr>
+    </cs:fontRef>
+    <cs:defRPr sz="1197" kern="1200"/>
+  </cs:dataLabel>
+  <cs:dataLabelCallout>
+    <cs:lnRef idx="0"/>
+    <cs:fillRef idx="0"/>
+    <cs:effectRef idx="0"/>
+    <cs:fontRef idx="minor">
+      <a:schemeClr val="dk1">
+        <a:lumMod val="65000"/>
+        <a:lumOff val="35000"/>
+      </a:schemeClr>
+    </cs:fontRef>
+    <cs:spPr>
+      <a:solidFill>
+        <a:schemeClr val="lt1"/>
+      </a:solidFill>
+      <a:ln>
+        <a:solidFill>
+          <a:schemeClr val="dk1">
+            <a:lumMod val="25000"/>
+            <a:lumOff val="75000"/>
+          </a:schemeClr>
+        </a:solidFill>
+      </a:ln>
+    </cs:spPr>
+    <cs:defRPr sz="1197" kern="1200"/>
+    <cs:bodyPr rot="0" spcFirstLastPara="1" vertOverflow="clip" horzOverflow="clip" vert="horz" wrap="square" lIns="36576" tIns="18288" rIns="36576" bIns="18288" anchor="ctr" anchorCtr="1">
+      <a:spAutoFit/>
+    </cs:bodyPr>
+  </cs:dataLabelCallout>
+  <cs:dataPoint>
+    <cs:lnRef idx="0"/>
+    <cs:fillRef idx="1">
+      <cs:styleClr val="auto"/>
+    </cs:fillRef>
+    <cs:effectRef idx="0"/>
+    <cs:fontRef idx="minor">
+      <a:schemeClr val="tx1"/>
+    </cs:fontRef>
+  </cs:dataPoint>
+  <cs:dataPoint3D>
+    <cs:lnRef idx="0"/>
+    <cs:fillRef idx="1">
+      <cs:styleClr val="auto"/>
+    </cs:fillRef>
+    <cs:effectRef idx="0"/>
+    <cs:fontRef idx="minor">
+      <a:schemeClr val="tx1"/>
+    </cs:fontRef>
+  </cs:dataPoint3D>
+  <cs:dataPointLine>
+    <cs:lnRef idx="0">
+      <cs:styleClr val="auto"/>
+    </cs:lnRef>
+    <cs:fillRef idx="1"/>
+    <cs:effectRef idx="0"/>
+    <cs:fontRef idx="minor">
+      <a:schemeClr val="tx1"/>
+    </cs:fontRef>
+    <cs:spPr>
+      <a:ln w="28575" cap="rnd">
+        <a:solidFill>
+          <a:schemeClr val="phClr"/>
+        </a:solidFill>
+        <a:round/>
+      </a:ln>
+    </cs:spPr>
+  </cs:dataPointLine>
+  <cs:dataPointMarker>
+    <cs:lnRef idx="0">
+      <cs:styleClr val="auto"/>
+    </cs:lnRef>
+    <cs:fillRef idx="1">
+      <cs:styleClr val="auto"/>
+    </cs:fillRef>
+    <cs:effectRef idx="0"/>
+    <cs:fontRef idx="minor">
+      <a:schemeClr val="tx1"/>
+    </cs:fontRef>
+    <cs:spPr>
+      <a:ln w="9525">
+        <a:solidFill>
+          <a:schemeClr val="phClr"/>
+        </a:solidFill>
+      </a:ln>
+    </cs:spPr>
+  </cs:dataPointMarker>
+  <cs:dataPointMarkerLayout symbol="circle" size="5"/>
+  <cs:dataPointWireframe>
+    <cs:lnRef idx="0">
+      <cs:styleClr val="auto"/>
+    </cs:lnRef>
+    <cs:fillRef idx="1"/>
+    <cs:effectRef idx="0"/>
+    <cs:fontRef idx="minor">
+      <a:schemeClr val="tx1"/>
+    </cs:fontRef>
+    <cs:spPr>
+      <a:ln w="9525" cap="rnd">
+        <a:solidFill>
+          <a:schemeClr val="phClr"/>
+        </a:solidFill>
+        <a:round/>
+      </a:ln>
+    </cs:spPr>
+  </cs:dataPointWireframe>
+  <cs:dataTable>
+    <cs:lnRef idx="0"/>
+    <cs:fillRef idx="0"/>
+    <cs:effectRef idx="0"/>
+    <cs:fontRef idx="minor">
+      <a:schemeClr val="tx1">
+        <a:lumMod val="65000"/>
+        <a:lumOff val="35000"/>
+      </a:schemeClr>
+    </cs:fontRef>
+    <cs:spPr>
+      <a:noFill/>
+      <a:ln w="9525" cap="flat" cmpd="sng" algn="ctr">
+        <a:solidFill>
+          <a:schemeClr val="tx1">
+            <a:lumMod val="15000"/>
+            <a:lumOff val="85000"/>
+          </a:schemeClr>
+        </a:solidFill>
+        <a:round/>
+      </a:ln>
+    </cs:spPr>
+    <cs:defRPr sz="1197" kern="1200"/>
+  </cs:dataTable>
+  <cs:downBar>
+    <cs:lnRef idx="0"/>
+    <cs:fillRef idx="0"/>
+    <cs:effectRef idx="0"/>
+    <cs:fontRef idx="minor">
+      <a:schemeClr val="dk1"/>
+    </cs:fontRef>
+    <cs:spPr>
+      <a:solidFill>
+        <a:schemeClr val="dk1">
+          <a:lumMod val="65000"/>
+          <a:lumOff val="35000"/>
+        </a:schemeClr>
+      </a:solidFill>
+      <a:ln w="9525">
+        <a:solidFill>
+          <a:schemeClr val="tx1">
+            <a:lumMod val="65000"/>
+            <a:lumOff val="35000"/>
+          </a:schemeClr>
+        </a:solidFill>
+      </a:ln>
+    </cs:spPr>
+  </cs:downBar>
+  <cs:dropLine>
+    <cs:lnRef idx="0"/>
+    <cs:fillRef idx="0"/>
+    <cs:effectRef idx="0"/>
+    <cs:fontRef idx="minor">
+      <a:schemeClr val="tx1"/>
+    </cs:fontRef>
+    <cs:spPr>
+      <a:ln w="9525" cap="flat" cmpd="sng" algn="ctr">
+        <a:solidFill>
+          <a:schemeClr val="tx1">
+            <a:lumMod val="35000"/>
+            <a:lumOff val="65000"/>
+          </a:schemeClr>
+        </a:solidFill>
+        <a:round/>
+      </a:ln>
+    </cs:spPr>
+  </cs:dropLine>
+  <cs:errorBar>
+    <cs:lnRef idx="0"/>
+    <cs:fillRef idx="0"/>
+    <cs:effectRef idx="0"/>
+    <cs:fontRef idx="minor">
+      <a:schemeClr val="tx1"/>
+    </cs:fontRef>
+    <cs:spPr>
+      <a:ln w="9525" cap="flat" cmpd="sng" algn="ctr">
+        <a:solidFill>
+          <a:schemeClr val="tx1">
+            <a:lumMod val="65000"/>
+            <a:lumOff val="35000"/>
+          </a:schemeClr>
+        </a:solidFill>
+        <a:round/>
+      </a:ln>
+    </cs:spPr>
+  </cs:errorBar>
+  <cs:floor>
+    <cs:lnRef idx="0"/>
+    <cs:fillRef idx="0"/>
+    <cs:effectRef idx="0"/>
+    <cs:fontRef idx="minor">
+      <a:schemeClr val="tx1"/>
+    </cs:fontRef>
+    <cs:spPr>
+      <a:noFill/>
+      <a:ln>
+        <a:noFill/>
+      </a:ln>
+    </cs:spPr>
+  </cs:floor>
+  <cs:gridlineMajor>
+    <cs:lnRef idx="0"/>
+    <cs:fillRef idx="0"/>
+    <cs:effectRef idx="0"/>
+    <cs:fontRef idx="minor">
+      <a:schemeClr val="tx1"/>
+    </cs:fontRef>
+    <cs:spPr>
+      <a:ln w="9525" cap="flat" cmpd="sng" algn="ctr">
+        <a:solidFill>
+          <a:schemeClr val="tx1">
+            <a:lumMod val="15000"/>
+            <a:lumOff val="85000"/>
+          </a:schemeClr>
+        </a:solidFill>
+        <a:round/>
+      </a:ln>
+    </cs:spPr>
+  </cs:gridlineMajor>
+  <cs:gridlineMinor>
+    <cs:lnRef idx="0"/>
+    <cs:fillRef idx="0"/>
+    <cs:effectRef idx="0"/>
+    <cs:fontRef idx="minor">
+      <a:schemeClr val="tx1"/>
+    </cs:fontRef>
+    <cs:spPr>
+      <a:ln w="9525" cap="flat" cmpd="sng" algn="ctr">
+        <a:solidFill>
+          <a:schemeClr val="tx1">
+            <a:lumMod val="5000"/>
+            <a:lumOff val="95000"/>
+          </a:schemeClr>
+        </a:solidFill>
+        <a:round/>
+      </a:ln>
+    </cs:spPr>
+  </cs:gridlineMinor>
+  <cs:hiLoLine>
+    <cs:lnRef idx="0"/>
+    <cs:fillRef idx="0"/>
+    <cs:effectRef idx="0"/>
+    <cs:fontRef idx="minor">
+      <a:schemeClr val="tx1"/>
+    </cs:fontRef>
+    <cs:spPr>
+      <a:ln w="9525" cap="flat" cmpd="sng" algn="ctr">
+        <a:solidFill>
+          <a:schemeClr val="tx1">
+            <a:lumMod val="75000"/>
+            <a:lumOff val="25000"/>
+          </a:schemeClr>
+        </a:solidFill>
+        <a:round/>
+      </a:ln>
+    </cs:spPr>
+  </cs:hiLoLine>
+  <cs:leaderLine>
+    <cs:lnRef idx="0"/>
+    <cs:fillRef idx="0"/>
+    <cs:effectRef idx="0"/>
+    <cs:fontRef idx="minor">
+      <a:schemeClr val="tx1"/>
+    </cs:fontRef>
+    <cs:spPr>
+      <a:ln w="9525" cap="flat" cmpd="sng" algn="ctr">
+        <a:solidFill>
+          <a:schemeClr val="tx1">
+            <a:lumMod val="35000"/>
+            <a:lumOff val="65000"/>
+          </a:schemeClr>
+        </a:solidFill>
+        <a:round/>
+      </a:ln>
+    </cs:spPr>
+  </cs:leaderLine>
+  <cs:legend>
+    <cs:lnRef idx="0"/>
+    <cs:fillRef idx="0"/>
+    <cs:effectRef idx="0"/>
+    <cs:fontRef idx="minor">
+      <a:schemeClr val="tx1">
+        <a:lumMod val="65000"/>
+        <a:lumOff val="35000"/>
+      </a:schemeClr>
+    </cs:fontRef>
+    <cs:defRPr sz="1197" kern="1200"/>
+  </cs:legend>
+  <cs:plotArea mods="allowNoFillOverride allowNoLineOverride">
+    <cs:lnRef idx="0"/>
+    <cs:fillRef idx="0"/>
+    <cs:effectRef idx="0"/>
+    <cs:fontRef idx="minor">
+      <a:schemeClr val="tx1"/>
+    </cs:fontRef>
+  </cs:plotArea>
+  <cs:plotArea3D mods="allowNoFillOverride allowNoLineOverride">
+    <cs:lnRef idx="0"/>
+    <cs:fillRef idx="0"/>
+    <cs:effectRef idx="0"/>
+    <cs:fontRef idx="minor">
+      <a:schemeClr val="tx1"/>
+    </cs:fontRef>
+  </cs:plotArea3D>
+  <cs:seriesAxis>
+    <cs:lnRef idx="0"/>
+    <cs:fillRef idx="0"/>
+    <cs:effectRef idx="0"/>
+    <cs:fontRef idx="minor">
+      <a:schemeClr val="tx1">
+        <a:lumMod val="65000"/>
+        <a:lumOff val="35000"/>
+      </a:schemeClr>
+    </cs:fontRef>
+    <cs:defRPr sz="1197" kern="1200"/>
+  </cs:seriesAxis>
+  <cs:seriesLine>
+    <cs:lnRef idx="0"/>
+    <cs:fillRef idx="0"/>
+    <cs:effectRef idx="0"/>
+    <cs:fontRef idx="minor">
+      <a:schemeClr val="tx1"/>
+    </cs:fontRef>
+    <cs:spPr>
+      <a:ln w="9525" cap="flat" cmpd="sng" algn="ctr">
+        <a:solidFill>
+          <a:schemeClr val="tx1">
+            <a:lumMod val="35000"/>
+            <a:lumOff val="65000"/>
+          </a:schemeClr>
+        </a:solidFill>
+        <a:round/>
+      </a:ln>
+    </cs:spPr>
+  </cs:seriesLine>
+  <cs:title>
+    <cs:lnRef idx="0"/>
+    <cs:fillRef idx="0"/>
+    <cs:effectRef idx="0"/>
+    <cs:fontRef idx="minor">
+      <a:schemeClr val="tx1">
+        <a:lumMod val="65000"/>
+        <a:lumOff val="35000"/>
+      </a:schemeClr>
+    </cs:fontRef>
+    <cs:defRPr sz="1862" b="0" kern="1200" spc="0" baseline="0"/>
+  </cs:title>
+  <cs:trendline>
+    <cs:lnRef idx="0">
+      <cs:styleClr val="auto"/>
+    </cs:lnRef>
+    <cs:fillRef idx="0"/>
+    <cs:effectRef idx="0"/>
+    <cs:fontRef idx="minor">
+      <a:schemeClr val="tx1"/>
+    </cs:fontRef>
+    <cs:spPr>
+      <a:ln w="19050" cap="rnd">
+        <a:solidFill>
+          <a:schemeClr val="phClr"/>
+        </a:solidFill>
+        <a:prstDash val="sysDot"/>
+      </a:ln>
+    </cs:spPr>
+  </cs:trendline>
+  <cs:trendlineLabel>
+    <cs:lnRef idx="0"/>
+    <cs:fillRef idx="0"/>
+    <cs:effectRef idx="0"/>
+    <cs:fontRef idx="minor">
+      <a:schemeClr val="tx1">
+        <a:lumMod val="65000"/>
+        <a:lumOff val="35000"/>
+      </a:schemeClr>
+    </cs:fontRef>
+    <cs:defRPr sz="1197" kern="1200"/>
+  </cs:trendlineLabel>
+  <cs:upBar>
+    <cs:lnRef idx="0"/>
+    <cs:fillRef idx="0"/>
+    <cs:effectRef idx="0"/>
+    <cs:fontRef idx="minor">
+      <a:schemeClr val="dk1"/>
+    </cs:fontRef>
+    <cs:spPr>
+      <a:solidFill>
+        <a:schemeClr val="lt1"/>
+      </a:solidFill>
+      <a:ln w="9525">
+        <a:solidFill>
+          <a:schemeClr val="tx1">
+            <a:lumMod val="15000"/>
+            <a:lumOff val="85000"/>
+          </a:schemeClr>
+        </a:solidFill>
+      </a:ln>
+    </cs:spPr>
+  </cs:upBar>
+  <cs:valueAxis>
+    <cs:lnRef idx="0"/>
+    <cs:fillRef idx="0"/>
+    <cs:effectRef idx="0"/>
+    <cs:fontRef idx="minor">
+      <a:schemeClr val="tx1">
+        <a:lumMod val="65000"/>
+        <a:lumOff val="35000"/>
+      </a:schemeClr>
+    </cs:fontRef>
+    <cs:defRPr sz="1197" kern="1200"/>
+  </cs:valueAxis>
+  <cs:wall>
+    <cs:lnRef idx="0"/>
+    <cs:fillRef idx="0"/>
+    <cs:effectRef idx="0"/>
+    <cs:fontRef idx="minor">
+      <a:schemeClr val="tx1"/>
+    </cs:fontRef>
+    <cs:spPr>
+      <a:noFill/>
+      <a:ln>
+        <a:noFill/>
+      </a:ln>
+    </cs:spPr>
+  </cs:wall>
+</cs:chartStyle>
+</file>
+
+<file path=ppt/charts/style6.xml><?xml version="1.0" encoding="utf-8"?>
 <cs:chartStyle xmlns:cs="http://schemas.microsoft.com/office/drawing/2012/chartStyle" xmlns:a="http://schemas.openxmlformats.org/drawingml/2006/main" id="201">
   <cs:axisTitle>
     <cs:lnRef idx="0"/>
@@ -10461,7 +13221,7 @@
           <a:p>
             <a:fld id="{EB63609A-8A70-4963-B7F7-B1BC725097C5}" type="datetimeFigureOut">
               <a:rPr lang="en-US" smtClean="0"/>
-              <a:t>7/21/2020</a:t>
+              <a:t>8/7/2020</a:t>
             </a:fld>
             <a:endParaRPr lang="en-US"/>
           </a:p>
@@ -10860,7 +13620,7 @@
           <a:p>
             <a:fld id="{8CE785BC-267D-4D72-802A-72E65D3984C5}" type="datetime1">
               <a:rPr lang="en-US" smtClean="0"/>
-              <a:t>7/21/2020</a:t>
+              <a:t>8/7/2020</a:t>
             </a:fld>
             <a:endParaRPr lang="en-US"/>
           </a:p>
@@ -11033,7 +13793,7 @@
           <a:p>
             <a:fld id="{6402C829-D144-4F58-B998-38181FE2FB49}" type="datetime1">
               <a:rPr lang="en-US" smtClean="0"/>
-              <a:t>7/21/2020</a:t>
+              <a:t>8/7/2020</a:t>
             </a:fld>
             <a:endParaRPr lang="en-US"/>
           </a:p>
@@ -11216,7 +13976,7 @@
           <a:p>
             <a:fld id="{AEB2CE19-D45A-459C-8100-A0974FC1EECD}" type="datetime1">
               <a:rPr lang="en-US" smtClean="0"/>
-              <a:t>7/21/2020</a:t>
+              <a:t>8/7/2020</a:t>
             </a:fld>
             <a:endParaRPr lang="en-US"/>
           </a:p>
@@ -11411,7 +14171,7 @@
           <a:p>
             <a:fld id="{7C5E8F0A-222C-434A-A9CB-81E98982AC14}" type="datetimeFigureOut">
               <a:rPr lang="en-US" smtClean="0"/>
-              <a:t>7/21/2020</a:t>
+              <a:t>8/7/2020</a:t>
             </a:fld>
             <a:endParaRPr lang="en-US"/>
           </a:p>
@@ -11581,7 +14341,7 @@
           <a:p>
             <a:fld id="{7C5E8F0A-222C-434A-A9CB-81E98982AC14}" type="datetimeFigureOut">
               <a:rPr lang="en-US" smtClean="0"/>
-              <a:t>7/21/2020</a:t>
+              <a:t>8/7/2020</a:t>
             </a:fld>
             <a:endParaRPr lang="en-US"/>
           </a:p>
@@ -11827,7 +14587,7 @@
           <a:p>
             <a:fld id="{7C5E8F0A-222C-434A-A9CB-81E98982AC14}" type="datetimeFigureOut">
               <a:rPr lang="en-US" smtClean="0"/>
-              <a:t>7/21/2020</a:t>
+              <a:t>8/7/2020</a:t>
             </a:fld>
             <a:endParaRPr lang="en-US"/>
           </a:p>
@@ -12059,7 +14819,7 @@
           <a:p>
             <a:fld id="{7C5E8F0A-222C-434A-A9CB-81E98982AC14}" type="datetimeFigureOut">
               <a:rPr lang="en-US" smtClean="0"/>
-              <a:t>7/21/2020</a:t>
+              <a:t>8/7/2020</a:t>
             </a:fld>
             <a:endParaRPr lang="en-US"/>
           </a:p>
@@ -12426,7 +15186,7 @@
           <a:p>
             <a:fld id="{7C5E8F0A-222C-434A-A9CB-81E98982AC14}" type="datetimeFigureOut">
               <a:rPr lang="en-US" smtClean="0"/>
-              <a:t>7/21/2020</a:t>
+              <a:t>8/7/2020</a:t>
             </a:fld>
             <a:endParaRPr lang="en-US"/>
           </a:p>
@@ -12544,7 +15304,7 @@
           <a:p>
             <a:fld id="{7C5E8F0A-222C-434A-A9CB-81E98982AC14}" type="datetimeFigureOut">
               <a:rPr lang="en-US" smtClean="0"/>
-              <a:t>7/21/2020</a:t>
+              <a:t>8/7/2020</a:t>
             </a:fld>
             <a:endParaRPr lang="en-US"/>
           </a:p>
@@ -12639,7 +15399,7 @@
           <a:p>
             <a:fld id="{7C5E8F0A-222C-434A-A9CB-81E98982AC14}" type="datetimeFigureOut">
               <a:rPr lang="en-US" smtClean="0"/>
-              <a:t>7/21/2020</a:t>
+              <a:t>8/7/2020</a:t>
             </a:fld>
             <a:endParaRPr lang="en-US"/>
           </a:p>
@@ -12916,7 +15676,7 @@
           <a:p>
             <a:fld id="{7C5E8F0A-222C-434A-A9CB-81E98982AC14}" type="datetimeFigureOut">
               <a:rPr lang="en-US" smtClean="0"/>
-              <a:t>7/21/2020</a:t>
+              <a:t>8/7/2020</a:t>
             </a:fld>
             <a:endParaRPr lang="en-US"/>
           </a:p>
@@ -13086,7 +15846,7 @@
           <a:p>
             <a:fld id="{2D8DD609-9492-45C6-B115-851EE4D74A27}" type="datetime1">
               <a:rPr lang="en-US" smtClean="0"/>
-              <a:t>7/21/2020</a:t>
+              <a:t>8/7/2020</a:t>
             </a:fld>
             <a:endParaRPr lang="en-US"/>
           </a:p>
@@ -13342,7 +16102,7 @@
           <a:p>
             <a:fld id="{7C5E8F0A-222C-434A-A9CB-81E98982AC14}" type="datetimeFigureOut">
               <a:rPr lang="en-US" smtClean="0"/>
-              <a:t>7/21/2020</a:t>
+              <a:t>8/7/2020</a:t>
             </a:fld>
             <a:endParaRPr lang="en-US"/>
           </a:p>
@@ -13512,7 +16272,7 @@
           <a:p>
             <a:fld id="{7C5E8F0A-222C-434A-A9CB-81E98982AC14}" type="datetimeFigureOut">
               <a:rPr lang="en-US" smtClean="0"/>
-              <a:t>7/21/2020</a:t>
+              <a:t>8/7/2020</a:t>
             </a:fld>
             <a:endParaRPr lang="en-US"/>
           </a:p>
@@ -13692,7 +16452,7 @@
           <a:p>
             <a:fld id="{7C5E8F0A-222C-434A-A9CB-81E98982AC14}" type="datetimeFigureOut">
               <a:rPr lang="en-US" smtClean="0"/>
-              <a:t>7/21/2020</a:t>
+              <a:t>8/7/2020</a:t>
             </a:fld>
             <a:endParaRPr lang="en-US"/>
           </a:p>
@@ -14088,7 +16848,7 @@
           <a:p>
             <a:fld id="{7C5E8F0A-222C-434A-A9CB-81E98982AC14}" type="datetimeFigureOut">
               <a:rPr lang="en-US" smtClean="0"/>
-              <a:t>7/21/2020</a:t>
+              <a:t>8/7/2020</a:t>
             </a:fld>
             <a:endParaRPr lang="en-US"/>
           </a:p>
@@ -14319,7 +17079,7 @@
           <a:p>
             <a:fld id="{7C5E8F0A-222C-434A-A9CB-81E98982AC14}" type="datetimeFigureOut">
               <a:rPr lang="en-US" smtClean="0"/>
-              <a:t>7/21/2020</a:t>
+              <a:t>8/7/2020</a:t>
             </a:fld>
             <a:endParaRPr lang="en-US"/>
           </a:p>
@@ -15353,7 +18113,7 @@
           <a:p>
             <a:fld id="{7C5E8F0A-222C-434A-A9CB-81E98982AC14}" type="datetimeFigureOut">
               <a:rPr lang="en-US" smtClean="0"/>
-              <a:t>7/21/2020</a:t>
+              <a:t>8/7/2020</a:t>
             </a:fld>
             <a:endParaRPr lang="en-US"/>
           </a:p>
@@ -15625,7 +18385,7 @@
           <a:p>
             <a:fld id="{7C5E8F0A-222C-434A-A9CB-81E98982AC14}" type="datetimeFigureOut">
               <a:rPr lang="en-US" smtClean="0"/>
-              <a:t>7/21/2020</a:t>
+              <a:t>8/7/2020</a:t>
             </a:fld>
             <a:endParaRPr lang="en-US"/>
           </a:p>
@@ -16035,7 +18795,7 @@
           <a:p>
             <a:fld id="{7C5E8F0A-222C-434A-A9CB-81E98982AC14}" type="datetimeFigureOut">
               <a:rPr lang="en-US" smtClean="0"/>
-              <a:t>7/21/2020</a:t>
+              <a:t>8/7/2020</a:t>
             </a:fld>
             <a:endParaRPr lang="en-US"/>
           </a:p>
@@ -16162,7 +18922,7 @@
           <a:p>
             <a:fld id="{7C5E8F0A-222C-434A-A9CB-81E98982AC14}" type="datetimeFigureOut">
               <a:rPr lang="en-US" smtClean="0"/>
-              <a:t>7/21/2020</a:t>
+              <a:t>8/7/2020</a:t>
             </a:fld>
             <a:endParaRPr lang="en-US"/>
           </a:p>
@@ -16257,7 +19017,7 @@
           <a:p>
             <a:fld id="{7C5E8F0A-222C-434A-A9CB-81E98982AC14}" type="datetimeFigureOut">
               <a:rPr lang="en-US" smtClean="0"/>
-              <a:t>7/21/2020</a:t>
+              <a:t>8/7/2020</a:t>
             </a:fld>
             <a:endParaRPr lang="en-US"/>
           </a:p>
@@ -16539,7 +19299,7 @@
           <a:p>
             <a:fld id="{82715C42-EFF0-4BD6-921E-7CF21CC16B4C}" type="datetime1">
               <a:rPr lang="en-US" smtClean="0"/>
-              <a:t>7/21/2020</a:t>
+              <a:t>8/7/2020</a:t>
             </a:fld>
             <a:endParaRPr lang="en-US"/>
           </a:p>
@@ -17587,7 +20347,7 @@
           <a:p>
             <a:fld id="{7C5E8F0A-222C-434A-A9CB-81E98982AC14}" type="datetimeFigureOut">
               <a:rPr lang="en-US" smtClean="0"/>
-              <a:t>7/21/2020</a:t>
+              <a:t>8/7/2020</a:t>
             </a:fld>
             <a:endParaRPr lang="en-US"/>
           </a:p>
@@ -18695,7 +21455,7 @@
           <a:p>
             <a:fld id="{7C5E8F0A-222C-434A-A9CB-81E98982AC14}" type="datetimeFigureOut">
               <a:rPr lang="en-US" smtClean="0"/>
-              <a:t>7/21/2020</a:t>
+              <a:t>8/7/2020</a:t>
             </a:fld>
             <a:endParaRPr lang="en-US"/>
           </a:p>
@@ -19763,7 +22523,7 @@
           <a:p>
             <a:fld id="{D6E6FBFB-3ADF-48C9-9835-8BCF973CA717}" type="datetime1">
               <a:rPr lang="en-US" smtClean="0"/>
-              <a:t>7/21/2020</a:t>
+              <a:t>8/7/2020</a:t>
             </a:fld>
             <a:endParaRPr lang="en-US"/>
           </a:p>
@@ -20747,7 +23507,7 @@
           <a:p>
             <a:fld id="{D6E6FBFB-3ADF-48C9-9835-8BCF973CA717}" type="datetime1">
               <a:rPr lang="en-US" smtClean="0"/>
-              <a:t>7/21/2020</a:t>
+              <a:t>8/7/2020</a:t>
             </a:fld>
             <a:endParaRPr lang="en-US"/>
           </a:p>
@@ -21885,7 +24645,7 @@
           <a:p>
             <a:fld id="{D6E6FBFB-3ADF-48C9-9835-8BCF973CA717}" type="datetime1">
               <a:rPr lang="en-US" smtClean="0"/>
-              <a:t>7/21/2020</a:t>
+              <a:t>8/7/2020</a:t>
             </a:fld>
             <a:endParaRPr lang="en-US"/>
           </a:p>
@@ -22922,7 +25682,7 @@
           <a:p>
             <a:fld id="{D6E6FBFB-3ADF-48C9-9835-8BCF973CA717}" type="datetime1">
               <a:rPr lang="en-US" smtClean="0"/>
-              <a:t>7/21/2020</a:t>
+              <a:t>8/7/2020</a:t>
             </a:fld>
             <a:endParaRPr lang="en-US"/>
           </a:p>
@@ -23586,7 +26346,7 @@
           <a:p>
             <a:fld id="{D6E6FBFB-3ADF-48C9-9835-8BCF973CA717}" type="datetime1">
               <a:rPr lang="en-US" smtClean="0"/>
-              <a:t>7/21/2020</a:t>
+              <a:t>8/7/2020</a:t>
             </a:fld>
             <a:endParaRPr lang="en-US"/>
           </a:p>
@@ -24451,7 +27211,7 @@
           <a:p>
             <a:fld id="{D6E6FBFB-3ADF-48C9-9835-8BCF973CA717}" type="datetime1">
               <a:rPr lang="en-US" smtClean="0"/>
-              <a:t>7/21/2020</a:t>
+              <a:t>8/7/2020</a:t>
             </a:fld>
             <a:endParaRPr lang="en-US"/>
           </a:p>
@@ -24645,7 +27405,7 @@
           <a:p>
             <a:fld id="{7C5E8F0A-222C-434A-A9CB-81E98982AC14}" type="datetimeFigureOut">
               <a:rPr lang="en-US" smtClean="0"/>
-              <a:t>7/21/2020</a:t>
+              <a:t>8/7/2020</a:t>
             </a:fld>
             <a:endParaRPr lang="en-US"/>
           </a:p>
@@ -25617,7 +28377,7 @@
           <a:p>
             <a:fld id="{7C5E8F0A-222C-434A-A9CB-81E98982AC14}" type="datetimeFigureOut">
               <a:rPr lang="en-US" smtClean="0"/>
-              <a:t>7/21/2020</a:t>
+              <a:t>8/7/2020</a:t>
             </a:fld>
             <a:endParaRPr lang="en-US"/>
           </a:p>
@@ -25885,7 +28645,7 @@
           <a:p>
             <a:fld id="{6D9C9865-89F8-44B4-98D7-1566E04C14F6}" type="datetime1">
               <a:rPr lang="en-US" smtClean="0"/>
-              <a:t>7/21/2020</a:t>
+              <a:t>8/7/2020</a:t>
             </a:fld>
             <a:endParaRPr lang="en-US"/>
           </a:p>
@@ -26255,7 +29015,7 @@
           <a:p>
             <a:fld id="{7893C357-46F2-466D-9AE6-73C5CF911E13}" type="datetime1">
               <a:rPr lang="en-US" smtClean="0"/>
-              <a:t>7/21/2020</a:t>
+              <a:t>8/7/2020</a:t>
             </a:fld>
             <a:endParaRPr lang="en-US"/>
           </a:p>
@@ -26376,7 +29136,7 @@
           <a:p>
             <a:fld id="{96F7184E-8FBB-4A90-A48C-F739EEF98397}" type="datetime1">
               <a:rPr lang="en-US" smtClean="0"/>
-              <a:t>7/21/2020</a:t>
+              <a:t>8/7/2020</a:t>
             </a:fld>
             <a:endParaRPr lang="en-US"/>
           </a:p>
@@ -26474,7 +29234,7 @@
           <a:p>
             <a:fld id="{EDDB67B5-3846-4927-A9F0-442A7D99F3E4}" type="datetime1">
               <a:rPr lang="en-US" smtClean="0"/>
-              <a:t>7/21/2020</a:t>
+              <a:t>8/7/2020</a:t>
             </a:fld>
             <a:endParaRPr lang="en-US"/>
           </a:p>
@@ -26754,7 +29514,7 @@
           <a:p>
             <a:fld id="{56787DDA-DF4A-4ACC-B20A-6F4C48FE6014}" type="datetime1">
               <a:rPr lang="en-US" smtClean="0"/>
-              <a:t>7/21/2020</a:t>
+              <a:t>8/7/2020</a:t>
             </a:fld>
             <a:endParaRPr lang="en-US"/>
           </a:p>
@@ -27010,7 +29770,7 @@
           <a:p>
             <a:fld id="{211B2CB3-30DC-4A1C-B22B-6D912EB0C1DF}" type="datetime1">
               <a:rPr lang="en-US" smtClean="0"/>
-              <a:t>7/21/2020</a:t>
+              <a:t>8/7/2020</a:t>
             </a:fld>
             <a:endParaRPr lang="en-US"/>
           </a:p>
@@ -27121,7 +29881,7 @@
           <a:graphicData uri="http://schemas.openxmlformats.org/presentationml/2006/ole">
             <mc:AlternateContent xmlns:mc="http://schemas.openxmlformats.org/markup-compatibility/2006">
               <mc:Choice xmlns:v="urn:schemas-microsoft-com:vml" Requires="v">
-                <p:oleObj spid="_x0000_s1032" name="think-cell Folie" r:id="rId16" imgW="631" imgH="631" progId="TCLayout.ActiveDocument.1">
+                <p:oleObj spid="_x0000_s1036" name="think-cell Folie" r:id="rId16" imgW="631" imgH="631" progId="TCLayout.ActiveDocument.1">
                   <p:embed/>
                 </p:oleObj>
               </mc:Choice>
@@ -27335,7 +30095,7 @@
           <a:p>
             <a:fld id="{D6E6FBFB-3ADF-48C9-9835-8BCF973CA717}" type="datetime1">
               <a:rPr lang="en-US" smtClean="0"/>
-              <a:t>7/21/2020</a:t>
+              <a:t>8/7/2020</a:t>
             </a:fld>
             <a:endParaRPr lang="en-US"/>
           </a:p>
@@ -27774,7 +30534,7 @@
           <a:graphicData uri="http://schemas.openxmlformats.org/presentationml/2006/ole">
             <mc:AlternateContent xmlns:mc="http://schemas.openxmlformats.org/markup-compatibility/2006">
               <mc:Choice xmlns:v="urn:schemas-microsoft-com:vml" Requires="v">
-                <p:oleObj spid="_x0000_s2056" name="think-cell Folie" r:id="rId16" imgW="631" imgH="631" progId="TCLayout.ActiveDocument.1">
+                <p:oleObj spid="_x0000_s2060" name="think-cell Folie" r:id="rId16" imgW="631" imgH="631" progId="TCLayout.ActiveDocument.1">
                   <p:embed/>
                 </p:oleObj>
               </mc:Choice>
@@ -27988,7 +30748,7 @@
           <a:p>
             <a:fld id="{7C5E8F0A-222C-434A-A9CB-81E98982AC14}" type="datetimeFigureOut">
               <a:rPr lang="en-US" smtClean="0"/>
-              <a:t>7/21/2020</a:t>
+              <a:t>8/7/2020</a:t>
             </a:fld>
             <a:endParaRPr lang="en-US"/>
           </a:p>
@@ -28423,7 +31183,7 @@
           <a:graphicData uri="http://schemas.openxmlformats.org/presentationml/2006/ole">
             <mc:AlternateContent xmlns:mc="http://schemas.openxmlformats.org/markup-compatibility/2006">
               <mc:Choice xmlns:v="urn:schemas-microsoft-com:vml" Requires="v">
-                <p:oleObj spid="_x0000_s3080" name="think-cell Folie" r:id="rId22" imgW="631" imgH="631" progId="TCLayout.ActiveDocument.1">
+                <p:oleObj spid="_x0000_s3084" name="think-cell Folie" r:id="rId22" imgW="631" imgH="631" progId="TCLayout.ActiveDocument.1">
                   <p:embed/>
                 </p:oleObj>
               </mc:Choice>
@@ -29385,7 +32145,7 @@
           <a:p>
             <a:fld id="{D6E6FBFB-3ADF-48C9-9835-8BCF973CA717}" type="datetime1">
               <a:rPr lang="en-US" smtClean="0"/>
-              <a:t>7/21/2020</a:t>
+              <a:t>8/7/2020</a:t>
             </a:fld>
             <a:endParaRPr lang="en-US"/>
           </a:p>
@@ -29980,7 +32740,7 @@
           <a:graphicData uri="http://schemas.openxmlformats.org/presentationml/2006/ole">
             <mc:AlternateContent xmlns:mc="http://schemas.openxmlformats.org/markup-compatibility/2006">
               <mc:Choice xmlns:v="urn:schemas-microsoft-com:vml" Requires="v">
-                <p:oleObj spid="_x0000_s4104" name="think-cell Folie" r:id="rId7" imgW="631" imgH="631" progId="TCLayout.ActiveDocument.1">
+                <p:oleObj spid="_x0000_s4108" name="think-cell Folie" r:id="rId7" imgW="631" imgH="631" progId="TCLayout.ActiveDocument.1">
                   <p:embed/>
                 </p:oleObj>
               </mc:Choice>
@@ -30119,7 +32879,7 @@
           <a:p>
             <a:fld id="{96F7184E-8FBB-4A90-A48C-F739EEF98397}" type="datetime1">
               <a:rPr lang="en-US" smtClean="0"/>
-              <a:t>7/21/2020</a:t>
+              <a:t>8/7/2020</a:t>
             </a:fld>
             <a:endParaRPr lang="en-US"/>
           </a:p>
@@ -30510,7 +33270,7 @@
           <a:graphicData uri="http://schemas.openxmlformats.org/presentationml/2006/ole">
             <mc:AlternateContent xmlns:mc="http://schemas.openxmlformats.org/markup-compatibility/2006">
               <mc:Choice xmlns:v="urn:schemas-microsoft-com:vml" Requires="v">
-                <p:oleObj spid="_x0000_s13336" name="think-cell Folie" r:id="rId7" imgW="631" imgH="631" progId="TCLayout.ActiveDocument.1">
+                <p:oleObj spid="_x0000_s13352" name="think-cell Folie" r:id="rId7" imgW="631" imgH="631" progId="TCLayout.ActiveDocument.1">
                   <p:embed/>
                 </p:oleObj>
               </mc:Choice>
@@ -30591,7 +33351,7 @@
           <a:p>
             <a:fld id="{96F7184E-8FBB-4A90-A48C-F739EEF98397}" type="datetime1">
               <a:rPr lang="en-US" smtClean="0"/>
-              <a:t>7/21/2020</a:t>
+              <a:t>8/7/2020</a:t>
             </a:fld>
             <a:endParaRPr lang="en-US"/>
           </a:p>
@@ -32354,7 +35114,7 @@
           <a:graphicData uri="http://schemas.openxmlformats.org/presentationml/2006/ole">
             <mc:AlternateContent xmlns:mc="http://schemas.openxmlformats.org/markup-compatibility/2006">
               <mc:Choice xmlns:v="urn:schemas-microsoft-com:vml" Requires="v">
-                <p:oleObj spid="_x0000_s13337" name="Arbeitsblatt" r:id="rId18" imgW="7932297" imgH="5493967" progId="Excel.Sheet.12">
+                <p:oleObj spid="_x0000_s13353" name="Arbeitsblatt" r:id="rId18" imgW="7932297" imgH="5493967" progId="Excel.Sheet.12">
                   <p:embed/>
                 </p:oleObj>
               </mc:Choice>
@@ -32649,7 +35409,7 @@
                 <a14:useLocalDpi xmlns:a14="http://schemas.microsoft.com/office/drawing/2010/main" val="0"/>
               </a:ext>
               <a:ext uri="{96DAC541-7B7A-43D3-8B79-37D633B846F1}">
-                <asvg:svgBlip xmlns="" xmlns:asvg="http://schemas.microsoft.com/office/drawing/2016/SVG/main" r:embed="rId23"/>
+                <asvg:svgBlip xmlns:asvg="http://schemas.microsoft.com/office/drawing/2016/SVG/main" xmlns="" r:embed="rId23"/>
               </a:ext>
             </a:extLst>
           </a:blip>
@@ -32689,7 +35449,7 @@
           <a:graphicData uri="http://schemas.openxmlformats.org/presentationml/2006/ole">
             <mc:AlternateContent xmlns:mc="http://schemas.openxmlformats.org/markup-compatibility/2006">
               <mc:Choice xmlns:v="urn:schemas-microsoft-com:vml" Requires="v">
-                <p:oleObj spid="_x0000_s13338" name="Arbeitsblatt" r:id="rId24" imgW="2385055" imgH="921967" progId="Excel.Sheet.12">
+                <p:oleObj spid="_x0000_s13354" name="Arbeitsblatt" r:id="rId24" imgW="2385055" imgH="921967" progId="Excel.Sheet.12">
                   <p:link updateAutomatic="1"/>
                 </p:oleObj>
               </mc:Choice>
@@ -32728,7 +35488,7 @@
     <p:controls>
       <mc:AlternateContent xmlns:mc="http://schemas.openxmlformats.org/markup-compatibility/2006">
         <mc:Choice xmlns:v="urn:schemas-microsoft-com:vml" Requires="v">
-          <p:control spid="13339" name="CheckBox1" r:id="rId5" imgW="1327320" imgH="311040"/>
+          <p:control spid="13355" name="CheckBox1" r:id="rId5" imgW="1327320" imgH="311040"/>
         </mc:Choice>
         <mc:Fallback>
           <p:control name="CheckBox1" r:id="rId5" imgW="1327320" imgH="311040">
@@ -32901,7 +35661,7 @@
           <a:graphicData uri="http://schemas.openxmlformats.org/presentationml/2006/ole">
             <mc:AlternateContent xmlns:mc="http://schemas.openxmlformats.org/markup-compatibility/2006">
               <mc:Choice xmlns:v="urn:schemas-microsoft-com:vml" Requires="v">
-                <p:oleObj spid="_x0000_s14344" name="think-cell Folie" r:id="rId5" imgW="631" imgH="631" progId="TCLayout.ActiveDocument.1">
+                <p:oleObj spid="_x0000_s14348" name="think-cell Folie" r:id="rId5" imgW="631" imgH="631" progId="TCLayout.ActiveDocument.1">
                   <p:embed/>
                 </p:oleObj>
               </mc:Choice>
@@ -33024,7 +35784,7 @@
           <a:p>
             <a:fld id="{96F7184E-8FBB-4A90-A48C-F739EEF98397}" type="datetime1">
               <a:rPr lang="en-US" smtClean="0"/>
-              <a:t>7/21/2020</a:t>
+              <a:t>8/7/2020</a:t>
             </a:fld>
             <a:endParaRPr lang="en-US"/>
           </a:p>
@@ -39603,7 +42363,7 @@
           <a:graphicData uri="http://schemas.openxmlformats.org/presentationml/2006/ole">
             <mc:AlternateContent xmlns:mc="http://schemas.openxmlformats.org/markup-compatibility/2006">
               <mc:Choice xmlns:v="urn:schemas-microsoft-com:vml" Requires="v">
-                <p:oleObj spid="_x0000_s15368" name="think-cell Folie" r:id="rId8" imgW="631" imgH="631" progId="TCLayout.ActiveDocument.1">
+                <p:oleObj spid="_x0000_s15372" name="think-cell Folie" r:id="rId8" imgW="631" imgH="631" progId="TCLayout.ActiveDocument.1">
                   <p:embed/>
                 </p:oleObj>
               </mc:Choice>
@@ -39742,7 +42502,7 @@
           <a:p>
             <a:fld id="{96F7184E-8FBB-4A90-A48C-F739EEF98397}" type="datetime1">
               <a:rPr lang="en-US" smtClean="0"/>
-              <a:t>7/21/2020</a:t>
+              <a:t>8/7/2020</a:t>
             </a:fld>
             <a:endParaRPr lang="en-US"/>
           </a:p>
@@ -40104,7 +42864,7 @@
           <a:graphicData uri="http://schemas.openxmlformats.org/presentationml/2006/ole">
             <mc:AlternateContent xmlns:mc="http://schemas.openxmlformats.org/markup-compatibility/2006">
               <mc:Choice xmlns:v="urn:schemas-microsoft-com:vml" Requires="v">
-                <p:oleObj spid="_x0000_s16392" name="think-cell Folie" r:id="rId5" imgW="631" imgH="631" progId="TCLayout.ActiveDocument.1">
+                <p:oleObj spid="_x0000_s16396" name="think-cell Folie" r:id="rId5" imgW="631" imgH="631" progId="TCLayout.ActiveDocument.1">
                   <p:embed/>
                 </p:oleObj>
               </mc:Choice>
@@ -40208,7 +42968,7 @@
           <a:p>
             <a:fld id="{7BF11529-3654-4A67-A2AD-66BEEB4BB311}" type="datetime1">
               <a:rPr lang="en-US" smtClean="0"/>
-              <a:t>7/21/2020</a:t>
+              <a:t>8/7/2020</a:t>
             </a:fld>
             <a:endParaRPr lang="en-US" dirty="0"/>
           </a:p>
@@ -40342,7 +43102,7 @@
           <a:graphicData uri="http://schemas.openxmlformats.org/presentationml/2006/ole">
             <mc:AlternateContent xmlns:mc="http://schemas.openxmlformats.org/markup-compatibility/2006">
               <mc:Choice xmlns:v="urn:schemas-microsoft-com:vml" Requires="v">
-                <p:oleObj spid="_x0000_s17416" name="think-cell Folie" r:id="rId4" imgW="631" imgH="631" progId="TCLayout.ActiveDocument.1">
+                <p:oleObj spid="_x0000_s17420" name="think-cell Folie" r:id="rId4" imgW="631" imgH="631" progId="TCLayout.ActiveDocument.1">
                   <p:embed/>
                 </p:oleObj>
               </mc:Choice>
@@ -40674,7 +43434,7 @@
           <a:p>
             <a:fld id="{BD2C1721-0C70-4121-8255-041FC08D13BE}" type="datetime1">
               <a:rPr lang="en-US" smtClean="0"/>
-              <a:t>7/21/2020</a:t>
+              <a:t>8/7/2020</a:t>
             </a:fld>
             <a:endParaRPr lang="en-US" dirty="0"/>
           </a:p>
@@ -40780,7 +43540,7 @@
           <a:graphicData uri="http://schemas.openxmlformats.org/presentationml/2006/ole">
             <mc:AlternateContent xmlns:mc="http://schemas.openxmlformats.org/markup-compatibility/2006">
               <mc:Choice xmlns:v="urn:schemas-microsoft-com:vml" Requires="v">
-                <p:oleObj spid="_x0000_s18440" name="think-cell Folie" r:id="rId4" imgW="631" imgH="631" progId="TCLayout.ActiveDocument.1">
+                <p:oleObj spid="_x0000_s18444" name="think-cell Folie" r:id="rId4" imgW="631" imgH="631" progId="TCLayout.ActiveDocument.1">
                   <p:embed/>
                 </p:oleObj>
               </mc:Choice>
@@ -41348,7 +44108,7 @@
           <a:p>
             <a:fld id="{685A0DB2-E4EC-4ECA-BF1E-13928BA91C1E}" type="datetime1">
               <a:rPr lang="en-US" smtClean="0"/>
-              <a:t>7/21/2020</a:t>
+              <a:t>8/7/2020</a:t>
             </a:fld>
             <a:endParaRPr lang="en-US" dirty="0"/>
           </a:p>
@@ -41518,7 +44278,7 @@
           <a:graphicData uri="http://schemas.openxmlformats.org/presentationml/2006/ole">
             <mc:AlternateContent xmlns:mc="http://schemas.openxmlformats.org/markup-compatibility/2006">
               <mc:Choice xmlns:v="urn:schemas-microsoft-com:vml" Requires="v">
-                <p:oleObj spid="_x0000_s19464" name="think-cell Folie" r:id="rId8" imgW="631" imgH="631" progId="TCLayout.ActiveDocument.1">
+                <p:oleObj spid="_x0000_s19468" name="think-cell Folie" r:id="rId8" imgW="631" imgH="631" progId="TCLayout.ActiveDocument.1">
                   <p:embed/>
                 </p:oleObj>
               </mc:Choice>
@@ -41657,7 +44417,7 @@
           <a:p>
             <a:fld id="{96F7184E-8FBB-4A90-A48C-F739EEF98397}" type="datetime1">
               <a:rPr lang="en-US" smtClean="0"/>
-              <a:t>7/21/2020</a:t>
+              <a:t>8/7/2020</a:t>
             </a:fld>
             <a:endParaRPr lang="en-US"/>
           </a:p>
@@ -42019,7 +44779,7 @@
           <a:graphicData uri="http://schemas.openxmlformats.org/presentationml/2006/ole">
             <mc:AlternateContent xmlns:mc="http://schemas.openxmlformats.org/markup-compatibility/2006">
               <mc:Choice xmlns:v="urn:schemas-microsoft-com:vml" Requires="v">
-                <p:oleObj spid="_x0000_s20488" name="think-cell Folie" r:id="rId5" imgW="631" imgH="631" progId="TCLayout.ActiveDocument.1">
+                <p:oleObj spid="_x0000_s20492" name="think-cell Folie" r:id="rId5" imgW="631" imgH="631" progId="TCLayout.ActiveDocument.1">
                   <p:embed/>
                 </p:oleObj>
               </mc:Choice>
@@ -42348,7 +45108,7 @@
           <a:p>
             <a:fld id="{DCE39F82-C8B2-4430-ADB5-DCC3FC9E3AF4}" type="datetime1">
               <a:rPr lang="en-US" smtClean="0"/>
-              <a:t>7/21/2020</a:t>
+              <a:t>8/7/2020</a:t>
             </a:fld>
             <a:endParaRPr lang="en-US" dirty="0"/>
           </a:p>
@@ -42454,7 +45214,7 @@
           <a:graphicData uri="http://schemas.openxmlformats.org/presentationml/2006/ole">
             <mc:AlternateContent xmlns:mc="http://schemas.openxmlformats.org/markup-compatibility/2006">
               <mc:Choice xmlns:v="urn:schemas-microsoft-com:vml" Requires="v">
-                <p:oleObj spid="_x0000_s21512" name="think-cell Folie" r:id="rId5" imgW="631" imgH="631" progId="TCLayout.ActiveDocument.1">
+                <p:oleObj spid="_x0000_s21516" name="think-cell Folie" r:id="rId5" imgW="631" imgH="631" progId="TCLayout.ActiveDocument.1">
                   <p:embed/>
                 </p:oleObj>
               </mc:Choice>
@@ -42608,7 +45368,7 @@
           <a:p>
             <a:fld id="{48586C47-CAF2-4D5E-A754-C754B93A9936}" type="datetime1">
               <a:rPr lang="en-US" smtClean="0"/>
-              <a:t>7/21/2020</a:t>
+              <a:t>8/7/2020</a:t>
             </a:fld>
             <a:endParaRPr lang="en-US" dirty="0"/>
           </a:p>
@@ -42778,7 +45538,7 @@
           <a:graphicData uri="http://schemas.openxmlformats.org/presentationml/2006/ole">
             <mc:AlternateContent xmlns:mc="http://schemas.openxmlformats.org/markup-compatibility/2006">
               <mc:Choice xmlns:v="urn:schemas-microsoft-com:vml" Requires="v">
-                <p:oleObj spid="_x0000_s22536" name="think-cell Folie" r:id="rId8" imgW="631" imgH="631" progId="TCLayout.ActiveDocument.1">
+                <p:oleObj spid="_x0000_s22540" name="think-cell Folie" r:id="rId8" imgW="631" imgH="631" progId="TCLayout.ActiveDocument.1">
                   <p:embed/>
                 </p:oleObj>
               </mc:Choice>
@@ -42917,7 +45677,7 @@
           <a:p>
             <a:fld id="{96F7184E-8FBB-4A90-A48C-F739EEF98397}" type="datetime1">
               <a:rPr lang="en-US" smtClean="0"/>
-              <a:t>7/21/2020</a:t>
+              <a:t>8/7/2020</a:t>
             </a:fld>
             <a:endParaRPr lang="en-US"/>
           </a:p>
@@ -43343,7 +46103,7 @@
           <a:graphicData uri="http://schemas.openxmlformats.org/presentationml/2006/ole">
             <mc:AlternateContent xmlns:mc="http://schemas.openxmlformats.org/markup-compatibility/2006">
               <mc:Choice xmlns:v="urn:schemas-microsoft-com:vml" Requires="v">
-                <p:oleObj spid="_x0000_s5128" name="think-cell Folie" r:id="rId8" imgW="631" imgH="631" progId="TCLayout.ActiveDocument.1">
+                <p:oleObj spid="_x0000_s5132" name="think-cell Folie" r:id="rId8" imgW="631" imgH="631" progId="TCLayout.ActiveDocument.1">
                   <p:embed/>
                 </p:oleObj>
               </mc:Choice>
@@ -43482,7 +46242,7 @@
           <a:p>
             <a:fld id="{96F7184E-8FBB-4A90-A48C-F739EEF98397}" type="datetime1">
               <a:rPr lang="en-US" smtClean="0"/>
-              <a:t>7/21/2020</a:t>
+              <a:t>8/7/2020</a:t>
             </a:fld>
             <a:endParaRPr lang="en-US"/>
           </a:p>
@@ -43844,7 +46604,7 @@
           <a:graphicData uri="http://schemas.openxmlformats.org/presentationml/2006/ole">
             <mc:AlternateContent xmlns:mc="http://schemas.openxmlformats.org/markup-compatibility/2006">
               <mc:Choice xmlns:v="urn:schemas-microsoft-com:vml" Requires="v">
-                <p:oleObj spid="_x0000_s23560" name="think-cell Folie" r:id="rId5" imgW="631" imgH="631" progId="TCLayout.ActiveDocument.1">
+                <p:oleObj spid="_x0000_s23564" name="think-cell Folie" r:id="rId5" imgW="631" imgH="631" progId="TCLayout.ActiveDocument.1">
                   <p:embed/>
                 </p:oleObj>
               </mc:Choice>
@@ -44150,7 +46910,7 @@
           <a:p>
             <a:fld id="{2D8DD609-9492-45C6-B115-851EE4D74A27}" type="datetime1">
               <a:rPr lang="en-US" smtClean="0"/>
-              <a:t>7/21/2020</a:t>
+              <a:t>8/7/2020</a:t>
             </a:fld>
             <a:endParaRPr lang="en-US"/>
           </a:p>
@@ -45334,7 +48094,7 @@
           <a:p>
             <a:fld id="{96F7184E-8FBB-4A90-A48C-F739EEF98397}" type="datetime1">
               <a:rPr lang="en-US" smtClean="0"/>
-              <a:t>7/21/2020</a:t>
+              <a:t>8/7/2020</a:t>
             </a:fld>
             <a:endParaRPr lang="en-US"/>
           </a:p>
@@ -45480,7 +48240,7 @@
           <a:graphicData uri="http://schemas.openxmlformats.org/presentationml/2006/ole">
             <mc:AlternateContent xmlns:mc="http://schemas.openxmlformats.org/markup-compatibility/2006">
               <mc:Choice xmlns:v="urn:schemas-microsoft-com:vml" Requires="v">
-                <p:oleObj spid="_x0000_s24580" name="think-cell Folie" r:id="rId4" imgW="526" imgH="526" progId="TCLayout.ActiveDocument.1">
+                <p:oleObj spid="_x0000_s24584" name="think-cell Folie" r:id="rId4" imgW="526" imgH="526" progId="TCLayout.ActiveDocument.1">
                   <p:embed/>
                 </p:oleObj>
               </mc:Choice>
@@ -45532,7 +48292,7 @@
           <a:p>
             <a:fld id="{96F7184E-8FBB-4A90-A48C-F739EEF98397}" type="datetime1">
               <a:rPr lang="en-US" smtClean="0"/>
-              <a:t>7/21/2020</a:t>
+              <a:t>8/7/2020</a:t>
             </a:fld>
             <a:endParaRPr lang="en-US"/>
           </a:p>
@@ -46065,6 +48825,287 @@
     <p:extLst>
       <p:ext uri="{BB962C8B-B14F-4D97-AF65-F5344CB8AC3E}">
         <p14:creationId xmlns:p14="http://schemas.microsoft.com/office/powerpoint/2010/main" val="2857295861"/>
+      </p:ext>
+    </p:extLst>
+  </p:cSld>
+  <p:clrMapOvr>
+    <a:masterClrMapping/>
+  </p:clrMapOvr>
+  <p:timing>
+    <p:tnLst>
+      <p:par>
+        <p:cTn id="1" dur="indefinite" restart="never" nodeType="tmRoot"/>
+      </p:par>
+    </p:tnLst>
+  </p:timing>
+</p:sld>
+</file>
+
+<file path=ppt/slides/slide23.xml><?xml version="1.0" encoding="utf-8"?>
+<p:sld xmlns:a="http://schemas.openxmlformats.org/drawingml/2006/main" xmlns:r="http://schemas.openxmlformats.org/officeDocument/2006/relationships" xmlns:p="http://schemas.openxmlformats.org/presentationml/2006/main">
+  <p:cSld>
+    <p:spTree>
+      <p:nvGrpSpPr>
+        <p:cNvPr id="1" name=""/>
+        <p:cNvGrpSpPr/>
+        <p:nvPr/>
+      </p:nvGrpSpPr>
+      <p:grpSpPr>
+        <a:xfrm>
+          <a:off x="0" y="0"/>
+          <a:ext cx="0" cy="0"/>
+          <a:chOff x="0" y="0"/>
+          <a:chExt cx="0" cy="0"/>
+        </a:xfrm>
+      </p:grpSpPr>
+      <p:graphicFrame>
+        <p:nvGraphicFramePr>
+          <p:cNvPr id="12" name="Objekt 11" hidden="1"/>
+          <p:cNvGraphicFramePr>
+            <a:graphicFrameLocks noChangeAspect="1"/>
+          </p:cNvGraphicFramePr>
+          <p:nvPr>
+            <p:custDataLst>
+              <p:tags r:id="rId2"/>
+            </p:custDataLst>
+            <p:extLst>
+              <p:ext uri="{D42A27DB-BD31-4B8C-83A1-F6EECF244321}">
+                <p14:modId xmlns:p14="http://schemas.microsoft.com/office/powerpoint/2010/main" val="3410225774"/>
+              </p:ext>
+            </p:extLst>
+          </p:nvPr>
+        </p:nvGraphicFramePr>
+        <p:xfrm>
+          <a:off x="1588" y="1588"/>
+          <a:ext cx="1588" cy="1588"/>
+        </p:xfrm>
+        <a:graphic>
+          <a:graphicData uri="http://schemas.openxmlformats.org/presentationml/2006/ole">
+            <mc:AlternateContent xmlns:mc="http://schemas.openxmlformats.org/markup-compatibility/2006">
+              <mc:Choice xmlns:v="urn:schemas-microsoft-com:vml" Requires="v">
+                <p:oleObj spid="_x0000_s25604" name="think-cell Folie" r:id="rId4" imgW="526" imgH="526" progId="TCLayout.ActiveDocument.1">
+                  <p:embed/>
+                </p:oleObj>
+              </mc:Choice>
+              <mc:Fallback>
+                <p:oleObj name="think-cell Folie" r:id="rId4" imgW="526" imgH="526" progId="TCLayout.ActiveDocument.1">
+                  <p:embed/>
+                  <p:pic>
+                    <p:nvPicPr>
+                      <p:cNvPr id="0" name=""/>
+                      <p:cNvPicPr/>
+                      <p:nvPr/>
+                    </p:nvPicPr>
+                    <p:blipFill>
+                      <a:blip r:embed="rId5"/>
+                      <a:stretch>
+                        <a:fillRect/>
+                      </a:stretch>
+                    </p:blipFill>
+                    <p:spPr>
+                      <a:xfrm>
+                        <a:off x="1588" y="1588"/>
+                        <a:ext cx="1588" cy="1588"/>
+                      </a:xfrm>
+                      <a:prstGeom prst="rect">
+                        <a:avLst/>
+                      </a:prstGeom>
+                    </p:spPr>
+                  </p:pic>
+                </p:oleObj>
+              </mc:Fallback>
+            </mc:AlternateContent>
+          </a:graphicData>
+        </a:graphic>
+      </p:graphicFrame>
+      <p:sp>
+        <p:nvSpPr>
+          <p:cNvPr id="2" name="Titel 1"/>
+          <p:cNvSpPr>
+            <a:spLocks noGrp="1"/>
+          </p:cNvSpPr>
+          <p:nvPr>
+            <p:ph type="title"/>
+          </p:nvPr>
+        </p:nvSpPr>
+        <p:spPr/>
+        <p:txBody>
+          <a:bodyPr/>
+          <a:lstStyle/>
+          <a:p>
+            <a:endParaRPr lang="de-DE" dirty="0"/>
+          </a:p>
+        </p:txBody>
+      </p:sp>
+      <p:sp>
+        <p:nvSpPr>
+          <p:cNvPr id="3" name="Datumsplatzhalter 2"/>
+          <p:cNvSpPr>
+            <a:spLocks noGrp="1"/>
+          </p:cNvSpPr>
+          <p:nvPr>
+            <p:ph type="dt" sz="half" idx="10"/>
+          </p:nvPr>
+        </p:nvSpPr>
+        <p:spPr/>
+        <p:txBody>
+          <a:bodyPr/>
+          <a:lstStyle/>
+          <a:p>
+            <a:fld id="{96F7184E-8FBB-4A90-A48C-F739EEF98397}" type="datetime1">
+              <a:rPr lang="de-DE" smtClean="0"/>
+              <a:t>8/7/2020</a:t>
+            </a:fld>
+            <a:endParaRPr lang="de-DE" dirty="0"/>
+          </a:p>
+        </p:txBody>
+      </p:sp>
+      <p:sp>
+        <p:nvSpPr>
+          <p:cNvPr id="4" name="Fußzeilenplatzhalter 3"/>
+          <p:cNvSpPr>
+            <a:spLocks noGrp="1"/>
+          </p:cNvSpPr>
+          <p:nvPr>
+            <p:ph type="ftr" sz="quarter" idx="11"/>
+          </p:nvPr>
+        </p:nvSpPr>
+        <p:spPr/>
+        <p:txBody>
+          <a:bodyPr/>
+          <a:lstStyle/>
+          <a:p>
+            <a:r>
+              <a:rPr lang="de-DE" dirty="0" smtClean="0"/>
+              <a:t>Test</a:t>
+            </a:r>
+            <a:endParaRPr lang="de-DE" dirty="0"/>
+          </a:p>
+        </p:txBody>
+      </p:sp>
+      <p:sp>
+        <p:nvSpPr>
+          <p:cNvPr id="5" name="Foliennummernplatzhalter 4"/>
+          <p:cNvSpPr>
+            <a:spLocks noGrp="1"/>
+          </p:cNvSpPr>
+          <p:nvPr>
+            <p:ph type="sldNum" sz="quarter" idx="12"/>
+          </p:nvPr>
+        </p:nvSpPr>
+        <p:spPr/>
+        <p:txBody>
+          <a:bodyPr/>
+          <a:lstStyle/>
+          <a:p>
+            <a:fld id="{0698A7DB-5DF1-49E6-AE67-8A85ED6DF7ED}" type="slidenum">
+              <a:rPr lang="de-DE" smtClean="0"/>
+              <a:t>23</a:t>
+            </a:fld>
+            <a:endParaRPr lang="de-DE" dirty="0"/>
+          </a:p>
+        </p:txBody>
+      </p:sp>
+      <p:graphicFrame>
+        <p:nvGraphicFramePr>
+          <p:cNvPr id="8" name="Diagramm 7"/>
+          <p:cNvGraphicFramePr/>
+          <p:nvPr>
+            <p:extLst>
+              <p:ext uri="{D42A27DB-BD31-4B8C-83A1-F6EECF244321}">
+                <p14:modId xmlns:p14="http://schemas.microsoft.com/office/powerpoint/2010/main" val="730276571"/>
+              </p:ext>
+            </p:extLst>
+          </p:nvPr>
+        </p:nvGraphicFramePr>
+        <p:xfrm>
+          <a:off x="935421" y="1823545"/>
+          <a:ext cx="4000938" cy="1802816"/>
+        </p:xfrm>
+        <a:graphic>
+          <a:graphicData uri="http://schemas.openxmlformats.org/drawingml/2006/chart">
+            <c:chart xmlns:c="http://schemas.openxmlformats.org/drawingml/2006/chart" xmlns:r="http://schemas.openxmlformats.org/officeDocument/2006/relationships" r:id="rId6"/>
+          </a:graphicData>
+        </a:graphic>
+      </p:graphicFrame>
+      <p:graphicFrame>
+        <p:nvGraphicFramePr>
+          <p:cNvPr id="9" name="Diagramm 8"/>
+          <p:cNvGraphicFramePr/>
+          <p:nvPr>
+            <p:extLst>
+              <p:ext uri="{D42A27DB-BD31-4B8C-83A1-F6EECF244321}">
+                <p14:modId xmlns:p14="http://schemas.microsoft.com/office/powerpoint/2010/main" val="1324973405"/>
+              </p:ext>
+            </p:extLst>
+          </p:nvPr>
+        </p:nvGraphicFramePr>
+        <p:xfrm>
+          <a:off x="5933090" y="1823545"/>
+          <a:ext cx="4000938" cy="1802816"/>
+        </p:xfrm>
+        <a:graphic>
+          <a:graphicData uri="http://schemas.openxmlformats.org/drawingml/2006/chart">
+            <c:chart xmlns:c="http://schemas.openxmlformats.org/drawingml/2006/chart" xmlns:r="http://schemas.openxmlformats.org/officeDocument/2006/relationships" r:id="rId7"/>
+          </a:graphicData>
+        </a:graphic>
+      </p:graphicFrame>
+      <mc:AlternateContent xmlns:mc="http://schemas.openxmlformats.org/markup-compatibility/2006">
+        <mc:Choice xmlns:cx1="http://schemas.microsoft.com/office/drawing/2015/9/8/chartex" Requires="cx1">
+          <p:graphicFrame>
+            <p:nvGraphicFramePr>
+              <p:cNvPr id="10" name="Diagramm 9"/>
+              <p:cNvGraphicFramePr/>
+              <p:nvPr>
+                <p:extLst>
+                  <p:ext uri="{D42A27DB-BD31-4B8C-83A1-F6EECF244321}">
+                    <p14:modId xmlns:p14="http://schemas.microsoft.com/office/powerpoint/2010/main" val="1684425900"/>
+                  </p:ext>
+                </p:extLst>
+              </p:nvPr>
+            </p:nvGraphicFramePr>
+            <p:xfrm>
+              <a:off x="935421" y="4272455"/>
+              <a:ext cx="4000938" cy="1802816"/>
+            </p:xfrm>
+            <a:graphic>
+              <a:graphicData uri="http://schemas.microsoft.com/office/drawing/2014/chartex">
+                <cx:chart xmlns:cx="http://schemas.microsoft.com/office/drawing/2014/chartex" xmlns:r="http://schemas.openxmlformats.org/officeDocument/2006/relationships" r:id="rId8"/>
+              </a:graphicData>
+            </a:graphic>
+          </p:graphicFrame>
+        </mc:Choice>
+        <mc:Fallback>
+          <p:pic>
+            <p:nvPicPr>
+              <p:cNvPr id="10" name="Diagramm 9"/>
+              <p:cNvPicPr>
+                <a:picLocks noGrp="1" noRot="1" noChangeAspect="1" noMove="1" noResize="1" noEditPoints="1" noAdjustHandles="1" noChangeArrowheads="1" noChangeShapeType="1"/>
+              </p:cNvPicPr>
+              <p:nvPr/>
+            </p:nvPicPr>
+            <p:blipFill>
+              <a:blip r:embed="rId9"/>
+              <a:stretch>
+                <a:fillRect/>
+              </a:stretch>
+            </p:blipFill>
+            <p:spPr>
+              <a:xfrm>
+                <a:off x="935421" y="4272455"/>
+                <a:ext cx="4000938" cy="1802816"/>
+              </a:xfrm>
+              <a:prstGeom prst="rect">
+                <a:avLst/>
+              </a:prstGeom>
+            </p:spPr>
+          </p:pic>
+        </mc:Fallback>
+      </mc:AlternateContent>
+    </p:spTree>
+    <p:extLst>
+      <p:ext uri="{BB962C8B-B14F-4D97-AF65-F5344CB8AC3E}">
+        <p14:creationId xmlns:p14="http://schemas.microsoft.com/office/powerpoint/2010/main" val="2353363769"/>
       </p:ext>
     </p:extLst>
   </p:cSld>
@@ -46123,7 +49164,7 @@
           <a:graphicData uri="http://schemas.openxmlformats.org/presentationml/2006/ole">
             <mc:AlternateContent xmlns:mc="http://schemas.openxmlformats.org/markup-compatibility/2006">
               <mc:Choice xmlns:v="urn:schemas-microsoft-com:vml" Requires="v">
-                <p:oleObj spid="_x0000_s6152" name="think-cell Folie" r:id="rId5" imgW="631" imgH="631" progId="TCLayout.ActiveDocument.1">
+                <p:oleObj spid="_x0000_s6156" name="think-cell Folie" r:id="rId5" imgW="631" imgH="631" progId="TCLayout.ActiveDocument.1">
                   <p:embed/>
                 </p:oleObj>
               </mc:Choice>
@@ -46246,7 +49287,7 @@
           <a:p>
             <a:fld id="{96F7184E-8FBB-4A90-A48C-F739EEF98397}" type="datetime1">
               <a:rPr lang="en-US" smtClean="0"/>
-              <a:t>7/21/2020</a:t>
+              <a:t>8/7/2020</a:t>
             </a:fld>
             <a:endParaRPr lang="en-US"/>
           </a:p>
@@ -46652,7 +49693,7 @@
           <a:graphicData uri="http://schemas.openxmlformats.org/presentationml/2006/ole">
             <mc:AlternateContent xmlns:mc="http://schemas.openxmlformats.org/markup-compatibility/2006">
               <mc:Choice xmlns:v="urn:schemas-microsoft-com:vml" Requires="v">
-                <p:oleObj spid="_x0000_s7176" name="think-cell Folie" r:id="rId5" imgW="631" imgH="631" progId="TCLayout.ActiveDocument.1">
+                <p:oleObj spid="_x0000_s7180" name="think-cell Folie" r:id="rId5" imgW="631" imgH="631" progId="TCLayout.ActiveDocument.1">
                   <p:embed/>
                 </p:oleObj>
               </mc:Choice>
@@ -46775,7 +49816,7 @@
           <a:p>
             <a:fld id="{96F7184E-8FBB-4A90-A48C-F739EEF98397}" type="datetime1">
               <a:rPr lang="en-US" smtClean="0"/>
-              <a:t>7/21/2020</a:t>
+              <a:t>8/7/2020</a:t>
             </a:fld>
             <a:endParaRPr lang="en-US"/>
           </a:p>
@@ -47317,7 +50358,7 @@
           <a:graphicData uri="http://schemas.openxmlformats.org/presentationml/2006/ole">
             <mc:AlternateContent xmlns:mc="http://schemas.openxmlformats.org/markup-compatibility/2006">
               <mc:Choice xmlns:v="urn:schemas-microsoft-com:vml" Requires="v">
-                <p:oleObj spid="_x0000_s8200" name="think-cell Folie" r:id="rId5" imgW="631" imgH="631" progId="TCLayout.ActiveDocument.1">
+                <p:oleObj spid="_x0000_s8204" name="think-cell Folie" r:id="rId5" imgW="631" imgH="631" progId="TCLayout.ActiveDocument.1">
                   <p:embed/>
                 </p:oleObj>
               </mc:Choice>
@@ -47616,7 +50657,7 @@
           <a:p>
             <a:fld id="{96F7184E-8FBB-4A90-A48C-F739EEF98397}" type="datetime1">
               <a:rPr lang="en-US" smtClean="0"/>
-              <a:t>7/21/2020</a:t>
+              <a:t>8/7/2020</a:t>
             </a:fld>
             <a:endParaRPr lang="en-US"/>
           </a:p>
@@ -50285,7 +53326,7 @@
           <a:graphicData uri="http://schemas.openxmlformats.org/presentationml/2006/ole">
             <mc:AlternateContent xmlns:mc="http://schemas.openxmlformats.org/markup-compatibility/2006">
               <mc:Choice xmlns:v="urn:schemas-microsoft-com:vml" Requires="v">
-                <p:oleObj spid="_x0000_s9224" name="think-cell Folie" r:id="rId8" imgW="631" imgH="631" progId="TCLayout.ActiveDocument.1">
+                <p:oleObj spid="_x0000_s9228" name="think-cell Folie" r:id="rId8" imgW="631" imgH="631" progId="TCLayout.ActiveDocument.1">
                   <p:embed/>
                 </p:oleObj>
               </mc:Choice>
@@ -50424,7 +53465,7 @@
           <a:p>
             <a:fld id="{96F7184E-8FBB-4A90-A48C-F739EEF98397}" type="datetime1">
               <a:rPr lang="en-US" smtClean="0"/>
-              <a:t>7/21/2020</a:t>
+              <a:t>8/7/2020</a:t>
             </a:fld>
             <a:endParaRPr lang="en-US"/>
           </a:p>
@@ -50786,7 +53827,7 @@
           <a:graphicData uri="http://schemas.openxmlformats.org/presentationml/2006/ole">
             <mc:AlternateContent xmlns:mc="http://schemas.openxmlformats.org/markup-compatibility/2006">
               <mc:Choice xmlns:v="urn:schemas-microsoft-com:vml" Requires="v">
-                <p:oleObj spid="_x0000_s10248" name="think-cell Folie" r:id="rId5" imgW="631" imgH="631" progId="TCLayout.ActiveDocument.1">
+                <p:oleObj spid="_x0000_s10252" name="think-cell Folie" r:id="rId5" imgW="631" imgH="631" progId="TCLayout.ActiveDocument.1">
                   <p:embed/>
                 </p:oleObj>
               </mc:Choice>
@@ -52186,7 +55227,7 @@
           <a:p>
             <a:fld id="{96F19FEE-77E8-457F-A68B-CA71C97CC2CC}" type="datetime1">
               <a:rPr lang="en-US" smtClean="0"/>
-              <a:t>7/21/2020</a:t>
+              <a:t>8/7/2020</a:t>
             </a:fld>
             <a:endParaRPr lang="en-US" dirty="0"/>
           </a:p>
@@ -52650,7 +55691,7 @@
           <a:graphicData uri="http://schemas.openxmlformats.org/presentationml/2006/ole">
             <mc:AlternateContent xmlns:mc="http://schemas.openxmlformats.org/markup-compatibility/2006">
               <mc:Choice xmlns:v="urn:schemas-microsoft-com:vml" Requires="v">
-                <p:oleObj spid="_x0000_s11272" name="think-cell Folie" r:id="rId5" imgW="631" imgH="631" progId="TCLayout.ActiveDocument.1">
+                <p:oleObj spid="_x0000_s11276" name="think-cell Folie" r:id="rId5" imgW="631" imgH="631" progId="TCLayout.ActiveDocument.1">
                   <p:embed/>
                 </p:oleObj>
               </mc:Choice>
@@ -52797,7 +55838,7 @@
           <a:p>
             <a:fld id="{E3391B0F-6039-4760-8D96-59CD8C673C29}" type="datetime1">
               <a:rPr lang="en-US" smtClean="0"/>
-              <a:t>7/21/2020</a:t>
+              <a:t>8/7/2020</a:t>
             </a:fld>
             <a:endParaRPr lang="en-US" dirty="0"/>
           </a:p>
@@ -52903,7 +55944,7 @@
           <a:graphicData uri="http://schemas.openxmlformats.org/presentationml/2006/ole">
             <mc:AlternateContent xmlns:mc="http://schemas.openxmlformats.org/markup-compatibility/2006">
               <mc:Choice xmlns:v="urn:schemas-microsoft-com:vml" Requires="v">
-                <p:oleObj spid="_x0000_s12296" name="think-cell Folie" r:id="rId4" imgW="631" imgH="631" progId="TCLayout.ActiveDocument.1">
+                <p:oleObj spid="_x0000_s12300" name="think-cell Folie" r:id="rId4" imgW="631" imgH="631" progId="TCLayout.ActiveDocument.1">
                   <p:embed/>
                 </p:oleObj>
               </mc:Choice>
@@ -52999,7 +56040,7 @@
           <a:p>
             <a:fld id="{D0070A92-E06C-4CB9-82D9-1CCE38BE87EB}" type="datetime1">
               <a:rPr lang="en-US" smtClean="0"/>
-              <a:t>7/21/2020</a:t>
+              <a:t>8/7/2020</a:t>
             </a:fld>
             <a:endParaRPr lang="en-US" dirty="0"/>
           </a:p>
@@ -53424,6 +56465,12 @@
 </file>
 
 <file path=ppt/tags/tag62.xml><?xml version="1.0" encoding="utf-8"?>
+<p:tagLst xmlns:a="http://schemas.openxmlformats.org/drawingml/2006/main" xmlns:r="http://schemas.openxmlformats.org/officeDocument/2006/relationships" xmlns:p="http://schemas.openxmlformats.org/presentationml/2006/main">
+  <p:tag name="THINKCELLSHAPEDONOTDELETE" val="thinkcellActiveDocDoNotDelete"/>
+</p:tagLst>
+</file>
+
+<file path=ppt/tags/tag63.xml><?xml version="1.0" encoding="utf-8"?>
 <p:tagLst xmlns:a="http://schemas.openxmlformats.org/drawingml/2006/main" xmlns:r="http://schemas.openxmlformats.org/officeDocument/2006/relationships" xmlns:p="http://schemas.openxmlformats.org/presentationml/2006/main">
   <p:tag name="THINKCELLSHAPEDONOTDELETE" val="thinkcellActiveDocDoNotDelete"/>
 </p:tagLst>

</xml_diff>